<commit_message>
added in sports info and powerpoint changes
</commit_message>
<xml_diff>
--- a/Highest paying athletes.pptx
+++ b/Highest paying athletes.pptx
@@ -5,10 +5,10 @@
     <p:sldMasterId id="2147483648" r:id="rId4"/>
   </p:sldMasterIdLst>
   <p:notesMasterIdLst>
-    <p:notesMasterId r:id="rId30"/>
+    <p:notesMasterId r:id="rId31"/>
   </p:notesMasterIdLst>
   <p:handoutMasterIdLst>
-    <p:handoutMasterId r:id="rId31"/>
+    <p:handoutMasterId r:id="rId32"/>
   </p:handoutMasterIdLst>
   <p:sldIdLst>
     <p:sldId id="256" r:id="rId5"/>
@@ -26,16 +26,17 @@
     <p:sldId id="273" r:id="rId17"/>
     <p:sldId id="285" r:id="rId18"/>
     <p:sldId id="281" r:id="rId19"/>
-    <p:sldId id="275" r:id="rId20"/>
-    <p:sldId id="290" r:id="rId21"/>
-    <p:sldId id="270" r:id="rId22"/>
-    <p:sldId id="289" r:id="rId23"/>
-    <p:sldId id="284" r:id="rId24"/>
-    <p:sldId id="288" r:id="rId25"/>
-    <p:sldId id="286" r:id="rId26"/>
-    <p:sldId id="266" r:id="rId27"/>
-    <p:sldId id="287" r:id="rId28"/>
-    <p:sldId id="271" r:id="rId29"/>
+    <p:sldId id="291" r:id="rId20"/>
+    <p:sldId id="275" r:id="rId21"/>
+    <p:sldId id="290" r:id="rId22"/>
+    <p:sldId id="270" r:id="rId23"/>
+    <p:sldId id="289" r:id="rId24"/>
+    <p:sldId id="284" r:id="rId25"/>
+    <p:sldId id="288" r:id="rId26"/>
+    <p:sldId id="286" r:id="rId27"/>
+    <p:sldId id="266" r:id="rId28"/>
+    <p:sldId id="287" r:id="rId29"/>
+    <p:sldId id="271" r:id="rId30"/>
   </p:sldIdLst>
   <p:sldSz cx="12192000" cy="6858000"/>
   <p:notesSz cx="6858000" cy="9144000"/>
@@ -2657,7 +2658,7 @@
     </p:spTree>
     <p:extLst>
       <p:ext uri="{BB962C8B-B14F-4D97-AF65-F5344CB8AC3E}">
-        <p14:creationId xmlns:p14="http://schemas.microsoft.com/office/powerpoint/2010/main" val="3072382898"/>
+        <p14:creationId xmlns:p14="http://schemas.microsoft.com/office/powerpoint/2010/main" val="3527123899"/>
       </p:ext>
     </p:extLst>
   </p:cSld>
@@ -2742,7 +2743,7 @@
     </p:spTree>
     <p:extLst>
       <p:ext uri="{BB962C8B-B14F-4D97-AF65-F5344CB8AC3E}">
-        <p14:creationId xmlns:p14="http://schemas.microsoft.com/office/powerpoint/2010/main" val="1524502082"/>
+        <p14:creationId xmlns:p14="http://schemas.microsoft.com/office/powerpoint/2010/main" val="3072382898"/>
       </p:ext>
     </p:extLst>
   </p:cSld>
@@ -2827,7 +2828,7 @@
     </p:spTree>
     <p:extLst>
       <p:ext uri="{BB962C8B-B14F-4D97-AF65-F5344CB8AC3E}">
-        <p14:creationId xmlns:p14="http://schemas.microsoft.com/office/powerpoint/2010/main" val="2482224959"/>
+        <p14:creationId xmlns:p14="http://schemas.microsoft.com/office/powerpoint/2010/main" val="1524502082"/>
       </p:ext>
     </p:extLst>
   </p:cSld>
@@ -2912,7 +2913,7 @@
     </p:spTree>
     <p:extLst>
       <p:ext uri="{BB962C8B-B14F-4D97-AF65-F5344CB8AC3E}">
-        <p14:creationId xmlns:p14="http://schemas.microsoft.com/office/powerpoint/2010/main" val="1780030628"/>
+        <p14:creationId xmlns:p14="http://schemas.microsoft.com/office/powerpoint/2010/main" val="2482224959"/>
       </p:ext>
     </p:extLst>
   </p:cSld>
@@ -3082,7 +3083,7 @@
     </p:spTree>
     <p:extLst>
       <p:ext uri="{BB962C8B-B14F-4D97-AF65-F5344CB8AC3E}">
-        <p14:creationId xmlns:p14="http://schemas.microsoft.com/office/powerpoint/2010/main" val="744345855"/>
+        <p14:creationId xmlns:p14="http://schemas.microsoft.com/office/powerpoint/2010/main" val="1780030628"/>
       </p:ext>
     </p:extLst>
   </p:cSld>
@@ -3167,7 +3168,7 @@
     </p:spTree>
     <p:extLst>
       <p:ext uri="{BB962C8B-B14F-4D97-AF65-F5344CB8AC3E}">
-        <p14:creationId xmlns:p14="http://schemas.microsoft.com/office/powerpoint/2010/main" val="4070786815"/>
+        <p14:creationId xmlns:p14="http://schemas.microsoft.com/office/powerpoint/2010/main" val="744345855"/>
       </p:ext>
     </p:extLst>
   </p:cSld>
@@ -3252,7 +3253,7 @@
     </p:spTree>
     <p:extLst>
       <p:ext uri="{BB962C8B-B14F-4D97-AF65-F5344CB8AC3E}">
-        <p14:creationId xmlns:p14="http://schemas.microsoft.com/office/powerpoint/2010/main" val="324268012"/>
+        <p14:creationId xmlns:p14="http://schemas.microsoft.com/office/powerpoint/2010/main" val="4070786815"/>
       </p:ext>
     </p:extLst>
   </p:cSld>
@@ -3337,7 +3338,7 @@
     </p:spTree>
     <p:extLst>
       <p:ext uri="{BB962C8B-B14F-4D97-AF65-F5344CB8AC3E}">
-        <p14:creationId xmlns:p14="http://schemas.microsoft.com/office/powerpoint/2010/main" val="954942207"/>
+        <p14:creationId xmlns:p14="http://schemas.microsoft.com/office/powerpoint/2010/main" val="324268012"/>
       </p:ext>
     </p:extLst>
   </p:cSld>
@@ -3422,7 +3423,7 @@
     </p:spTree>
     <p:extLst>
       <p:ext uri="{BB962C8B-B14F-4D97-AF65-F5344CB8AC3E}">
-        <p14:creationId xmlns:p14="http://schemas.microsoft.com/office/powerpoint/2010/main" val="2572684225"/>
+        <p14:creationId xmlns:p14="http://schemas.microsoft.com/office/powerpoint/2010/main" val="954942207"/>
       </p:ext>
     </p:extLst>
   </p:cSld>
@@ -3499,6 +3500,91 @@
             <a:fld id="{22289C57-55D7-40A4-A101-E74FAC7A092B}" type="slidenum">
               <a:rPr lang="es-ES" smtClean="0"/>
               <a:t>25</a:t>
+            </a:fld>
+            <a:endParaRPr lang="es-ES" dirty="0"/>
+          </a:p>
+        </p:txBody>
+      </p:sp>
+    </p:spTree>
+    <p:extLst>
+      <p:ext uri="{BB962C8B-B14F-4D97-AF65-F5344CB8AC3E}">
+        <p14:creationId xmlns:p14="http://schemas.microsoft.com/office/powerpoint/2010/main" val="2572684225"/>
+      </p:ext>
+    </p:extLst>
+  </p:cSld>
+  <p:clrMapOvr>
+    <a:masterClrMapping/>
+  </p:clrMapOvr>
+</p:notes>
+</file>
+
+<file path=ppt/notesSlides/notesSlide26.xml><?xml version="1.0" encoding="utf-8"?>
+<p:notes xmlns:a="http://schemas.openxmlformats.org/drawingml/2006/main" xmlns:r="http://schemas.openxmlformats.org/officeDocument/2006/relationships" xmlns:p="http://schemas.openxmlformats.org/presentationml/2006/main">
+  <p:cSld>
+    <p:spTree>
+      <p:nvGrpSpPr>
+        <p:cNvPr id="1" name=""/>
+        <p:cNvGrpSpPr/>
+        <p:nvPr/>
+      </p:nvGrpSpPr>
+      <p:grpSpPr>
+        <a:xfrm>
+          <a:off x="0" y="0"/>
+          <a:ext cx="0" cy="0"/>
+          <a:chOff x="0" y="0"/>
+          <a:chExt cx="0" cy="0"/>
+        </a:xfrm>
+      </p:grpSpPr>
+      <p:sp>
+        <p:nvSpPr>
+          <p:cNvPr id="2" name="Marcador de imagen de diapositiva 1"/>
+          <p:cNvSpPr>
+            <a:spLocks noGrp="1" noRot="1" noChangeAspect="1"/>
+          </p:cNvSpPr>
+          <p:nvPr>
+            <p:ph type="sldImg"/>
+          </p:nvPr>
+        </p:nvSpPr>
+        <p:spPr/>
+      </p:sp>
+      <p:sp>
+        <p:nvSpPr>
+          <p:cNvPr id="3" name="Marcador de notas 2"/>
+          <p:cNvSpPr>
+            <a:spLocks noGrp="1"/>
+          </p:cNvSpPr>
+          <p:nvPr>
+            <p:ph type="body" idx="1"/>
+          </p:nvPr>
+        </p:nvSpPr>
+        <p:spPr/>
+        <p:txBody>
+          <a:bodyPr/>
+          <a:lstStyle/>
+          <a:p>
+            <a:endParaRPr lang="es-ES" dirty="0"/>
+          </a:p>
+        </p:txBody>
+      </p:sp>
+      <p:sp>
+        <p:nvSpPr>
+          <p:cNvPr id="4" name="Marcador de número de diapositiva 3"/>
+          <p:cNvSpPr>
+            <a:spLocks noGrp="1"/>
+          </p:cNvSpPr>
+          <p:nvPr>
+            <p:ph type="sldNum" sz="quarter" idx="5"/>
+          </p:nvPr>
+        </p:nvSpPr>
+        <p:spPr/>
+        <p:txBody>
+          <a:bodyPr/>
+          <a:lstStyle/>
+          <a:p>
+            <a:pPr rtl="0"/>
+            <a:fld id="{22289C57-55D7-40A4-A101-E74FAC7A092B}" type="slidenum">
+              <a:rPr lang="es-ES" smtClean="0"/>
+              <a:t>26</a:t>
             </a:fld>
             <a:endParaRPr lang="es-ES" dirty="0"/>
           </a:p>
@@ -14885,82 +14971,6 @@
       </p:sp>
       <p:sp>
         <p:nvSpPr>
-          <p:cNvPr id="7" name="Marcador de fecha 6">
-            <a:extLst>
-              <a:ext uri="{FF2B5EF4-FFF2-40B4-BE49-F238E27FC236}">
-                <a16:creationId xmlns:a16="http://schemas.microsoft.com/office/drawing/2014/main" id="{B2A46C4A-D036-4440-BB64-6754F4FF27C1}"/>
-              </a:ext>
-            </a:extLst>
-          </p:cNvPr>
-          <p:cNvSpPr>
-            <a:spLocks noGrp="1"/>
-          </p:cNvSpPr>
-          <p:nvPr>
-            <p:ph type="dt" sz="half" idx="10"/>
-          </p:nvPr>
-        </p:nvSpPr>
-        <p:spPr>
-          <a:xfrm>
-            <a:off x="838200" y="6356350"/>
-            <a:ext cx="2743200" cy="365125"/>
-          </a:xfrm>
-        </p:spPr>
-        <p:txBody>
-          <a:bodyPr rtlCol="0"/>
-          <a:lstStyle>
-            <a:defPPr>
-              <a:defRPr lang="es-ES"/>
-            </a:defPPr>
-          </a:lstStyle>
-          <a:p>
-            <a:pPr rtl="0"/>
-            <a:r>
-              <a:rPr lang="es-ES" dirty="0"/>
-              <a:t>20XX</a:t>
-            </a:r>
-          </a:p>
-        </p:txBody>
-      </p:sp>
-      <p:sp>
-        <p:nvSpPr>
-          <p:cNvPr id="8" name="Marcador de pie de página 7">
-            <a:extLst>
-              <a:ext uri="{FF2B5EF4-FFF2-40B4-BE49-F238E27FC236}">
-                <a16:creationId xmlns:a16="http://schemas.microsoft.com/office/drawing/2014/main" id="{905F172A-5D5D-43CD-A187-DA0D303F4144}"/>
-              </a:ext>
-            </a:extLst>
-          </p:cNvPr>
-          <p:cNvSpPr>
-            <a:spLocks noGrp="1"/>
-          </p:cNvSpPr>
-          <p:nvPr>
-            <p:ph type="ftr" sz="quarter" idx="11"/>
-          </p:nvPr>
-        </p:nvSpPr>
-        <p:spPr>
-          <a:xfrm>
-            <a:off x="4038600" y="6356350"/>
-            <a:ext cx="4114800" cy="365125"/>
-          </a:xfrm>
-        </p:spPr>
-        <p:txBody>
-          <a:bodyPr rtlCol="0"/>
-          <a:lstStyle>
-            <a:defPPr>
-              <a:defRPr lang="es-ES"/>
-            </a:defPPr>
-          </a:lstStyle>
-          <a:p>
-            <a:pPr rtl="0"/>
-            <a:r>
-              <a:rPr lang="es-ES" dirty="0"/>
-              <a:t>TÍTULO DE LA PRESENTACIÓN</a:t>
-            </a:r>
-          </a:p>
-        </p:txBody>
-      </p:sp>
-      <p:sp>
-        <p:nvSpPr>
           <p:cNvPr id="9" name="Marcador de número de diapositiva 8">
             <a:extLst>
               <a:ext uri="{FF2B5EF4-FFF2-40B4-BE49-F238E27FC236}">
@@ -15001,10 +15011,10 @@
       </p:sp>
       <p:pic>
         <p:nvPicPr>
-          <p:cNvPr id="13" name="Picture 12" descr="A screen shot of a graph&#10;&#10;Description automatically generated">
-            <a:extLst>
-              <a:ext uri="{FF2B5EF4-FFF2-40B4-BE49-F238E27FC236}">
-                <a16:creationId xmlns:a16="http://schemas.microsoft.com/office/drawing/2014/main" id="{E60AB1D9-9C5A-747D-509D-E89744A34532}"/>
+          <p:cNvPr id="12" name="Picture 11">
+            <a:extLst>
+              <a:ext uri="{FF2B5EF4-FFF2-40B4-BE49-F238E27FC236}">
+                <a16:creationId xmlns:a16="http://schemas.microsoft.com/office/drawing/2014/main" id="{CD8A96B9-9D83-6DF1-D009-6FD5AF978E41}"/>
               </a:ext>
             </a:extLst>
           </p:cNvPr>
@@ -15021,8 +15031,8 @@
         </p:blipFill>
         <p:spPr>
           <a:xfrm>
-            <a:off x="952500" y="-270704"/>
-            <a:ext cx="10287000" cy="6858000"/>
+            <a:off x="0" y="36511"/>
+            <a:ext cx="12192000" cy="6502401"/>
           </a:xfrm>
           <a:prstGeom prst="rect">
             <a:avLst/>
@@ -15031,164 +15041,46 @@
       </p:pic>
       <p:sp>
         <p:nvSpPr>
-          <p:cNvPr id="3" name="Oval 2">
-            <a:extLst>
-              <a:ext uri="{FF2B5EF4-FFF2-40B4-BE49-F238E27FC236}">
-                <a16:creationId xmlns:a16="http://schemas.microsoft.com/office/drawing/2014/main" id="{6998A596-109F-B8E6-01A0-E9158D7D8FC0}"/>
-              </a:ext>
-            </a:extLst>
-          </p:cNvPr>
-          <p:cNvSpPr/>
-          <p:nvPr/>
-        </p:nvSpPr>
-        <p:spPr>
-          <a:xfrm>
-            <a:off x="8379242" y="553419"/>
-            <a:ext cx="542236" cy="520008"/>
-          </a:xfrm>
-          <a:prstGeom prst="ellipse">
-            <a:avLst/>
-          </a:prstGeom>
-          <a:noFill/>
-          <a:ln w="28575">
-            <a:solidFill>
-              <a:srgbClr val="AE2012"/>
-            </a:solidFill>
-          </a:ln>
-        </p:spPr>
-        <p:style>
-          <a:lnRef idx="2">
-            <a:schemeClr val="accent1">
-              <a:shade val="15000"/>
-            </a:schemeClr>
-          </a:lnRef>
-          <a:fillRef idx="1">
-            <a:schemeClr val="accent1"/>
-          </a:fillRef>
-          <a:effectRef idx="0">
-            <a:schemeClr val="accent1"/>
-          </a:effectRef>
-          <a:fontRef idx="minor">
-            <a:schemeClr val="lt1"/>
-          </a:fontRef>
-        </p:style>
-        <p:txBody>
-          <a:bodyPr rtlCol="0" anchor="ctr"/>
-          <a:lstStyle/>
-          <a:p>
-            <a:pPr algn="ctr"/>
-            <a:endParaRPr lang="es-US" dirty="0"/>
-          </a:p>
-        </p:txBody>
-      </p:sp>
-      <p:sp>
-        <p:nvSpPr>
-          <p:cNvPr id="5" name="Oval 4">
-            <a:extLst>
-              <a:ext uri="{FF2B5EF4-FFF2-40B4-BE49-F238E27FC236}">
-                <a16:creationId xmlns:a16="http://schemas.microsoft.com/office/drawing/2014/main" id="{C7C02EDF-94D5-CA69-341D-1FC4D160C02F}"/>
-              </a:ext>
-            </a:extLst>
-          </p:cNvPr>
-          <p:cNvSpPr/>
-          <p:nvPr/>
-        </p:nvSpPr>
-        <p:spPr>
-          <a:xfrm>
-            <a:off x="9093212" y="1068592"/>
-            <a:ext cx="542236" cy="520008"/>
-          </a:xfrm>
-          <a:prstGeom prst="ellipse">
-            <a:avLst/>
-          </a:prstGeom>
-          <a:noFill/>
-          <a:ln w="28575">
-            <a:solidFill>
-              <a:srgbClr val="AE2012"/>
-            </a:solidFill>
-          </a:ln>
-        </p:spPr>
-        <p:style>
-          <a:lnRef idx="2">
-            <a:schemeClr val="accent1">
-              <a:shade val="15000"/>
-            </a:schemeClr>
-          </a:lnRef>
-          <a:fillRef idx="1">
-            <a:schemeClr val="accent1"/>
-          </a:fillRef>
-          <a:effectRef idx="0">
-            <a:schemeClr val="accent1"/>
-          </a:effectRef>
-          <a:fontRef idx="minor">
-            <a:schemeClr val="lt1"/>
-          </a:fontRef>
-        </p:style>
-        <p:txBody>
-          <a:bodyPr rtlCol="0" anchor="ctr"/>
-          <a:lstStyle/>
-          <a:p>
-            <a:pPr algn="ctr"/>
-            <a:endParaRPr lang="es-US" dirty="0"/>
-          </a:p>
-        </p:txBody>
-      </p:sp>
-      <p:sp>
-        <p:nvSpPr>
-          <p:cNvPr id="10" name="Oval 9">
-            <a:extLst>
-              <a:ext uri="{FF2B5EF4-FFF2-40B4-BE49-F238E27FC236}">
-                <a16:creationId xmlns:a16="http://schemas.microsoft.com/office/drawing/2014/main" id="{64A443F8-ECCA-45EA-A97B-BE2AF1627D03}"/>
-              </a:ext>
-            </a:extLst>
-          </p:cNvPr>
-          <p:cNvSpPr/>
-          <p:nvPr/>
-        </p:nvSpPr>
-        <p:spPr>
-          <a:xfrm>
-            <a:off x="8372608" y="2892446"/>
-            <a:ext cx="542236" cy="520008"/>
-          </a:xfrm>
-          <a:prstGeom prst="ellipse">
-            <a:avLst/>
-          </a:prstGeom>
-          <a:noFill/>
-          <a:ln w="28575">
-            <a:solidFill>
-              <a:srgbClr val="AE2012"/>
-            </a:solidFill>
-          </a:ln>
-        </p:spPr>
-        <p:style>
-          <a:lnRef idx="2">
-            <a:schemeClr val="accent1">
-              <a:shade val="15000"/>
-            </a:schemeClr>
-          </a:lnRef>
-          <a:fillRef idx="1">
-            <a:schemeClr val="accent1"/>
-          </a:fillRef>
-          <a:effectRef idx="0">
-            <a:schemeClr val="accent1"/>
-          </a:effectRef>
-          <a:fontRef idx="minor">
-            <a:schemeClr val="lt1"/>
-          </a:fontRef>
-        </p:style>
-        <p:txBody>
-          <a:bodyPr rtlCol="0" anchor="ctr"/>
-          <a:lstStyle/>
-          <a:p>
-            <a:pPr algn="ctr"/>
-            <a:endParaRPr lang="es-US" dirty="0"/>
+          <p:cNvPr id="16" name="Marcador de pie de página 56">
+            <a:extLst>
+              <a:ext uri="{FF2B5EF4-FFF2-40B4-BE49-F238E27FC236}">
+                <a16:creationId xmlns:a16="http://schemas.microsoft.com/office/drawing/2014/main" id="{CCB864C7-E6EE-4585-0CA8-B3318E44A37F}"/>
+              </a:ext>
+            </a:extLst>
+          </p:cNvPr>
+          <p:cNvSpPr>
+            <a:spLocks noGrp="1"/>
+          </p:cNvSpPr>
+          <p:nvPr>
+            <p:ph type="ftr" sz="quarter" idx="11"/>
+          </p:nvPr>
+        </p:nvSpPr>
+        <p:spPr>
+          <a:xfrm>
+            <a:off x="4038600" y="6356350"/>
+            <a:ext cx="4114800" cy="365125"/>
+          </a:xfrm>
+        </p:spPr>
+        <p:txBody>
+          <a:bodyPr rtlCol="0"/>
+          <a:lstStyle>
+            <a:defPPr>
+              <a:defRPr lang="es-ES"/>
+            </a:defPPr>
+          </a:lstStyle>
+          <a:p>
+            <a:pPr rtl="0"/>
+            <a:r>
+              <a:rPr lang="es-ES" dirty="0"/>
+              <a:t>FORBES HIGHEST PAYING ATHLETES ANALYSIS</a:t>
+            </a:r>
           </a:p>
         </p:txBody>
       </p:sp>
     </p:spTree>
     <p:extLst>
       <p:ext uri="{BB962C8B-B14F-4D97-AF65-F5344CB8AC3E}">
-        <p14:creationId xmlns:p14="http://schemas.microsoft.com/office/powerpoint/2010/main" val="144498883"/>
+        <p14:creationId xmlns:p14="http://schemas.microsoft.com/office/powerpoint/2010/main" val="3590459948"/>
       </p:ext>
     </p:extLst>
   </p:cSld>
@@ -15472,10 +15364,10 @@
       </p:sp>
       <p:pic>
         <p:nvPicPr>
-          <p:cNvPr id="11" name="Picture 10">
-            <a:extLst>
-              <a:ext uri="{FF2B5EF4-FFF2-40B4-BE49-F238E27FC236}">
-                <a16:creationId xmlns:a16="http://schemas.microsoft.com/office/drawing/2014/main" id="{0014701C-A515-45B2-03F5-C4EF3D5AD0B3}"/>
+          <p:cNvPr id="13" name="Picture 12" descr="A screen shot of a graph&#10;&#10;Description automatically generated">
+            <a:extLst>
+              <a:ext uri="{FF2B5EF4-FFF2-40B4-BE49-F238E27FC236}">
+                <a16:creationId xmlns:a16="http://schemas.microsoft.com/office/drawing/2014/main" id="{E60AB1D9-9C5A-747D-509D-E89744A34532}"/>
               </a:ext>
             </a:extLst>
           </p:cNvPr>
@@ -15492,139 +15384,174 @@
         </p:blipFill>
         <p:spPr>
           <a:xfrm>
-            <a:off x="1085282" y="333698"/>
-            <a:ext cx="4437499" cy="5498775"/>
+            <a:off x="952500" y="-270704"/>
+            <a:ext cx="10287000" cy="6858000"/>
           </a:xfrm>
           <a:prstGeom prst="rect">
             <a:avLst/>
           </a:prstGeom>
         </p:spPr>
       </p:pic>
-      <p:pic>
-        <p:nvPicPr>
-          <p:cNvPr id="14" name="Picture 13">
-            <a:extLst>
-              <a:ext uri="{FF2B5EF4-FFF2-40B4-BE49-F238E27FC236}">
-                <a16:creationId xmlns:a16="http://schemas.microsoft.com/office/drawing/2014/main" id="{A881FA41-88CD-A684-62A8-FD4B7D8A17D4}"/>
-              </a:ext>
-            </a:extLst>
-          </p:cNvPr>
-          <p:cNvPicPr>
-            <a:picLocks noChangeAspect="1"/>
-          </p:cNvPicPr>
+      <p:sp>
+        <p:nvSpPr>
+          <p:cNvPr id="3" name="Oval 2">
+            <a:extLst>
+              <a:ext uri="{FF2B5EF4-FFF2-40B4-BE49-F238E27FC236}">
+                <a16:creationId xmlns:a16="http://schemas.microsoft.com/office/drawing/2014/main" id="{6998A596-109F-B8E6-01A0-E9158D7D8FC0}"/>
+              </a:ext>
+            </a:extLst>
+          </p:cNvPr>
+          <p:cNvSpPr/>
           <p:nvPr/>
-        </p:nvPicPr>
-        <p:blipFill>
-          <a:blip r:embed="rId4"/>
-          <a:stretch>
-            <a:fillRect/>
-          </a:stretch>
-        </p:blipFill>
-        <p:spPr>
-          <a:xfrm>
-            <a:off x="7239001" y="333698"/>
-            <a:ext cx="4114800" cy="5498775"/>
-          </a:xfrm>
-          <a:prstGeom prst="rect">
-            <a:avLst/>
-          </a:prstGeom>
-        </p:spPr>
-      </p:pic>
-      <p:sp>
-        <p:nvSpPr>
-          <p:cNvPr id="15" name="TextBox 14">
-            <a:extLst>
-              <a:ext uri="{FF2B5EF4-FFF2-40B4-BE49-F238E27FC236}">
-                <a16:creationId xmlns:a16="http://schemas.microsoft.com/office/drawing/2014/main" id="{FF61D288-9C04-EAA5-40C4-740D1B4F638F}"/>
-              </a:ext>
-            </a:extLst>
-          </p:cNvPr>
-          <p:cNvSpPr txBox="1"/>
-          <p:nvPr/>
-        </p:nvSpPr>
-        <p:spPr>
-          <a:xfrm>
-            <a:off x="8280134" y="5909745"/>
-            <a:ext cx="2203704" cy="369332"/>
-          </a:xfrm>
-          <a:prstGeom prst="rect">
+        </p:nvSpPr>
+        <p:spPr>
+          <a:xfrm>
+            <a:off x="8379242" y="553419"/>
+            <a:ext cx="542236" cy="520008"/>
+          </a:xfrm>
+          <a:prstGeom prst="ellipse">
             <a:avLst/>
           </a:prstGeom>
           <a:noFill/>
-        </p:spPr>
-        <p:txBody>
-          <a:bodyPr wrap="square" rtlCol="0">
-            <a:spAutoFit/>
-          </a:bodyPr>
+          <a:ln w="28575">
+            <a:solidFill>
+              <a:srgbClr val="AE2012"/>
+            </a:solidFill>
+          </a:ln>
+        </p:spPr>
+        <p:style>
+          <a:lnRef idx="2">
+            <a:schemeClr val="accent1">
+              <a:shade val="15000"/>
+            </a:schemeClr>
+          </a:lnRef>
+          <a:fillRef idx="1">
+            <a:schemeClr val="accent1"/>
+          </a:fillRef>
+          <a:effectRef idx="0">
+            <a:schemeClr val="accent1"/>
+          </a:effectRef>
+          <a:fontRef idx="minor">
+            <a:schemeClr val="lt1"/>
+          </a:fontRef>
+        </p:style>
+        <p:txBody>
+          <a:bodyPr rtlCol="0" anchor="ctr"/>
           <a:lstStyle/>
           <a:p>
-            <a:r>
-              <a:rPr lang="en-US" dirty="0">
-                <a:solidFill>
-                  <a:schemeClr val="bg1"/>
-                </a:solidFill>
-              </a:rPr>
-              <a:t>Image from Forbes</a:t>
-            </a:r>
-          </a:p>
-        </p:txBody>
-      </p:sp>
-      <p:sp>
-        <p:nvSpPr>
-          <p:cNvPr id="16" name="TextBox 15">
-            <a:extLst>
-              <a:ext uri="{FF2B5EF4-FFF2-40B4-BE49-F238E27FC236}">
-                <a16:creationId xmlns:a16="http://schemas.microsoft.com/office/drawing/2014/main" id="{8E11B57D-925A-58EE-040B-FECEB23EABF7}"/>
-              </a:ext>
-            </a:extLst>
-          </p:cNvPr>
-          <p:cNvSpPr txBox="1"/>
+            <a:pPr algn="ctr"/>
+            <a:endParaRPr lang="es-US" dirty="0"/>
+          </a:p>
+        </p:txBody>
+      </p:sp>
+      <p:sp>
+        <p:nvSpPr>
+          <p:cNvPr id="5" name="Oval 4">
+            <a:extLst>
+              <a:ext uri="{FF2B5EF4-FFF2-40B4-BE49-F238E27FC236}">
+                <a16:creationId xmlns:a16="http://schemas.microsoft.com/office/drawing/2014/main" id="{C7C02EDF-94D5-CA69-341D-1FC4D160C02F}"/>
+              </a:ext>
+            </a:extLst>
+          </p:cNvPr>
+          <p:cNvSpPr/>
           <p:nvPr/>
         </p:nvSpPr>
         <p:spPr>
           <a:xfrm>
-            <a:off x="2372109" y="5909745"/>
-            <a:ext cx="1863844" cy="369332"/>
-          </a:xfrm>
-          <a:prstGeom prst="rect">
+            <a:off x="9093212" y="1068592"/>
+            <a:ext cx="542236" cy="520008"/>
+          </a:xfrm>
+          <a:prstGeom prst="ellipse">
             <a:avLst/>
           </a:prstGeom>
           <a:noFill/>
-        </p:spPr>
-        <p:txBody>
-          <a:bodyPr wrap="none" rtlCol="0">
-            <a:spAutoFit/>
-          </a:bodyPr>
+          <a:ln w="28575">
+            <a:solidFill>
+              <a:srgbClr val="AE2012"/>
+            </a:solidFill>
+          </a:ln>
+        </p:spPr>
+        <p:style>
+          <a:lnRef idx="2">
+            <a:schemeClr val="accent1">
+              <a:shade val="15000"/>
+            </a:schemeClr>
+          </a:lnRef>
+          <a:fillRef idx="1">
+            <a:schemeClr val="accent1"/>
+          </a:fillRef>
+          <a:effectRef idx="0">
+            <a:schemeClr val="accent1"/>
+          </a:effectRef>
+          <a:fontRef idx="minor">
+            <a:schemeClr val="lt1"/>
+          </a:fontRef>
+        </p:style>
+        <p:txBody>
+          <a:bodyPr rtlCol="0" anchor="ctr"/>
           <a:lstStyle/>
           <a:p>
-            <a:r>
-              <a:rPr lang="en-US" dirty="0">
-                <a:solidFill>
-                  <a:schemeClr val="bg1"/>
-                </a:solidFill>
-              </a:rPr>
-              <a:t>Photo from </a:t>
-            </a:r>
-            <a:r>
-              <a:rPr lang="en-US" dirty="0" err="1">
-                <a:solidFill>
-                  <a:schemeClr val="bg1"/>
-                </a:solidFill>
-              </a:rPr>
-              <a:t>Imdb</a:t>
-            </a:r>
-            <a:endParaRPr lang="en-US" dirty="0">
-              <a:solidFill>
-                <a:schemeClr val="bg1"/>
-              </a:solidFill>
-            </a:endParaRPr>
+            <a:pPr algn="ctr"/>
+            <a:endParaRPr lang="es-US" dirty="0"/>
+          </a:p>
+        </p:txBody>
+      </p:sp>
+      <p:sp>
+        <p:nvSpPr>
+          <p:cNvPr id="10" name="Oval 9">
+            <a:extLst>
+              <a:ext uri="{FF2B5EF4-FFF2-40B4-BE49-F238E27FC236}">
+                <a16:creationId xmlns:a16="http://schemas.microsoft.com/office/drawing/2014/main" id="{64A443F8-ECCA-45EA-A97B-BE2AF1627D03}"/>
+              </a:ext>
+            </a:extLst>
+          </p:cNvPr>
+          <p:cNvSpPr/>
+          <p:nvPr/>
+        </p:nvSpPr>
+        <p:spPr>
+          <a:xfrm>
+            <a:off x="8372608" y="2892446"/>
+            <a:ext cx="542236" cy="520008"/>
+          </a:xfrm>
+          <a:prstGeom prst="ellipse">
+            <a:avLst/>
+          </a:prstGeom>
+          <a:noFill/>
+          <a:ln w="28575">
+            <a:solidFill>
+              <a:srgbClr val="AE2012"/>
+            </a:solidFill>
+          </a:ln>
+        </p:spPr>
+        <p:style>
+          <a:lnRef idx="2">
+            <a:schemeClr val="accent1">
+              <a:shade val="15000"/>
+            </a:schemeClr>
+          </a:lnRef>
+          <a:fillRef idx="1">
+            <a:schemeClr val="accent1"/>
+          </a:fillRef>
+          <a:effectRef idx="0">
+            <a:schemeClr val="accent1"/>
+          </a:effectRef>
+          <a:fontRef idx="minor">
+            <a:schemeClr val="lt1"/>
+          </a:fontRef>
+        </p:style>
+        <p:txBody>
+          <a:bodyPr rtlCol="0" anchor="ctr"/>
+          <a:lstStyle/>
+          <a:p>
+            <a:pPr algn="ctr"/>
+            <a:endParaRPr lang="es-US" dirty="0"/>
           </a:p>
         </p:txBody>
       </p:sp>
     </p:spTree>
     <p:extLst>
       <p:ext uri="{BB962C8B-B14F-4D97-AF65-F5344CB8AC3E}">
-        <p14:creationId xmlns:p14="http://schemas.microsoft.com/office/powerpoint/2010/main" val="4070989650"/>
+        <p14:creationId xmlns:p14="http://schemas.microsoft.com/office/powerpoint/2010/main" val="144498883"/>
       </p:ext>
     </p:extLst>
   </p:cSld>
@@ -15653,10 +15580,10 @@
       </p:grpSpPr>
       <p:sp>
         <p:nvSpPr>
-          <p:cNvPr id="3" name="Título 2">
-            <a:extLst>
-              <a:ext uri="{FF2B5EF4-FFF2-40B4-BE49-F238E27FC236}">
-                <a16:creationId xmlns:a16="http://schemas.microsoft.com/office/drawing/2014/main" id="{77762301-F83A-4BEA-9D11-E6C99FB574A8}"/>
+          <p:cNvPr id="2" name="Título 1">
+            <a:extLst>
+              <a:ext uri="{FF2B5EF4-FFF2-40B4-BE49-F238E27FC236}">
+                <a16:creationId xmlns:a16="http://schemas.microsoft.com/office/drawing/2014/main" id="{09140014-73D5-419B-8867-972BB18D52D4}"/>
               </a:ext>
             </a:extLst>
           </p:cNvPr>
@@ -15669,8 +15596,8 @@
         </p:nvSpPr>
         <p:spPr>
           <a:xfrm>
-            <a:off x="838200" y="365125"/>
-            <a:ext cx="10515600" cy="1325563"/>
+            <a:off x="2933700" y="892177"/>
+            <a:ext cx="8421688" cy="1325563"/>
           </a:xfrm>
         </p:spPr>
         <p:txBody>
@@ -15684,35 +15611,37 @@
             <a:pPr rtl="0"/>
             <a:r>
               <a:rPr lang="es-ES" dirty="0"/>
-              <a:t>Top yearly earnings</a:t>
-            </a:r>
-          </a:p>
-        </p:txBody>
-      </p:sp>
-      <p:sp>
-        <p:nvSpPr>
-          <p:cNvPr id="6" name="Marcador de fecha 5">
-            <a:extLst>
-              <a:ext uri="{FF2B5EF4-FFF2-40B4-BE49-F238E27FC236}">
-                <a16:creationId xmlns:a16="http://schemas.microsoft.com/office/drawing/2014/main" id="{3627CC26-34EF-4BB9-B289-9EC56B07D1E6}"/>
-              </a:ext>
-            </a:extLst>
-          </p:cNvPr>
-          <p:cNvSpPr>
-            <a:spLocks noGrp="1"/>
-          </p:cNvSpPr>
-          <p:nvPr>
-            <p:ph type="dt" sz="half" idx="10"/>
-          </p:nvPr>
-        </p:nvSpPr>
-        <p:spPr>
-          <a:xfrm>
-            <a:off x="838200" y="6356350"/>
-            <a:ext cx="2743200" cy="365125"/>
-          </a:xfrm>
-        </p:spPr>
-        <p:txBody>
-          <a:bodyPr rtlCol="0"/>
+              <a:t>ÁREAS DE ENFOQUE</a:t>
+            </a:r>
+          </a:p>
+        </p:txBody>
+      </p:sp>
+      <p:sp>
+        <p:nvSpPr>
+          <p:cNvPr id="4" name="Marcador de contenido 3">
+            <a:extLst>
+              <a:ext uri="{FF2B5EF4-FFF2-40B4-BE49-F238E27FC236}">
+                <a16:creationId xmlns:a16="http://schemas.microsoft.com/office/drawing/2014/main" id="{33D8731E-4977-402E-8BFD-895B4D0544CC}"/>
+              </a:ext>
+            </a:extLst>
+          </p:cNvPr>
+          <p:cNvSpPr>
+            <a:spLocks noGrp="1"/>
+          </p:cNvSpPr>
+          <p:nvPr>
+            <p:ph sz="half" idx="2"/>
+          </p:nvPr>
+        </p:nvSpPr>
+        <p:spPr>
+          <a:xfrm>
+            <a:off x="2933700" y="3834606"/>
+            <a:ext cx="3924300" cy="1997867"/>
+          </a:xfrm>
+        </p:spPr>
+        <p:txBody>
+          <a:bodyPr rtlCol="0">
+            <a:normAutofit/>
+          </a:bodyPr>
           <a:lstStyle>
             <a:defPPr>
               <a:defRPr lang="es-ES"/>
@@ -15722,35 +15651,51 @@
             <a:pPr rtl="0"/>
             <a:r>
               <a:rPr lang="es-ES" dirty="0"/>
-              <a:t>20XX</a:t>
-            </a:r>
-          </a:p>
-        </p:txBody>
-      </p:sp>
-      <p:sp>
-        <p:nvSpPr>
-          <p:cNvPr id="7" name="Marcador de pie de página 6">
-            <a:extLst>
-              <a:ext uri="{FF2B5EF4-FFF2-40B4-BE49-F238E27FC236}">
-                <a16:creationId xmlns:a16="http://schemas.microsoft.com/office/drawing/2014/main" id="{4E98E6AD-9D37-499C-898E-ED12AC36D31D}"/>
-              </a:ext>
-            </a:extLst>
-          </p:cNvPr>
-          <p:cNvSpPr>
-            <a:spLocks noGrp="1"/>
-          </p:cNvSpPr>
-          <p:nvPr>
-            <p:ph type="ftr" sz="quarter" idx="11"/>
-          </p:nvPr>
-        </p:nvSpPr>
-        <p:spPr>
-          <a:xfrm>
-            <a:off x="4038600" y="6356350"/>
-            <a:ext cx="4114800" cy="365125"/>
-          </a:xfrm>
-        </p:spPr>
-        <p:txBody>
-          <a:bodyPr rtlCol="0"/>
+              <a:t>Desarrollar estrategias ganadoras para seguir a la vanguardia de la competencia</a:t>
+            </a:r>
+          </a:p>
+          <a:p>
+            <a:pPr rtl="0"/>
+            <a:r>
+              <a:rPr lang="es-ES" dirty="0"/>
+              <a:t>​Aprovechar los frutos obtenidos para identificar un valor en el terreno de juego</a:t>
+            </a:r>
+          </a:p>
+          <a:p>
+            <a:pPr rtl="0"/>
+            <a:r>
+              <a:rPr lang="es-ES" dirty="0"/>
+              <a:t>​Visualizar la convergencia dirigida al cliente</a:t>
+            </a:r>
+          </a:p>
+        </p:txBody>
+      </p:sp>
+      <p:sp>
+        <p:nvSpPr>
+          <p:cNvPr id="6" name="Marcador de contenido 5">
+            <a:extLst>
+              <a:ext uri="{FF2B5EF4-FFF2-40B4-BE49-F238E27FC236}">
+                <a16:creationId xmlns:a16="http://schemas.microsoft.com/office/drawing/2014/main" id="{50B65871-FA95-449A-B8BC-90486DE532EF}"/>
+              </a:ext>
+            </a:extLst>
+          </p:cNvPr>
+          <p:cNvSpPr>
+            <a:spLocks noGrp="1"/>
+          </p:cNvSpPr>
+          <p:nvPr>
+            <p:ph sz="quarter" idx="4"/>
+          </p:nvPr>
+        </p:nvSpPr>
+        <p:spPr>
+          <a:xfrm>
+            <a:off x="7410173" y="3834606"/>
+            <a:ext cx="3943627" cy="1997867"/>
+          </a:xfrm>
+        </p:spPr>
+        <p:txBody>
+          <a:bodyPr rtlCol="0">
+            <a:normAutofit/>
+          </a:bodyPr>
           <a:lstStyle>
             <a:defPPr>
               <a:defRPr lang="es-ES"/>
@@ -15760,6 +15705,89 @@
             <a:pPr rtl="0"/>
             <a:r>
               <a:rPr lang="es-ES" dirty="0"/>
+              <a:t>Enfoques iterativos para una estrategia corporativa</a:t>
+            </a:r>
+          </a:p>
+          <a:p>
+            <a:pPr rtl="0"/>
+            <a:r>
+              <a:rPr lang="es-ES" dirty="0"/>
+              <a:t>​Establecer un marco de administración desde dentro</a:t>
+            </a:r>
+          </a:p>
+        </p:txBody>
+      </p:sp>
+      <p:sp>
+        <p:nvSpPr>
+          <p:cNvPr id="7" name="Marcador de fecha 6">
+            <a:extLst>
+              <a:ext uri="{FF2B5EF4-FFF2-40B4-BE49-F238E27FC236}">
+                <a16:creationId xmlns:a16="http://schemas.microsoft.com/office/drawing/2014/main" id="{B2A46C4A-D036-4440-BB64-6754F4FF27C1}"/>
+              </a:ext>
+            </a:extLst>
+          </p:cNvPr>
+          <p:cNvSpPr>
+            <a:spLocks noGrp="1"/>
+          </p:cNvSpPr>
+          <p:nvPr>
+            <p:ph type="dt" sz="half" idx="10"/>
+          </p:nvPr>
+        </p:nvSpPr>
+        <p:spPr>
+          <a:xfrm>
+            <a:off x="838200" y="6356350"/>
+            <a:ext cx="2743200" cy="365125"/>
+          </a:xfrm>
+        </p:spPr>
+        <p:txBody>
+          <a:bodyPr rtlCol="0"/>
+          <a:lstStyle>
+            <a:defPPr>
+              <a:defRPr lang="es-ES"/>
+            </a:defPPr>
+          </a:lstStyle>
+          <a:p>
+            <a:pPr rtl="0"/>
+            <a:r>
+              <a:rPr lang="es-ES" dirty="0"/>
+              <a:t>20XX</a:t>
+            </a:r>
+          </a:p>
+        </p:txBody>
+      </p:sp>
+      <p:sp>
+        <p:nvSpPr>
+          <p:cNvPr id="8" name="Marcador de pie de página 7">
+            <a:extLst>
+              <a:ext uri="{FF2B5EF4-FFF2-40B4-BE49-F238E27FC236}">
+                <a16:creationId xmlns:a16="http://schemas.microsoft.com/office/drawing/2014/main" id="{905F172A-5D5D-43CD-A187-DA0D303F4144}"/>
+              </a:ext>
+            </a:extLst>
+          </p:cNvPr>
+          <p:cNvSpPr>
+            <a:spLocks noGrp="1"/>
+          </p:cNvSpPr>
+          <p:nvPr>
+            <p:ph type="ftr" sz="quarter" idx="11"/>
+          </p:nvPr>
+        </p:nvSpPr>
+        <p:spPr>
+          <a:xfrm>
+            <a:off x="4038600" y="6356350"/>
+            <a:ext cx="4114800" cy="365125"/>
+          </a:xfrm>
+        </p:spPr>
+        <p:txBody>
+          <a:bodyPr rtlCol="0"/>
+          <a:lstStyle>
+            <a:defPPr>
+              <a:defRPr lang="es-ES"/>
+            </a:defPPr>
+          </a:lstStyle>
+          <a:p>
+            <a:pPr rtl="0"/>
+            <a:r>
+              <a:rPr lang="es-ES" dirty="0"/>
               <a:t>TÍTULO DE LA PRESENTACIÓN</a:t>
             </a:r>
           </a:p>
@@ -15767,10 +15795,10 @@
       </p:sp>
       <p:sp>
         <p:nvSpPr>
-          <p:cNvPr id="8" name="Marcador de número de diapositiva 7">
-            <a:extLst>
-              <a:ext uri="{FF2B5EF4-FFF2-40B4-BE49-F238E27FC236}">
-                <a16:creationId xmlns:a16="http://schemas.microsoft.com/office/drawing/2014/main" id="{92908AF9-2A07-4B50-BC13-471792106EC8}"/>
+          <p:cNvPr id="9" name="Marcador de número de diapositiva 8">
+            <a:extLst>
+              <a:ext uri="{FF2B5EF4-FFF2-40B4-BE49-F238E27FC236}">
+                <a16:creationId xmlns:a16="http://schemas.microsoft.com/office/drawing/2014/main" id="{C396FFDC-ADE8-4009-A466-A81787258E88}"/>
               </a:ext>
             </a:extLst>
           </p:cNvPr>
@@ -15807,10 +15835,10 @@
       </p:sp>
       <p:pic>
         <p:nvPicPr>
-          <p:cNvPr id="12" name="Picture 11">
-            <a:extLst>
-              <a:ext uri="{FF2B5EF4-FFF2-40B4-BE49-F238E27FC236}">
-                <a16:creationId xmlns:a16="http://schemas.microsoft.com/office/drawing/2014/main" id="{A612C06D-D748-DBF6-C6F2-9FD984C2E43C}"/>
+          <p:cNvPr id="11" name="Picture 10">
+            <a:extLst>
+              <a:ext uri="{FF2B5EF4-FFF2-40B4-BE49-F238E27FC236}">
+                <a16:creationId xmlns:a16="http://schemas.microsoft.com/office/drawing/2014/main" id="{0014701C-A515-45B2-03F5-C4EF3D5AD0B3}"/>
               </a:ext>
             </a:extLst>
           </p:cNvPr>
@@ -15819,25 +15847,147 @@
           </p:cNvPicPr>
           <p:nvPr/>
         </p:nvPicPr>
-        <p:blipFill rotWithShape="1">
+        <p:blipFill>
           <a:blip r:embed="rId3"/>
-          <a:srcRect l="1029" t="899" r="4413" b="4063"/>
-          <a:stretch/>
+          <a:stretch>
+            <a:fillRect/>
+          </a:stretch>
         </p:blipFill>
         <p:spPr>
           <a:xfrm>
-            <a:off x="331694" y="1564341"/>
-            <a:ext cx="11528612" cy="4173071"/>
+            <a:off x="1085282" y="333698"/>
+            <a:ext cx="4437499" cy="5498775"/>
           </a:xfrm>
           <a:prstGeom prst="rect">
             <a:avLst/>
           </a:prstGeom>
         </p:spPr>
       </p:pic>
+      <p:pic>
+        <p:nvPicPr>
+          <p:cNvPr id="14" name="Picture 13">
+            <a:extLst>
+              <a:ext uri="{FF2B5EF4-FFF2-40B4-BE49-F238E27FC236}">
+                <a16:creationId xmlns:a16="http://schemas.microsoft.com/office/drawing/2014/main" id="{A881FA41-88CD-A684-62A8-FD4B7D8A17D4}"/>
+              </a:ext>
+            </a:extLst>
+          </p:cNvPr>
+          <p:cNvPicPr>
+            <a:picLocks noChangeAspect="1"/>
+          </p:cNvPicPr>
+          <p:nvPr/>
+        </p:nvPicPr>
+        <p:blipFill>
+          <a:blip r:embed="rId4"/>
+          <a:stretch>
+            <a:fillRect/>
+          </a:stretch>
+        </p:blipFill>
+        <p:spPr>
+          <a:xfrm>
+            <a:off x="7239001" y="333698"/>
+            <a:ext cx="4114800" cy="5498775"/>
+          </a:xfrm>
+          <a:prstGeom prst="rect">
+            <a:avLst/>
+          </a:prstGeom>
+        </p:spPr>
+      </p:pic>
+      <p:sp>
+        <p:nvSpPr>
+          <p:cNvPr id="15" name="TextBox 14">
+            <a:extLst>
+              <a:ext uri="{FF2B5EF4-FFF2-40B4-BE49-F238E27FC236}">
+                <a16:creationId xmlns:a16="http://schemas.microsoft.com/office/drawing/2014/main" id="{FF61D288-9C04-EAA5-40C4-740D1B4F638F}"/>
+              </a:ext>
+            </a:extLst>
+          </p:cNvPr>
+          <p:cNvSpPr txBox="1"/>
+          <p:nvPr/>
+        </p:nvSpPr>
+        <p:spPr>
+          <a:xfrm>
+            <a:off x="8280134" y="5909745"/>
+            <a:ext cx="2203704" cy="369332"/>
+          </a:xfrm>
+          <a:prstGeom prst="rect">
+            <a:avLst/>
+          </a:prstGeom>
+          <a:noFill/>
+        </p:spPr>
+        <p:txBody>
+          <a:bodyPr wrap="square" rtlCol="0">
+            <a:spAutoFit/>
+          </a:bodyPr>
+          <a:lstStyle/>
+          <a:p>
+            <a:r>
+              <a:rPr lang="en-US" dirty="0">
+                <a:solidFill>
+                  <a:schemeClr val="bg1"/>
+                </a:solidFill>
+              </a:rPr>
+              <a:t>Image from Forbes</a:t>
+            </a:r>
+          </a:p>
+        </p:txBody>
+      </p:sp>
+      <p:sp>
+        <p:nvSpPr>
+          <p:cNvPr id="16" name="TextBox 15">
+            <a:extLst>
+              <a:ext uri="{FF2B5EF4-FFF2-40B4-BE49-F238E27FC236}">
+                <a16:creationId xmlns:a16="http://schemas.microsoft.com/office/drawing/2014/main" id="{8E11B57D-925A-58EE-040B-FECEB23EABF7}"/>
+              </a:ext>
+            </a:extLst>
+          </p:cNvPr>
+          <p:cNvSpPr txBox="1"/>
+          <p:nvPr/>
+        </p:nvSpPr>
+        <p:spPr>
+          <a:xfrm>
+            <a:off x="2372109" y="5909745"/>
+            <a:ext cx="1863844" cy="369332"/>
+          </a:xfrm>
+          <a:prstGeom prst="rect">
+            <a:avLst/>
+          </a:prstGeom>
+          <a:noFill/>
+        </p:spPr>
+        <p:txBody>
+          <a:bodyPr wrap="none" rtlCol="0">
+            <a:spAutoFit/>
+          </a:bodyPr>
+          <a:lstStyle/>
+          <a:p>
+            <a:r>
+              <a:rPr lang="en-US" dirty="0">
+                <a:solidFill>
+                  <a:schemeClr val="bg1"/>
+                </a:solidFill>
+              </a:rPr>
+              <a:t>Photo from </a:t>
+            </a:r>
+            <a:r>
+              <a:rPr lang="en-US" dirty="0" err="1">
+                <a:solidFill>
+                  <a:schemeClr val="bg1"/>
+                </a:solidFill>
+              </a:rPr>
+              <a:t>Imdb</a:t>
+            </a:r>
+            <a:endParaRPr lang="en-US" dirty="0">
+              <a:solidFill>
+                <a:schemeClr val="bg1"/>
+              </a:solidFill>
+            </a:endParaRPr>
+          </a:p>
+        </p:txBody>
+      </p:sp>
     </p:spTree>
     <p:extLst>
       <p:ext uri="{BB962C8B-B14F-4D97-AF65-F5344CB8AC3E}">
-        <p14:creationId xmlns:p14="http://schemas.microsoft.com/office/powerpoint/2010/main" val="2896385493"/>
+        <p14:creationId xmlns:p14="http://schemas.microsoft.com/office/powerpoint/2010/main" val="4070989650"/>
       </p:ext>
     </p:extLst>
   </p:cSld>
@@ -15866,10 +16016,10 @@
       </p:grpSpPr>
       <p:sp>
         <p:nvSpPr>
-          <p:cNvPr id="2" name="Título 1">
-            <a:extLst>
-              <a:ext uri="{FF2B5EF4-FFF2-40B4-BE49-F238E27FC236}">
-                <a16:creationId xmlns:a16="http://schemas.microsoft.com/office/drawing/2014/main" id="{09140014-73D5-419B-8867-972BB18D52D4}"/>
+          <p:cNvPr id="3" name="Título 2">
+            <a:extLst>
+              <a:ext uri="{FF2B5EF4-FFF2-40B4-BE49-F238E27FC236}">
+                <a16:creationId xmlns:a16="http://schemas.microsoft.com/office/drawing/2014/main" id="{77762301-F83A-4BEA-9D11-E6C99FB574A8}"/>
               </a:ext>
             </a:extLst>
           </p:cNvPr>
@@ -15882,8 +16032,8 @@
         </p:nvSpPr>
         <p:spPr>
           <a:xfrm>
-            <a:off x="2933700" y="892177"/>
-            <a:ext cx="8421688" cy="1325563"/>
+            <a:off x="838200" y="365125"/>
+            <a:ext cx="10515600" cy="1325563"/>
           </a:xfrm>
         </p:spPr>
         <p:txBody>
@@ -15897,37 +16047,35 @@
             <a:pPr rtl="0"/>
             <a:r>
               <a:rPr lang="es-ES" dirty="0"/>
-              <a:t>ÁREAS DE ENFOQUE</a:t>
-            </a:r>
-          </a:p>
-        </p:txBody>
-      </p:sp>
-      <p:sp>
-        <p:nvSpPr>
-          <p:cNvPr id="4" name="Marcador de contenido 3">
-            <a:extLst>
-              <a:ext uri="{FF2B5EF4-FFF2-40B4-BE49-F238E27FC236}">
-                <a16:creationId xmlns:a16="http://schemas.microsoft.com/office/drawing/2014/main" id="{33D8731E-4977-402E-8BFD-895B4D0544CC}"/>
-              </a:ext>
-            </a:extLst>
-          </p:cNvPr>
-          <p:cNvSpPr>
-            <a:spLocks noGrp="1"/>
-          </p:cNvSpPr>
-          <p:nvPr>
-            <p:ph sz="half" idx="2"/>
-          </p:nvPr>
-        </p:nvSpPr>
-        <p:spPr>
-          <a:xfrm>
-            <a:off x="2933700" y="3834606"/>
-            <a:ext cx="3924300" cy="1997867"/>
-          </a:xfrm>
-        </p:spPr>
-        <p:txBody>
-          <a:bodyPr rtlCol="0">
-            <a:normAutofit/>
-          </a:bodyPr>
+              <a:t>Top yearly earnings</a:t>
+            </a:r>
+          </a:p>
+        </p:txBody>
+      </p:sp>
+      <p:sp>
+        <p:nvSpPr>
+          <p:cNvPr id="6" name="Marcador de fecha 5">
+            <a:extLst>
+              <a:ext uri="{FF2B5EF4-FFF2-40B4-BE49-F238E27FC236}">
+                <a16:creationId xmlns:a16="http://schemas.microsoft.com/office/drawing/2014/main" id="{3627CC26-34EF-4BB9-B289-9EC56B07D1E6}"/>
+              </a:ext>
+            </a:extLst>
+          </p:cNvPr>
+          <p:cNvSpPr>
+            <a:spLocks noGrp="1"/>
+          </p:cNvSpPr>
+          <p:nvPr>
+            <p:ph type="dt" sz="half" idx="10"/>
+          </p:nvPr>
+        </p:nvSpPr>
+        <p:spPr>
+          <a:xfrm>
+            <a:off x="838200" y="6356350"/>
+            <a:ext cx="2743200" cy="365125"/>
+          </a:xfrm>
+        </p:spPr>
+        <p:txBody>
+          <a:bodyPr rtlCol="0"/>
           <a:lstStyle>
             <a:defPPr>
               <a:defRPr lang="es-ES"/>
@@ -15937,51 +16085,35 @@
             <a:pPr rtl="0"/>
             <a:r>
               <a:rPr lang="es-ES" dirty="0"/>
-              <a:t>Desarrollar estrategias ganadoras para seguir a la vanguardia de la competencia</a:t>
-            </a:r>
-          </a:p>
-          <a:p>
-            <a:pPr rtl="0"/>
-            <a:r>
-              <a:rPr lang="es-ES" dirty="0"/>
-              <a:t>​Aprovechar los frutos obtenidos para identificar un valor en el terreno de juego</a:t>
-            </a:r>
-          </a:p>
-          <a:p>
-            <a:pPr rtl="0"/>
-            <a:r>
-              <a:rPr lang="es-ES" dirty="0"/>
-              <a:t>​Visualizar la convergencia dirigida al cliente</a:t>
-            </a:r>
-          </a:p>
-        </p:txBody>
-      </p:sp>
-      <p:sp>
-        <p:nvSpPr>
-          <p:cNvPr id="6" name="Marcador de contenido 5">
-            <a:extLst>
-              <a:ext uri="{FF2B5EF4-FFF2-40B4-BE49-F238E27FC236}">
-                <a16:creationId xmlns:a16="http://schemas.microsoft.com/office/drawing/2014/main" id="{50B65871-FA95-449A-B8BC-90486DE532EF}"/>
-              </a:ext>
-            </a:extLst>
-          </p:cNvPr>
-          <p:cNvSpPr>
-            <a:spLocks noGrp="1"/>
-          </p:cNvSpPr>
-          <p:nvPr>
-            <p:ph sz="quarter" idx="4"/>
-          </p:nvPr>
-        </p:nvSpPr>
-        <p:spPr>
-          <a:xfrm>
-            <a:off x="7410173" y="3834606"/>
-            <a:ext cx="3943627" cy="1997867"/>
-          </a:xfrm>
-        </p:spPr>
-        <p:txBody>
-          <a:bodyPr rtlCol="0">
-            <a:normAutofit/>
-          </a:bodyPr>
+              <a:t>20XX</a:t>
+            </a:r>
+          </a:p>
+        </p:txBody>
+      </p:sp>
+      <p:sp>
+        <p:nvSpPr>
+          <p:cNvPr id="7" name="Marcador de pie de página 6">
+            <a:extLst>
+              <a:ext uri="{FF2B5EF4-FFF2-40B4-BE49-F238E27FC236}">
+                <a16:creationId xmlns:a16="http://schemas.microsoft.com/office/drawing/2014/main" id="{4E98E6AD-9D37-499C-898E-ED12AC36D31D}"/>
+              </a:ext>
+            </a:extLst>
+          </p:cNvPr>
+          <p:cNvSpPr>
+            <a:spLocks noGrp="1"/>
+          </p:cNvSpPr>
+          <p:nvPr>
+            <p:ph type="ftr" sz="quarter" idx="11"/>
+          </p:nvPr>
+        </p:nvSpPr>
+        <p:spPr>
+          <a:xfrm>
+            <a:off x="4038600" y="6356350"/>
+            <a:ext cx="4114800" cy="365125"/>
+          </a:xfrm>
+        </p:spPr>
+        <p:txBody>
+          <a:bodyPr rtlCol="0"/>
           <a:lstStyle>
             <a:defPPr>
               <a:defRPr lang="es-ES"/>
@@ -15991,62 +16123,17 @@
             <a:pPr rtl="0"/>
             <a:r>
               <a:rPr lang="es-ES" dirty="0"/>
-              <a:t>Enfoques iterativos para una estrategia corporativa</a:t>
-            </a:r>
-          </a:p>
-          <a:p>
-            <a:pPr rtl="0"/>
-            <a:r>
-              <a:rPr lang="es-ES" dirty="0"/>
-              <a:t>​Establecer un marco de administración desde dentro</a:t>
-            </a:r>
-          </a:p>
-        </p:txBody>
-      </p:sp>
-      <p:sp>
-        <p:nvSpPr>
-          <p:cNvPr id="8" name="Marcador de pie de página 7">
-            <a:extLst>
-              <a:ext uri="{FF2B5EF4-FFF2-40B4-BE49-F238E27FC236}">
-                <a16:creationId xmlns:a16="http://schemas.microsoft.com/office/drawing/2014/main" id="{905F172A-5D5D-43CD-A187-DA0D303F4144}"/>
-              </a:ext>
-            </a:extLst>
-          </p:cNvPr>
-          <p:cNvSpPr>
-            <a:spLocks noGrp="1"/>
-          </p:cNvSpPr>
-          <p:nvPr>
-            <p:ph type="ftr" sz="quarter" idx="11"/>
-          </p:nvPr>
-        </p:nvSpPr>
-        <p:spPr>
-          <a:xfrm>
-            <a:off x="7324586" y="6250730"/>
-            <a:ext cx="4114800" cy="365125"/>
-          </a:xfrm>
-        </p:spPr>
-        <p:txBody>
-          <a:bodyPr rtlCol="0"/>
-          <a:lstStyle>
-            <a:defPPr>
-              <a:defRPr lang="es-ES"/>
-            </a:defPPr>
-          </a:lstStyle>
-          <a:p>
-            <a:pPr rtl="0"/>
-            <a:r>
-              <a:rPr lang="es-ES" dirty="0"/>
-              <a:t>FORBES HIGHEST PAYING ATHLETES ANALYSIS</a:t>
-            </a:r>
-          </a:p>
-        </p:txBody>
-      </p:sp>
-      <p:sp>
-        <p:nvSpPr>
-          <p:cNvPr id="9" name="Marcador de número de diapositiva 8">
-            <a:extLst>
-              <a:ext uri="{FF2B5EF4-FFF2-40B4-BE49-F238E27FC236}">
-                <a16:creationId xmlns:a16="http://schemas.microsoft.com/office/drawing/2014/main" id="{C396FFDC-ADE8-4009-A466-A81787258E88}"/>
+              <a:t>TÍTULO DE LA PRESENTACIÓN</a:t>
+            </a:r>
+          </a:p>
+        </p:txBody>
+      </p:sp>
+      <p:sp>
+        <p:nvSpPr>
+          <p:cNvPr id="8" name="Marcador de número de diapositiva 7">
+            <a:extLst>
+              <a:ext uri="{FF2B5EF4-FFF2-40B4-BE49-F238E27FC236}">
+                <a16:creationId xmlns:a16="http://schemas.microsoft.com/office/drawing/2014/main" id="{92908AF9-2A07-4B50-BC13-471792106EC8}"/>
               </a:ext>
             </a:extLst>
           </p:cNvPr>
@@ -16086,7 +16173,7 @@
           <p:cNvPr id="12" name="Picture 11">
             <a:extLst>
               <a:ext uri="{FF2B5EF4-FFF2-40B4-BE49-F238E27FC236}">
-                <a16:creationId xmlns:a16="http://schemas.microsoft.com/office/drawing/2014/main" id="{6A1B3BD1-61A8-5FB1-E2CA-6B055E9BE4D3}"/>
+                <a16:creationId xmlns:a16="http://schemas.microsoft.com/office/drawing/2014/main" id="{A612C06D-D748-DBF6-C6F2-9FD984C2E43C}"/>
               </a:ext>
             </a:extLst>
           </p:cNvPr>
@@ -16095,16 +16182,15 @@
           </p:cNvPicPr>
           <p:nvPr/>
         </p:nvPicPr>
-        <p:blipFill>
+        <p:blipFill rotWithShape="1">
           <a:blip r:embed="rId3"/>
-          <a:stretch>
-            <a:fillRect/>
-          </a:stretch>
+          <a:srcRect l="1029" t="899" r="4413" b="4063"/>
+          <a:stretch/>
         </p:blipFill>
         <p:spPr>
           <a:xfrm>
-            <a:off x="1327199" y="33558"/>
-            <a:ext cx="6909257" cy="6687917"/>
+            <a:off x="331694" y="1564341"/>
+            <a:ext cx="11528612" cy="4173071"/>
           </a:xfrm>
           <a:prstGeom prst="rect">
             <a:avLst/>
@@ -16114,7 +16200,7 @@
     </p:spTree>
     <p:extLst>
       <p:ext uri="{BB962C8B-B14F-4D97-AF65-F5344CB8AC3E}">
-        <p14:creationId xmlns:p14="http://schemas.microsoft.com/office/powerpoint/2010/main" val="367634751"/>
+        <p14:creationId xmlns:p14="http://schemas.microsoft.com/office/powerpoint/2010/main" val="2896385493"/>
       </p:ext>
     </p:extLst>
   </p:cSld>
@@ -16308,7 +16394,7 @@
           <p:cNvPr id="2" name="Título 1">
             <a:extLst>
               <a:ext uri="{FF2B5EF4-FFF2-40B4-BE49-F238E27FC236}">
-                <a16:creationId xmlns:a16="http://schemas.microsoft.com/office/drawing/2014/main" id="{42DD0E59-4C68-4F87-9821-23C69713D980}"/>
+                <a16:creationId xmlns:a16="http://schemas.microsoft.com/office/drawing/2014/main" id="{09140014-73D5-419B-8867-972BB18D52D4}"/>
               </a:ext>
             </a:extLst>
           </p:cNvPr>
@@ -16321,7 +16407,7 @@
         </p:nvSpPr>
         <p:spPr>
           <a:xfrm>
-            <a:off x="1885156" y="892177"/>
+            <a:off x="2933700" y="892177"/>
             <a:ext cx="8421688" cy="1325563"/>
           </a:xfrm>
         </p:spPr>
@@ -16336,35 +16422,37 @@
             <a:pPr rtl="0"/>
             <a:r>
               <a:rPr lang="es-ES" dirty="0"/>
-              <a:t>Conclusions</a:t>
-            </a:r>
-          </a:p>
-        </p:txBody>
-      </p:sp>
-      <p:sp>
-        <p:nvSpPr>
-          <p:cNvPr id="56" name="Marcador de fecha 55">
-            <a:extLst>
-              <a:ext uri="{FF2B5EF4-FFF2-40B4-BE49-F238E27FC236}">
-                <a16:creationId xmlns:a16="http://schemas.microsoft.com/office/drawing/2014/main" id="{B289356A-BDA0-4234-84F2-9F2F25D0D7BD}"/>
-              </a:ext>
-            </a:extLst>
-          </p:cNvPr>
-          <p:cNvSpPr>
-            <a:spLocks noGrp="1"/>
-          </p:cNvSpPr>
-          <p:nvPr>
-            <p:ph type="dt" sz="half" idx="10"/>
-          </p:nvPr>
-        </p:nvSpPr>
-        <p:spPr>
-          <a:xfrm>
-            <a:off x="838200" y="6356350"/>
-            <a:ext cx="2743200" cy="365125"/>
-          </a:xfrm>
-        </p:spPr>
-        <p:txBody>
-          <a:bodyPr rtlCol="0"/>
+              <a:t>ÁREAS DE ENFOQUE</a:t>
+            </a:r>
+          </a:p>
+        </p:txBody>
+      </p:sp>
+      <p:sp>
+        <p:nvSpPr>
+          <p:cNvPr id="4" name="Marcador de contenido 3">
+            <a:extLst>
+              <a:ext uri="{FF2B5EF4-FFF2-40B4-BE49-F238E27FC236}">
+                <a16:creationId xmlns:a16="http://schemas.microsoft.com/office/drawing/2014/main" id="{33D8731E-4977-402E-8BFD-895B4D0544CC}"/>
+              </a:ext>
+            </a:extLst>
+          </p:cNvPr>
+          <p:cNvSpPr>
+            <a:spLocks noGrp="1"/>
+          </p:cNvSpPr>
+          <p:nvPr>
+            <p:ph sz="half" idx="2"/>
+          </p:nvPr>
+        </p:nvSpPr>
+        <p:spPr>
+          <a:xfrm>
+            <a:off x="2933700" y="3834606"/>
+            <a:ext cx="3924300" cy="1997867"/>
+          </a:xfrm>
+        </p:spPr>
+        <p:txBody>
+          <a:bodyPr rtlCol="0">
+            <a:normAutofit/>
+          </a:bodyPr>
           <a:lstStyle>
             <a:defPPr>
               <a:defRPr lang="es-ES"/>
@@ -16374,35 +16462,51 @@
             <a:pPr rtl="0"/>
             <a:r>
               <a:rPr lang="es-ES" dirty="0"/>
-              <a:t>20XX</a:t>
-            </a:r>
-          </a:p>
-        </p:txBody>
-      </p:sp>
-      <p:sp>
-        <p:nvSpPr>
-          <p:cNvPr id="57" name="Marcador de pie de página 56">
-            <a:extLst>
-              <a:ext uri="{FF2B5EF4-FFF2-40B4-BE49-F238E27FC236}">
-                <a16:creationId xmlns:a16="http://schemas.microsoft.com/office/drawing/2014/main" id="{3A38BE84-957B-46B9-A315-4B5064DFF1A1}"/>
-              </a:ext>
-            </a:extLst>
-          </p:cNvPr>
-          <p:cNvSpPr>
-            <a:spLocks noGrp="1"/>
-          </p:cNvSpPr>
-          <p:nvPr>
-            <p:ph type="ftr" sz="quarter" idx="11"/>
-          </p:nvPr>
-        </p:nvSpPr>
-        <p:spPr>
-          <a:xfrm>
-            <a:off x="4038600" y="6356350"/>
-            <a:ext cx="4114800" cy="365125"/>
-          </a:xfrm>
-        </p:spPr>
-        <p:txBody>
-          <a:bodyPr rtlCol="0"/>
+              <a:t>Desarrollar estrategias ganadoras para seguir a la vanguardia de la competencia</a:t>
+            </a:r>
+          </a:p>
+          <a:p>
+            <a:pPr rtl="0"/>
+            <a:r>
+              <a:rPr lang="es-ES" dirty="0"/>
+              <a:t>​Aprovechar los frutos obtenidos para identificar un valor en el terreno de juego</a:t>
+            </a:r>
+          </a:p>
+          <a:p>
+            <a:pPr rtl="0"/>
+            <a:r>
+              <a:rPr lang="es-ES" dirty="0"/>
+              <a:t>​Visualizar la convergencia dirigida al cliente</a:t>
+            </a:r>
+          </a:p>
+        </p:txBody>
+      </p:sp>
+      <p:sp>
+        <p:nvSpPr>
+          <p:cNvPr id="6" name="Marcador de contenido 5">
+            <a:extLst>
+              <a:ext uri="{FF2B5EF4-FFF2-40B4-BE49-F238E27FC236}">
+                <a16:creationId xmlns:a16="http://schemas.microsoft.com/office/drawing/2014/main" id="{50B65871-FA95-449A-B8BC-90486DE532EF}"/>
+              </a:ext>
+            </a:extLst>
+          </p:cNvPr>
+          <p:cNvSpPr>
+            <a:spLocks noGrp="1"/>
+          </p:cNvSpPr>
+          <p:nvPr>
+            <p:ph sz="quarter" idx="4"/>
+          </p:nvPr>
+        </p:nvSpPr>
+        <p:spPr>
+          <a:xfrm>
+            <a:off x="7410173" y="3834606"/>
+            <a:ext cx="3943627" cy="1997867"/>
+          </a:xfrm>
+        </p:spPr>
+        <p:txBody>
+          <a:bodyPr rtlCol="0">
+            <a:normAutofit/>
+          </a:bodyPr>
           <a:lstStyle>
             <a:defPPr>
               <a:defRPr lang="es-ES"/>
@@ -16412,17 +16516,62 @@
             <a:pPr rtl="0"/>
             <a:r>
               <a:rPr lang="es-ES" dirty="0"/>
-              <a:t>TÍTULO DE LA PRESENTACIÓN</a:t>
-            </a:r>
-          </a:p>
-        </p:txBody>
-      </p:sp>
-      <p:sp>
-        <p:nvSpPr>
-          <p:cNvPr id="58" name="Marcador de número de diapositiva 57">
-            <a:extLst>
-              <a:ext uri="{FF2B5EF4-FFF2-40B4-BE49-F238E27FC236}">
-                <a16:creationId xmlns:a16="http://schemas.microsoft.com/office/drawing/2014/main" id="{E1900601-8B04-4FF3-B06F-6BEFAC6556D3}"/>
+              <a:t>Enfoques iterativos para una estrategia corporativa</a:t>
+            </a:r>
+          </a:p>
+          <a:p>
+            <a:pPr rtl="0"/>
+            <a:r>
+              <a:rPr lang="es-ES" dirty="0"/>
+              <a:t>​Establecer un marco de administración desde dentro</a:t>
+            </a:r>
+          </a:p>
+        </p:txBody>
+      </p:sp>
+      <p:sp>
+        <p:nvSpPr>
+          <p:cNvPr id="8" name="Marcador de pie de página 7">
+            <a:extLst>
+              <a:ext uri="{FF2B5EF4-FFF2-40B4-BE49-F238E27FC236}">
+                <a16:creationId xmlns:a16="http://schemas.microsoft.com/office/drawing/2014/main" id="{905F172A-5D5D-43CD-A187-DA0D303F4144}"/>
+              </a:ext>
+            </a:extLst>
+          </p:cNvPr>
+          <p:cNvSpPr>
+            <a:spLocks noGrp="1"/>
+          </p:cNvSpPr>
+          <p:nvPr>
+            <p:ph type="ftr" sz="quarter" idx="11"/>
+          </p:nvPr>
+        </p:nvSpPr>
+        <p:spPr>
+          <a:xfrm>
+            <a:off x="7324586" y="6250730"/>
+            <a:ext cx="4114800" cy="365125"/>
+          </a:xfrm>
+        </p:spPr>
+        <p:txBody>
+          <a:bodyPr rtlCol="0"/>
+          <a:lstStyle>
+            <a:defPPr>
+              <a:defRPr lang="es-ES"/>
+            </a:defPPr>
+          </a:lstStyle>
+          <a:p>
+            <a:pPr rtl="0"/>
+            <a:r>
+              <a:rPr lang="es-ES" dirty="0"/>
+              <a:t>FORBES HIGHEST PAYING ATHLETES ANALYSIS</a:t>
+            </a:r>
+          </a:p>
+        </p:txBody>
+      </p:sp>
+      <p:sp>
+        <p:nvSpPr>
+          <p:cNvPr id="9" name="Marcador de número de diapositiva 8">
+            <a:extLst>
+              <a:ext uri="{FF2B5EF4-FFF2-40B4-BE49-F238E27FC236}">
+                <a16:creationId xmlns:a16="http://schemas.microsoft.com/office/drawing/2014/main" id="{C396FFDC-ADE8-4009-A466-A81787258E88}"/>
               </a:ext>
             </a:extLst>
           </p:cNvPr>
@@ -16457,54 +16606,40 @@
           </a:p>
         </p:txBody>
       </p:sp>
-      <p:sp>
-        <p:nvSpPr>
-          <p:cNvPr id="326" name="Marcador de texto 2">
-            <a:extLst>
-              <a:ext uri="{FF2B5EF4-FFF2-40B4-BE49-F238E27FC236}">
-                <a16:creationId xmlns:a16="http://schemas.microsoft.com/office/drawing/2014/main" id="{7B160DB7-BDF4-9939-C740-26EBBB3E0189}"/>
-              </a:ext>
-            </a:extLst>
-          </p:cNvPr>
-          <p:cNvSpPr>
-            <a:spLocks noGrp="1"/>
-          </p:cNvSpPr>
-          <p:nvPr>
-            <p:ph type="body" idx="1"/>
-          </p:nvPr>
-        </p:nvSpPr>
-        <p:spPr>
-          <a:xfrm>
-            <a:off x="1362074" y="2452812"/>
-            <a:ext cx="9605756" cy="2912564"/>
-          </a:xfrm>
-        </p:spPr>
-        <p:txBody>
-          <a:bodyPr rtlCol="0">
-            <a:normAutofit/>
-          </a:bodyPr>
-          <a:lstStyle>
-            <a:defPPr>
-              <a:defRPr lang="es-ES"/>
-            </a:defPPr>
-          </a:lstStyle>
-          <a:p>
-            <a:pPr rtl="0"/>
-            <a:r>
-              <a:rPr lang="es-ES" sz="1400" dirty="0"/>
-              <a:t>ADD CONCLUSIONS HERE</a:t>
-            </a:r>
-          </a:p>
-          <a:p>
-            <a:pPr rtl="0"/>
-            <a:endParaRPr lang="es-ES" sz="1400" dirty="0"/>
-          </a:p>
-        </p:txBody>
-      </p:sp>
+      <p:pic>
+        <p:nvPicPr>
+          <p:cNvPr id="12" name="Picture 11">
+            <a:extLst>
+              <a:ext uri="{FF2B5EF4-FFF2-40B4-BE49-F238E27FC236}">
+                <a16:creationId xmlns:a16="http://schemas.microsoft.com/office/drawing/2014/main" id="{6A1B3BD1-61A8-5FB1-E2CA-6B055E9BE4D3}"/>
+              </a:ext>
+            </a:extLst>
+          </p:cNvPr>
+          <p:cNvPicPr>
+            <a:picLocks noChangeAspect="1"/>
+          </p:cNvPicPr>
+          <p:nvPr/>
+        </p:nvPicPr>
+        <p:blipFill>
+          <a:blip r:embed="rId3"/>
+          <a:stretch>
+            <a:fillRect/>
+          </a:stretch>
+        </p:blipFill>
+        <p:spPr>
+          <a:xfrm>
+            <a:off x="1327199" y="33558"/>
+            <a:ext cx="6909257" cy="6687917"/>
+          </a:xfrm>
+          <a:prstGeom prst="rect">
+            <a:avLst/>
+          </a:prstGeom>
+        </p:spPr>
+      </p:pic>
     </p:spTree>
     <p:extLst>
       <p:ext uri="{BB962C8B-B14F-4D97-AF65-F5344CB8AC3E}">
-        <p14:creationId xmlns:p14="http://schemas.microsoft.com/office/powerpoint/2010/main" val="1007431861"/>
+        <p14:creationId xmlns:p14="http://schemas.microsoft.com/office/powerpoint/2010/main" val="367634751"/>
       </p:ext>
     </p:extLst>
   </p:cSld>
@@ -16536,7 +16671,7 @@
           <p:cNvPr id="2" name="Título 1">
             <a:extLst>
               <a:ext uri="{FF2B5EF4-FFF2-40B4-BE49-F238E27FC236}">
-                <a16:creationId xmlns:a16="http://schemas.microsoft.com/office/drawing/2014/main" id="{09140014-73D5-419B-8867-972BB18D52D4}"/>
+                <a16:creationId xmlns:a16="http://schemas.microsoft.com/office/drawing/2014/main" id="{42DD0E59-4C68-4F87-9821-23C69713D980}"/>
               </a:ext>
             </a:extLst>
           </p:cNvPr>
@@ -16549,7 +16684,7 @@
         </p:nvSpPr>
         <p:spPr>
           <a:xfrm>
-            <a:off x="2933700" y="892177"/>
+            <a:off x="1885156" y="892177"/>
             <a:ext cx="8421688" cy="1325563"/>
           </a:xfrm>
         </p:spPr>
@@ -16564,37 +16699,35 @@
             <a:pPr rtl="0"/>
             <a:r>
               <a:rPr lang="es-ES" dirty="0"/>
-              <a:t>ÁREAS DE ENFOQUE</a:t>
-            </a:r>
-          </a:p>
-        </p:txBody>
-      </p:sp>
-      <p:sp>
-        <p:nvSpPr>
-          <p:cNvPr id="4" name="Marcador de contenido 3">
-            <a:extLst>
-              <a:ext uri="{FF2B5EF4-FFF2-40B4-BE49-F238E27FC236}">
-                <a16:creationId xmlns:a16="http://schemas.microsoft.com/office/drawing/2014/main" id="{33D8731E-4977-402E-8BFD-895B4D0544CC}"/>
-              </a:ext>
-            </a:extLst>
-          </p:cNvPr>
-          <p:cNvSpPr>
-            <a:spLocks noGrp="1"/>
-          </p:cNvSpPr>
-          <p:nvPr>
-            <p:ph sz="half" idx="2"/>
-          </p:nvPr>
-        </p:nvSpPr>
-        <p:spPr>
-          <a:xfrm>
-            <a:off x="2933700" y="3834606"/>
-            <a:ext cx="3924300" cy="1997867"/>
-          </a:xfrm>
-        </p:spPr>
-        <p:txBody>
-          <a:bodyPr rtlCol="0">
-            <a:normAutofit/>
-          </a:bodyPr>
+              <a:t>Conclusions</a:t>
+            </a:r>
+          </a:p>
+        </p:txBody>
+      </p:sp>
+      <p:sp>
+        <p:nvSpPr>
+          <p:cNvPr id="56" name="Marcador de fecha 55">
+            <a:extLst>
+              <a:ext uri="{FF2B5EF4-FFF2-40B4-BE49-F238E27FC236}">
+                <a16:creationId xmlns:a16="http://schemas.microsoft.com/office/drawing/2014/main" id="{B289356A-BDA0-4234-84F2-9F2F25D0D7BD}"/>
+              </a:ext>
+            </a:extLst>
+          </p:cNvPr>
+          <p:cNvSpPr>
+            <a:spLocks noGrp="1"/>
+          </p:cNvSpPr>
+          <p:nvPr>
+            <p:ph type="dt" sz="half" idx="10"/>
+          </p:nvPr>
+        </p:nvSpPr>
+        <p:spPr>
+          <a:xfrm>
+            <a:off x="838200" y="6356350"/>
+            <a:ext cx="2743200" cy="365125"/>
+          </a:xfrm>
+        </p:spPr>
+        <p:txBody>
+          <a:bodyPr rtlCol="0"/>
           <a:lstStyle>
             <a:defPPr>
               <a:defRPr lang="es-ES"/>
@@ -16604,45 +16737,31 @@
             <a:pPr rtl="0"/>
             <a:r>
               <a:rPr lang="es-ES" dirty="0"/>
-              <a:t>Desarrollar estrategias ganadoras para seguir a la vanguardia de la competencia</a:t>
-            </a:r>
-          </a:p>
-          <a:p>
-            <a:pPr rtl="0"/>
-            <a:r>
-              <a:rPr lang="es-ES" dirty="0"/>
-              <a:t>​Aprovechar los frutos obtenidos para identificar un valor en el terreno de juego</a:t>
-            </a:r>
-          </a:p>
-          <a:p>
-            <a:pPr rtl="0"/>
-            <a:r>
-              <a:rPr lang="es-ES" dirty="0"/>
-              <a:t>​Visualizar la convergencia dirigida al cliente</a:t>
-            </a:r>
-          </a:p>
-        </p:txBody>
-      </p:sp>
-      <p:sp>
-        <p:nvSpPr>
-          <p:cNvPr id="5" name="Marcador de texto 4">
-            <a:extLst>
-              <a:ext uri="{FF2B5EF4-FFF2-40B4-BE49-F238E27FC236}">
-                <a16:creationId xmlns:a16="http://schemas.microsoft.com/office/drawing/2014/main" id="{91CDEC5F-B8EE-4BC1-843F-13135E6E7AB2}"/>
-              </a:ext>
-            </a:extLst>
-          </p:cNvPr>
-          <p:cNvSpPr>
-            <a:spLocks noGrp="1"/>
-          </p:cNvSpPr>
-          <p:nvPr>
-            <p:ph type="body" sz="quarter" idx="3"/>
-          </p:nvPr>
-        </p:nvSpPr>
-        <p:spPr>
-          <a:xfrm>
-            <a:off x="7410173" y="2776936"/>
-            <a:ext cx="3943627" cy="823912"/>
+              <a:t>20XX</a:t>
+            </a:r>
+          </a:p>
+        </p:txBody>
+      </p:sp>
+      <p:sp>
+        <p:nvSpPr>
+          <p:cNvPr id="57" name="Marcador de pie de página 56">
+            <a:extLst>
+              <a:ext uri="{FF2B5EF4-FFF2-40B4-BE49-F238E27FC236}">
+                <a16:creationId xmlns:a16="http://schemas.microsoft.com/office/drawing/2014/main" id="{3A38BE84-957B-46B9-A315-4B5064DFF1A1}"/>
+              </a:ext>
+            </a:extLst>
+          </p:cNvPr>
+          <p:cNvSpPr>
+            <a:spLocks noGrp="1"/>
+          </p:cNvSpPr>
+          <p:nvPr>
+            <p:ph type="ftr" sz="quarter" idx="11"/>
+          </p:nvPr>
+        </p:nvSpPr>
+        <p:spPr>
+          <a:xfrm>
+            <a:off x="4038600" y="6356350"/>
+            <a:ext cx="4114800" cy="365125"/>
           </a:xfrm>
         </p:spPr>
         <p:txBody>
@@ -16656,64 +16775,17 @@
             <a:pPr rtl="0"/>
             <a:r>
               <a:rPr lang="es-ES" dirty="0"/>
-              <a:t>OPORTUNIDADES BASADAS EN LA NUBE</a:t>
-            </a:r>
-          </a:p>
-        </p:txBody>
-      </p:sp>
-      <p:sp>
-        <p:nvSpPr>
-          <p:cNvPr id="6" name="Marcador de contenido 5">
-            <a:extLst>
-              <a:ext uri="{FF2B5EF4-FFF2-40B4-BE49-F238E27FC236}">
-                <a16:creationId xmlns:a16="http://schemas.microsoft.com/office/drawing/2014/main" id="{50B65871-FA95-449A-B8BC-90486DE532EF}"/>
-              </a:ext>
-            </a:extLst>
-          </p:cNvPr>
-          <p:cNvSpPr>
-            <a:spLocks noGrp="1"/>
-          </p:cNvSpPr>
-          <p:nvPr>
-            <p:ph sz="quarter" idx="4"/>
-          </p:nvPr>
-        </p:nvSpPr>
-        <p:spPr>
-          <a:xfrm>
-            <a:off x="10214890" y="3494485"/>
-            <a:ext cx="3724947" cy="1910727"/>
-          </a:xfrm>
-        </p:spPr>
-        <p:txBody>
-          <a:bodyPr rtlCol="0">
-            <a:normAutofit/>
-          </a:bodyPr>
-          <a:lstStyle>
-            <a:defPPr>
-              <a:defRPr lang="es-ES"/>
-            </a:defPPr>
-          </a:lstStyle>
-          <a:p>
-            <a:pPr rtl="0"/>
-            <a:r>
-              <a:rPr lang="es-ES" dirty="0"/>
-              <a:t>Enfoques iterativos para una estrategia corporativa</a:t>
-            </a:r>
-          </a:p>
-          <a:p>
-            <a:pPr rtl="0"/>
-            <a:r>
-              <a:rPr lang="es-ES" dirty="0"/>
-              <a:t>​Establecer un marco de administración desde dentro</a:t>
-            </a:r>
-          </a:p>
-        </p:txBody>
-      </p:sp>
-      <p:sp>
-        <p:nvSpPr>
-          <p:cNvPr id="9" name="Marcador de número de diapositiva 8">
-            <a:extLst>
-              <a:ext uri="{FF2B5EF4-FFF2-40B4-BE49-F238E27FC236}">
-                <a16:creationId xmlns:a16="http://schemas.microsoft.com/office/drawing/2014/main" id="{C396FFDC-ADE8-4009-A466-A81787258E88}"/>
+              <a:t>TÍTULO DE LA PRESENTACIÓN</a:t>
+            </a:r>
+          </a:p>
+        </p:txBody>
+      </p:sp>
+      <p:sp>
+        <p:nvSpPr>
+          <p:cNvPr id="58" name="Marcador de número de diapositiva 57">
+            <a:extLst>
+              <a:ext uri="{FF2B5EF4-FFF2-40B4-BE49-F238E27FC236}">
+                <a16:creationId xmlns:a16="http://schemas.microsoft.com/office/drawing/2014/main" id="{E1900601-8B04-4FF3-B06F-6BEFAC6556D3}"/>
               </a:ext>
             </a:extLst>
           </p:cNvPr>
@@ -16750,28 +16822,30 @@
       </p:sp>
       <p:sp>
         <p:nvSpPr>
-          <p:cNvPr id="15" name="Marcador de pie de página 4">
-            <a:extLst>
-              <a:ext uri="{FF2B5EF4-FFF2-40B4-BE49-F238E27FC236}">
-                <a16:creationId xmlns:a16="http://schemas.microsoft.com/office/drawing/2014/main" id="{D03417DB-B8B1-A6C2-EC39-D9E06005B059}"/>
-              </a:ext>
-            </a:extLst>
-          </p:cNvPr>
-          <p:cNvSpPr>
-            <a:spLocks noGrp="1"/>
-          </p:cNvSpPr>
-          <p:nvPr>
-            <p:ph type="ftr" sz="quarter" idx="11"/>
-          </p:nvPr>
-        </p:nvSpPr>
-        <p:spPr>
-          <a:xfrm>
-            <a:off x="2463800" y="6356350"/>
-            <a:ext cx="3479800" cy="365125"/>
-          </a:xfrm>
-        </p:spPr>
-        <p:txBody>
-          <a:bodyPr rtlCol="0"/>
+          <p:cNvPr id="326" name="Marcador de texto 2">
+            <a:extLst>
+              <a:ext uri="{FF2B5EF4-FFF2-40B4-BE49-F238E27FC236}">
+                <a16:creationId xmlns:a16="http://schemas.microsoft.com/office/drawing/2014/main" id="{7B160DB7-BDF4-9939-C740-26EBBB3E0189}"/>
+              </a:ext>
+            </a:extLst>
+          </p:cNvPr>
+          <p:cNvSpPr>
+            <a:spLocks noGrp="1"/>
+          </p:cNvSpPr>
+          <p:nvPr>
+            <p:ph type="body" idx="1"/>
+          </p:nvPr>
+        </p:nvSpPr>
+        <p:spPr>
+          <a:xfrm>
+            <a:off x="1362074" y="2452812"/>
+            <a:ext cx="9605756" cy="2912564"/>
+          </a:xfrm>
+        </p:spPr>
+        <p:txBody>
+          <a:bodyPr rtlCol="0">
+            <a:normAutofit/>
+          </a:bodyPr>
           <a:lstStyle>
             <a:defPPr>
               <a:defRPr lang="es-ES"/>
@@ -16780,110 +16854,20 @@
           <a:p>
             <a:pPr rtl="0"/>
             <a:r>
-              <a:rPr lang="es-ES" dirty="0"/>
-              <a:t>FORBES HIGHEST PAYING ATHLETES ANALYSIS</a:t>
-            </a:r>
-          </a:p>
-        </p:txBody>
-      </p:sp>
-      <p:pic>
-        <p:nvPicPr>
-          <p:cNvPr id="3074" name="Picture 2">
-            <a:extLst>
-              <a:ext uri="{FF2B5EF4-FFF2-40B4-BE49-F238E27FC236}">
-                <a16:creationId xmlns:a16="http://schemas.microsoft.com/office/drawing/2014/main" id="{A006EAF0-CE30-5E85-45FF-109E2EAD59B7}"/>
-              </a:ext>
-            </a:extLst>
-          </p:cNvPr>
-          <p:cNvPicPr>
-            <a:picLocks noChangeAspect="1" noChangeArrowheads="1"/>
-          </p:cNvPicPr>
-          <p:nvPr/>
-        </p:nvPicPr>
-        <p:blipFill>
-          <a:blip r:embed="rId3">
-            <a:extLst>
-              <a:ext uri="{28A0092B-C50C-407E-A947-70E740481C1C}">
-                <a14:useLocalDpi xmlns:a14="http://schemas.microsoft.com/office/drawing/2010/main" val="0"/>
-              </a:ext>
-            </a:extLst>
-          </a:blip>
-          <a:srcRect/>
-          <a:stretch>
-            <a:fillRect/>
-          </a:stretch>
-        </p:blipFill>
-        <p:spPr bwMode="auto">
-          <a:xfrm>
-            <a:off x="965243" y="502842"/>
-            <a:ext cx="4920177" cy="4946488"/>
-          </a:xfrm>
-          <a:prstGeom prst="rect">
-            <a:avLst/>
-          </a:prstGeom>
-          <a:noFill/>
-          <a:extLst>
-            <a:ext uri="{909E8E84-426E-40DD-AFC4-6F175D3DCCD1}">
-              <a14:hiddenFill xmlns:a14="http://schemas.microsoft.com/office/drawing/2010/main">
-                <a:solidFill>
-                  <a:srgbClr val="FFFFFF"/>
-                </a:solidFill>
-              </a14:hiddenFill>
-            </a:ext>
-          </a:extLst>
-        </p:spPr>
-      </p:pic>
-      <p:pic>
-        <p:nvPicPr>
-          <p:cNvPr id="3078" name="Picture 6">
-            <a:extLst>
-              <a:ext uri="{FF2B5EF4-FFF2-40B4-BE49-F238E27FC236}">
-                <a16:creationId xmlns:a16="http://schemas.microsoft.com/office/drawing/2014/main" id="{DF37C092-D923-2FA0-C69F-47732B0C3DF6}"/>
-              </a:ext>
-            </a:extLst>
-          </p:cNvPr>
-          <p:cNvPicPr>
-            <a:picLocks noChangeAspect="1" noChangeArrowheads="1"/>
-          </p:cNvPicPr>
-          <p:nvPr/>
-        </p:nvPicPr>
-        <p:blipFill>
-          <a:blip r:embed="rId4">
-            <a:extLst>
-              <a:ext uri="{28A0092B-C50C-407E-A947-70E740481C1C}">
-                <a14:useLocalDpi xmlns:a14="http://schemas.microsoft.com/office/drawing/2010/main" val="0"/>
-              </a:ext>
-            </a:extLst>
-          </a:blip>
-          <a:srcRect/>
-          <a:stretch>
-            <a:fillRect/>
-          </a:stretch>
-        </p:blipFill>
-        <p:spPr bwMode="auto">
-          <a:xfrm>
-            <a:off x="6306582" y="502843"/>
-            <a:ext cx="5071932" cy="4946487"/>
-          </a:xfrm>
-          <a:prstGeom prst="rect">
-            <a:avLst/>
-          </a:prstGeom>
-          <a:noFill/>
-          <a:extLst>
-            <a:ext uri="{909E8E84-426E-40DD-AFC4-6F175D3DCCD1}">
-              <a14:hiddenFill xmlns:a14="http://schemas.microsoft.com/office/drawing/2010/main">
-                <a:solidFill>
-                  <a:srgbClr val="FFFFFF"/>
-                </a:solidFill>
-              </a14:hiddenFill>
-            </a:ext>
-          </a:extLst>
-        </p:spPr>
-      </p:pic>
+              <a:rPr lang="es-ES" sz="1400" dirty="0"/>
+              <a:t>ADD CONCLUSIONS HERE</a:t>
+            </a:r>
+          </a:p>
+          <a:p>
+            <a:pPr rtl="0"/>
+            <a:endParaRPr lang="es-ES" sz="1400" dirty="0"/>
+          </a:p>
+        </p:txBody>
+      </p:sp>
     </p:spTree>
     <p:extLst>
       <p:ext uri="{BB962C8B-B14F-4D97-AF65-F5344CB8AC3E}">
-        <p14:creationId xmlns:p14="http://schemas.microsoft.com/office/powerpoint/2010/main" val="2262251188"/>
+        <p14:creationId xmlns:p14="http://schemas.microsoft.com/office/powerpoint/2010/main" val="1007431861"/>
       </p:ext>
     </p:extLst>
   </p:cSld>
@@ -16915,21 +16899,21 @@
           <p:cNvPr id="2" name="Título 1">
             <a:extLst>
               <a:ext uri="{FF2B5EF4-FFF2-40B4-BE49-F238E27FC236}">
-                <a16:creationId xmlns:a16="http://schemas.microsoft.com/office/drawing/2014/main" id="{B1FE5F11-B7B9-4B80-8C6A-A8A7A7190B77}"/>
-              </a:ext>
-            </a:extLst>
-          </p:cNvPr>
-          <p:cNvSpPr>
-            <a:spLocks noGrp="1"/>
-          </p:cNvSpPr>
-          <p:nvPr>
-            <p:ph type="ctrTitle"/>
-          </p:nvPr>
-        </p:nvSpPr>
-        <p:spPr>
-          <a:xfrm>
-            <a:off x="6458964" y="2945452"/>
-            <a:ext cx="5074920" cy="967095"/>
+                <a16:creationId xmlns:a16="http://schemas.microsoft.com/office/drawing/2014/main" id="{09140014-73D5-419B-8867-972BB18D52D4}"/>
+              </a:ext>
+            </a:extLst>
+          </p:cNvPr>
+          <p:cNvSpPr>
+            <a:spLocks noGrp="1"/>
+          </p:cNvSpPr>
+          <p:nvPr>
+            <p:ph type="title"/>
+          </p:nvPr>
+        </p:nvSpPr>
+        <p:spPr>
+          <a:xfrm>
+            <a:off x="2933700" y="892177"/>
+            <a:ext cx="8421688" cy="1325563"/>
           </a:xfrm>
         </p:spPr>
         <p:txBody>
@@ -16942,16 +16926,327 @@
           <a:p>
             <a:pPr rtl="0"/>
             <a:r>
-              <a:rPr lang="en-US" sz="2800" dirty="0"/>
-              <a:t>Limitations and next steps</a:t>
-            </a:r>
-          </a:p>
-        </p:txBody>
-      </p:sp>
+              <a:rPr lang="es-ES" dirty="0"/>
+              <a:t>ÁREAS DE ENFOQUE</a:t>
+            </a:r>
+          </a:p>
+        </p:txBody>
+      </p:sp>
+      <p:sp>
+        <p:nvSpPr>
+          <p:cNvPr id="4" name="Marcador de contenido 3">
+            <a:extLst>
+              <a:ext uri="{FF2B5EF4-FFF2-40B4-BE49-F238E27FC236}">
+                <a16:creationId xmlns:a16="http://schemas.microsoft.com/office/drawing/2014/main" id="{33D8731E-4977-402E-8BFD-895B4D0544CC}"/>
+              </a:ext>
+            </a:extLst>
+          </p:cNvPr>
+          <p:cNvSpPr>
+            <a:spLocks noGrp="1"/>
+          </p:cNvSpPr>
+          <p:nvPr>
+            <p:ph sz="half" idx="2"/>
+          </p:nvPr>
+        </p:nvSpPr>
+        <p:spPr>
+          <a:xfrm>
+            <a:off x="2933700" y="3834606"/>
+            <a:ext cx="3924300" cy="1997867"/>
+          </a:xfrm>
+        </p:spPr>
+        <p:txBody>
+          <a:bodyPr rtlCol="0">
+            <a:normAutofit/>
+          </a:bodyPr>
+          <a:lstStyle>
+            <a:defPPr>
+              <a:defRPr lang="es-ES"/>
+            </a:defPPr>
+          </a:lstStyle>
+          <a:p>
+            <a:pPr rtl="0"/>
+            <a:r>
+              <a:rPr lang="es-ES" dirty="0"/>
+              <a:t>Desarrollar estrategias ganadoras para seguir a la vanguardia de la competencia</a:t>
+            </a:r>
+          </a:p>
+          <a:p>
+            <a:pPr rtl="0"/>
+            <a:r>
+              <a:rPr lang="es-ES" dirty="0"/>
+              <a:t>​Aprovechar los frutos obtenidos para identificar un valor en el terreno de juego</a:t>
+            </a:r>
+          </a:p>
+          <a:p>
+            <a:pPr rtl="0"/>
+            <a:r>
+              <a:rPr lang="es-ES" dirty="0"/>
+              <a:t>​Visualizar la convergencia dirigida al cliente</a:t>
+            </a:r>
+          </a:p>
+        </p:txBody>
+      </p:sp>
+      <p:sp>
+        <p:nvSpPr>
+          <p:cNvPr id="5" name="Marcador de texto 4">
+            <a:extLst>
+              <a:ext uri="{FF2B5EF4-FFF2-40B4-BE49-F238E27FC236}">
+                <a16:creationId xmlns:a16="http://schemas.microsoft.com/office/drawing/2014/main" id="{91CDEC5F-B8EE-4BC1-843F-13135E6E7AB2}"/>
+              </a:ext>
+            </a:extLst>
+          </p:cNvPr>
+          <p:cNvSpPr>
+            <a:spLocks noGrp="1"/>
+          </p:cNvSpPr>
+          <p:nvPr>
+            <p:ph type="body" sz="quarter" idx="3"/>
+          </p:nvPr>
+        </p:nvSpPr>
+        <p:spPr>
+          <a:xfrm>
+            <a:off x="7410173" y="2776936"/>
+            <a:ext cx="3943627" cy="823912"/>
+          </a:xfrm>
+        </p:spPr>
+        <p:txBody>
+          <a:bodyPr rtlCol="0"/>
+          <a:lstStyle>
+            <a:defPPr>
+              <a:defRPr lang="es-ES"/>
+            </a:defPPr>
+          </a:lstStyle>
+          <a:p>
+            <a:pPr rtl="0"/>
+            <a:r>
+              <a:rPr lang="es-ES" dirty="0"/>
+              <a:t>OPORTUNIDADES BASADAS EN LA NUBE</a:t>
+            </a:r>
+          </a:p>
+        </p:txBody>
+      </p:sp>
+      <p:sp>
+        <p:nvSpPr>
+          <p:cNvPr id="6" name="Marcador de contenido 5">
+            <a:extLst>
+              <a:ext uri="{FF2B5EF4-FFF2-40B4-BE49-F238E27FC236}">
+                <a16:creationId xmlns:a16="http://schemas.microsoft.com/office/drawing/2014/main" id="{50B65871-FA95-449A-B8BC-90486DE532EF}"/>
+              </a:ext>
+            </a:extLst>
+          </p:cNvPr>
+          <p:cNvSpPr>
+            <a:spLocks noGrp="1"/>
+          </p:cNvSpPr>
+          <p:nvPr>
+            <p:ph sz="quarter" idx="4"/>
+          </p:nvPr>
+        </p:nvSpPr>
+        <p:spPr>
+          <a:xfrm>
+            <a:off x="10214890" y="3494485"/>
+            <a:ext cx="3724947" cy="1910727"/>
+          </a:xfrm>
+        </p:spPr>
+        <p:txBody>
+          <a:bodyPr rtlCol="0">
+            <a:normAutofit/>
+          </a:bodyPr>
+          <a:lstStyle>
+            <a:defPPr>
+              <a:defRPr lang="es-ES"/>
+            </a:defPPr>
+          </a:lstStyle>
+          <a:p>
+            <a:pPr rtl="0"/>
+            <a:r>
+              <a:rPr lang="es-ES" dirty="0"/>
+              <a:t>Enfoques iterativos para una estrategia corporativa</a:t>
+            </a:r>
+          </a:p>
+          <a:p>
+            <a:pPr rtl="0"/>
+            <a:r>
+              <a:rPr lang="es-ES" dirty="0"/>
+              <a:t>​Establecer un marco de administración desde dentro</a:t>
+            </a:r>
+          </a:p>
+        </p:txBody>
+      </p:sp>
+      <p:sp>
+        <p:nvSpPr>
+          <p:cNvPr id="9" name="Marcador de número de diapositiva 8">
+            <a:extLst>
+              <a:ext uri="{FF2B5EF4-FFF2-40B4-BE49-F238E27FC236}">
+                <a16:creationId xmlns:a16="http://schemas.microsoft.com/office/drawing/2014/main" id="{C396FFDC-ADE8-4009-A466-A81787258E88}"/>
+              </a:ext>
+            </a:extLst>
+          </p:cNvPr>
+          <p:cNvSpPr>
+            <a:spLocks noGrp="1"/>
+          </p:cNvSpPr>
+          <p:nvPr>
+            <p:ph type="sldNum" sz="quarter" idx="12"/>
+          </p:nvPr>
+        </p:nvSpPr>
+        <p:spPr>
+          <a:xfrm>
+            <a:off x="8610600" y="6356350"/>
+            <a:ext cx="2743200" cy="365125"/>
+          </a:xfrm>
+        </p:spPr>
+        <p:txBody>
+          <a:bodyPr rtlCol="0"/>
+          <a:lstStyle>
+            <a:defPPr>
+              <a:defRPr lang="es-ES"/>
+            </a:defPPr>
+          </a:lstStyle>
+          <a:p>
+            <a:pPr rtl="0"/>
+            <a:fld id="{A49DFD55-3C28-40EF-9E31-A92D2E4017FF}" type="slidenum">
+              <a:rPr lang="es-ES" smtClean="0"/>
+              <a:pPr rtl="0"/>
+              <a:t>22</a:t>
+            </a:fld>
+            <a:endParaRPr lang="es-ES" dirty="0"/>
+          </a:p>
+        </p:txBody>
+      </p:sp>
+      <p:sp>
+        <p:nvSpPr>
+          <p:cNvPr id="15" name="Marcador de pie de página 4">
+            <a:extLst>
+              <a:ext uri="{FF2B5EF4-FFF2-40B4-BE49-F238E27FC236}">
+                <a16:creationId xmlns:a16="http://schemas.microsoft.com/office/drawing/2014/main" id="{D03417DB-B8B1-A6C2-EC39-D9E06005B059}"/>
+              </a:ext>
+            </a:extLst>
+          </p:cNvPr>
+          <p:cNvSpPr>
+            <a:spLocks noGrp="1"/>
+          </p:cNvSpPr>
+          <p:nvPr>
+            <p:ph type="ftr" sz="quarter" idx="11"/>
+          </p:nvPr>
+        </p:nvSpPr>
+        <p:spPr>
+          <a:xfrm>
+            <a:off x="2463800" y="6356350"/>
+            <a:ext cx="3479800" cy="365125"/>
+          </a:xfrm>
+        </p:spPr>
+        <p:txBody>
+          <a:bodyPr rtlCol="0"/>
+          <a:lstStyle>
+            <a:defPPr>
+              <a:defRPr lang="es-ES"/>
+            </a:defPPr>
+          </a:lstStyle>
+          <a:p>
+            <a:pPr rtl="0"/>
+            <a:r>
+              <a:rPr lang="es-ES" dirty="0"/>
+              <a:t>FORBES HIGHEST PAYING ATHLETES ANALYSIS</a:t>
+            </a:r>
+          </a:p>
+        </p:txBody>
+      </p:sp>
+      <p:pic>
+        <p:nvPicPr>
+          <p:cNvPr id="3074" name="Picture 2">
+            <a:extLst>
+              <a:ext uri="{FF2B5EF4-FFF2-40B4-BE49-F238E27FC236}">
+                <a16:creationId xmlns:a16="http://schemas.microsoft.com/office/drawing/2014/main" id="{A006EAF0-CE30-5E85-45FF-109E2EAD59B7}"/>
+              </a:ext>
+            </a:extLst>
+          </p:cNvPr>
+          <p:cNvPicPr>
+            <a:picLocks noChangeAspect="1" noChangeArrowheads="1"/>
+          </p:cNvPicPr>
+          <p:nvPr/>
+        </p:nvPicPr>
+        <p:blipFill>
+          <a:blip r:embed="rId3">
+            <a:extLst>
+              <a:ext uri="{28A0092B-C50C-407E-A947-70E740481C1C}">
+                <a14:useLocalDpi xmlns:a14="http://schemas.microsoft.com/office/drawing/2010/main" val="0"/>
+              </a:ext>
+            </a:extLst>
+          </a:blip>
+          <a:srcRect/>
+          <a:stretch>
+            <a:fillRect/>
+          </a:stretch>
+        </p:blipFill>
+        <p:spPr bwMode="auto">
+          <a:xfrm>
+            <a:off x="965243" y="502842"/>
+            <a:ext cx="4920177" cy="4946488"/>
+          </a:xfrm>
+          <a:prstGeom prst="rect">
+            <a:avLst/>
+          </a:prstGeom>
+          <a:noFill/>
+          <a:extLst>
+            <a:ext uri="{909E8E84-426E-40DD-AFC4-6F175D3DCCD1}">
+              <a14:hiddenFill xmlns:a14="http://schemas.microsoft.com/office/drawing/2010/main">
+                <a:solidFill>
+                  <a:srgbClr val="FFFFFF"/>
+                </a:solidFill>
+              </a14:hiddenFill>
+            </a:ext>
+          </a:extLst>
+        </p:spPr>
+      </p:pic>
+      <p:pic>
+        <p:nvPicPr>
+          <p:cNvPr id="3078" name="Picture 6">
+            <a:extLst>
+              <a:ext uri="{FF2B5EF4-FFF2-40B4-BE49-F238E27FC236}">
+                <a16:creationId xmlns:a16="http://schemas.microsoft.com/office/drawing/2014/main" id="{DF37C092-D923-2FA0-C69F-47732B0C3DF6}"/>
+              </a:ext>
+            </a:extLst>
+          </p:cNvPr>
+          <p:cNvPicPr>
+            <a:picLocks noChangeAspect="1" noChangeArrowheads="1"/>
+          </p:cNvPicPr>
+          <p:nvPr/>
+        </p:nvPicPr>
+        <p:blipFill>
+          <a:blip r:embed="rId4">
+            <a:extLst>
+              <a:ext uri="{28A0092B-C50C-407E-A947-70E740481C1C}">
+                <a14:useLocalDpi xmlns:a14="http://schemas.microsoft.com/office/drawing/2010/main" val="0"/>
+              </a:ext>
+            </a:extLst>
+          </a:blip>
+          <a:srcRect/>
+          <a:stretch>
+            <a:fillRect/>
+          </a:stretch>
+        </p:blipFill>
+        <p:spPr bwMode="auto">
+          <a:xfrm>
+            <a:off x="6306582" y="502843"/>
+            <a:ext cx="5071932" cy="4946487"/>
+          </a:xfrm>
+          <a:prstGeom prst="rect">
+            <a:avLst/>
+          </a:prstGeom>
+          <a:noFill/>
+          <a:extLst>
+            <a:ext uri="{909E8E84-426E-40DD-AFC4-6F175D3DCCD1}">
+              <a14:hiddenFill xmlns:a14="http://schemas.microsoft.com/office/drawing/2010/main">
+                <a:solidFill>
+                  <a:srgbClr val="FFFFFF"/>
+                </a:solidFill>
+              </a14:hiddenFill>
+            </a:ext>
+          </a:extLst>
+        </p:spPr>
+      </p:pic>
     </p:spTree>
     <p:extLst>
       <p:ext uri="{BB962C8B-B14F-4D97-AF65-F5344CB8AC3E}">
-        <p14:creationId xmlns:p14="http://schemas.microsoft.com/office/powerpoint/2010/main" val="3671601111"/>
+        <p14:creationId xmlns:p14="http://schemas.microsoft.com/office/powerpoint/2010/main" val="2262251188"/>
       </p:ext>
     </p:extLst>
   </p:cSld>
@@ -16983,21 +17278,21 @@
           <p:cNvPr id="2" name="Título 1">
             <a:extLst>
               <a:ext uri="{FF2B5EF4-FFF2-40B4-BE49-F238E27FC236}">
-                <a16:creationId xmlns:a16="http://schemas.microsoft.com/office/drawing/2014/main" id="{4518FC28-E0BD-4387-B8BE-9965D1A57FF1}"/>
-              </a:ext>
-            </a:extLst>
-          </p:cNvPr>
-          <p:cNvSpPr>
-            <a:spLocks noGrp="1"/>
-          </p:cNvSpPr>
-          <p:nvPr>
-            <p:ph type="title"/>
-          </p:nvPr>
-        </p:nvSpPr>
-        <p:spPr>
-          <a:xfrm>
-            <a:off x="5428430" y="502056"/>
-            <a:ext cx="5111750" cy="1204912"/>
+                <a16:creationId xmlns:a16="http://schemas.microsoft.com/office/drawing/2014/main" id="{B1FE5F11-B7B9-4B80-8C6A-A8A7A7190B77}"/>
+              </a:ext>
+            </a:extLst>
+          </p:cNvPr>
+          <p:cNvSpPr>
+            <a:spLocks noGrp="1"/>
+          </p:cNvSpPr>
+          <p:nvPr>
+            <p:ph type="ctrTitle"/>
+          </p:nvPr>
+        </p:nvSpPr>
+        <p:spPr>
+          <a:xfrm>
+            <a:off x="6458964" y="2945452"/>
+            <a:ext cx="5074920" cy="967095"/>
           </a:xfrm>
         </p:spPr>
         <p:txBody>
@@ -17010,195 +17305,16 @@
           <a:p>
             <a:pPr rtl="0"/>
             <a:r>
-              <a:rPr lang="es-ES" dirty="0"/>
-              <a:t>limitations</a:t>
-            </a:r>
-          </a:p>
-        </p:txBody>
-      </p:sp>
-      <p:sp>
-        <p:nvSpPr>
-          <p:cNvPr id="3" name="Marcador de texto 2">
-            <a:extLst>
-              <a:ext uri="{FF2B5EF4-FFF2-40B4-BE49-F238E27FC236}">
-                <a16:creationId xmlns:a16="http://schemas.microsoft.com/office/drawing/2014/main" id="{FED19BCA-B61F-4EA6-A1FB-CCA3BD8506FB}"/>
-              </a:ext>
-            </a:extLst>
-          </p:cNvPr>
-          <p:cNvSpPr>
-            <a:spLocks noGrp="1"/>
-          </p:cNvSpPr>
-          <p:nvPr>
-            <p:ph type="body" idx="1"/>
-          </p:nvPr>
-        </p:nvSpPr>
-        <p:spPr>
-          <a:xfrm>
-            <a:off x="5428430" y="2094275"/>
-            <a:ext cx="5550426" cy="2592781"/>
-          </a:xfrm>
-        </p:spPr>
-        <p:txBody>
-          <a:bodyPr rtlCol="0">
-            <a:normAutofit lnSpcReduction="10000"/>
-          </a:bodyPr>
-          <a:lstStyle>
-            <a:defPPr>
-              <a:defRPr lang="es-ES"/>
-            </a:defPPr>
-          </a:lstStyle>
-          <a:p>
-            <a:pPr marL="342900" indent="-342900" rtl="0">
-              <a:buFont typeface="Courier New" panose="02070309020205020404" pitchFamily="49" charset="0"/>
-              <a:buChar char="o"/>
-            </a:pPr>
-            <a:r>
-              <a:rPr lang="es-ES" dirty="0"/>
-              <a:t>Database only included top earners for every year 10. It would be interesting to understand if regional data behaves similarly when analyzing a larger sample of athlete earnings.</a:t>
-            </a:r>
-          </a:p>
-          <a:p>
-            <a:pPr marL="342900" indent="-342900" rtl="0">
-              <a:buFont typeface="Courier New" panose="02070309020205020404" pitchFamily="49" charset="0"/>
-              <a:buChar char="o"/>
-            </a:pPr>
-            <a:r>
-              <a:rPr lang="es-ES" dirty="0"/>
-              <a:t>We lacked industry data (ex. TV rights, number of spectators, team valuations) to carry out a correlation analysis to understand key drivers for earnings.</a:t>
-            </a:r>
-          </a:p>
-          <a:p>
-            <a:pPr marL="342900" indent="-342900" rtl="0">
-              <a:buFont typeface="Courier New" panose="02070309020205020404" pitchFamily="49" charset="0"/>
-              <a:buChar char="o"/>
-            </a:pPr>
-            <a:r>
-              <a:rPr lang="es-ES" dirty="0"/>
-              <a:t>When it comes to calculating average earnings by country when it comes to athletes there is a limitation in the form of us not having a large enough sample size to illustrate this effectively</a:t>
-            </a:r>
-          </a:p>
-        </p:txBody>
-      </p:sp>
-      <p:sp>
-        <p:nvSpPr>
-          <p:cNvPr id="4" name="Marcador de fecha 3">
-            <a:extLst>
-              <a:ext uri="{FF2B5EF4-FFF2-40B4-BE49-F238E27FC236}">
-                <a16:creationId xmlns:a16="http://schemas.microsoft.com/office/drawing/2014/main" id="{00560550-EE65-43CE-B899-F421E74287A1}"/>
-              </a:ext>
-            </a:extLst>
-          </p:cNvPr>
-          <p:cNvSpPr>
-            <a:spLocks noGrp="1"/>
-          </p:cNvSpPr>
-          <p:nvPr>
-            <p:ph type="dt" sz="half" idx="10"/>
-          </p:nvPr>
-        </p:nvSpPr>
-        <p:spPr>
-          <a:xfrm>
-            <a:off x="838200" y="6356350"/>
-            <a:ext cx="2743200" cy="365125"/>
-          </a:xfrm>
-        </p:spPr>
-        <p:txBody>
-          <a:bodyPr rtlCol="0"/>
-          <a:lstStyle>
-            <a:defPPr>
-              <a:defRPr lang="es-ES"/>
-            </a:defPPr>
-          </a:lstStyle>
-          <a:p>
-            <a:pPr rtl="0"/>
-            <a:r>
-              <a:rPr lang="es-ES" dirty="0"/>
-              <a:t>20XX</a:t>
-            </a:r>
-          </a:p>
-        </p:txBody>
-      </p:sp>
-      <p:sp>
-        <p:nvSpPr>
-          <p:cNvPr id="5" name="Marcador de pie de página 4">
-            <a:extLst>
-              <a:ext uri="{FF2B5EF4-FFF2-40B4-BE49-F238E27FC236}">
-                <a16:creationId xmlns:a16="http://schemas.microsoft.com/office/drawing/2014/main" id="{4135E32A-1A8C-43D2-9C6E-12887B4DEDFB}"/>
-              </a:ext>
-            </a:extLst>
-          </p:cNvPr>
-          <p:cNvSpPr>
-            <a:spLocks noGrp="1"/>
-          </p:cNvSpPr>
-          <p:nvPr>
-            <p:ph type="ftr" sz="quarter" idx="11"/>
-          </p:nvPr>
-        </p:nvSpPr>
-        <p:spPr>
-          <a:xfrm>
-            <a:off x="4038600" y="6356350"/>
-            <a:ext cx="4114800" cy="365125"/>
-          </a:xfrm>
-        </p:spPr>
-        <p:txBody>
-          <a:bodyPr rtlCol="0"/>
-          <a:lstStyle>
-            <a:defPPr>
-              <a:defRPr lang="es-ES"/>
-            </a:defPPr>
-          </a:lstStyle>
-          <a:p>
-            <a:pPr rtl="0"/>
-            <a:r>
-              <a:rPr lang="es-ES" dirty="0"/>
-              <a:t>TÍTULO DE LA PRESENTACIÓN</a:t>
-            </a:r>
-          </a:p>
-        </p:txBody>
-      </p:sp>
-      <p:sp>
-        <p:nvSpPr>
-          <p:cNvPr id="6" name="Marcador de número de diapositiva 5">
-            <a:extLst>
-              <a:ext uri="{FF2B5EF4-FFF2-40B4-BE49-F238E27FC236}">
-                <a16:creationId xmlns:a16="http://schemas.microsoft.com/office/drawing/2014/main" id="{7C4B8313-9270-4128-8674-3A3E42B806BC}"/>
-              </a:ext>
-            </a:extLst>
-          </p:cNvPr>
-          <p:cNvSpPr>
-            <a:spLocks noGrp="1"/>
-          </p:cNvSpPr>
-          <p:nvPr>
-            <p:ph type="sldNum" sz="quarter" idx="12"/>
-          </p:nvPr>
-        </p:nvSpPr>
-        <p:spPr>
-          <a:xfrm>
-            <a:off x="8610600" y="6356350"/>
-            <a:ext cx="2743200" cy="365125"/>
-          </a:xfrm>
-        </p:spPr>
-        <p:txBody>
-          <a:bodyPr rtlCol="0"/>
-          <a:lstStyle>
-            <a:defPPr>
-              <a:defRPr lang="es-ES"/>
-            </a:defPPr>
-          </a:lstStyle>
-          <a:p>
-            <a:pPr rtl="0"/>
-            <a:fld id="{A49DFD55-3C28-40EF-9E31-A92D2E4017FF}" type="slidenum">
-              <a:rPr lang="es-ES" smtClean="0"/>
-              <a:pPr rtl="0"/>
-              <a:t>23</a:t>
-            </a:fld>
-            <a:endParaRPr lang="es-ES" dirty="0"/>
+              <a:rPr lang="en-US" sz="2800" dirty="0"/>
+              <a:t>Limitations and next steps</a:t>
+            </a:r>
           </a:p>
         </p:txBody>
       </p:sp>
     </p:spTree>
     <p:extLst>
       <p:ext uri="{BB962C8B-B14F-4D97-AF65-F5344CB8AC3E}">
-        <p14:creationId xmlns:p14="http://schemas.microsoft.com/office/powerpoint/2010/main" val="1742861620"/>
+        <p14:creationId xmlns:p14="http://schemas.microsoft.com/office/powerpoint/2010/main" val="3671601111"/>
       </p:ext>
     </p:extLst>
   </p:cSld>
@@ -17230,7 +17346,7 @@
           <p:cNvPr id="2" name="Título 1">
             <a:extLst>
               <a:ext uri="{FF2B5EF4-FFF2-40B4-BE49-F238E27FC236}">
-                <a16:creationId xmlns:a16="http://schemas.microsoft.com/office/drawing/2014/main" id="{09140014-73D5-419B-8867-972BB18D52D4}"/>
+                <a16:creationId xmlns:a16="http://schemas.microsoft.com/office/drawing/2014/main" id="{4518FC28-E0BD-4387-B8BE-9965D1A57FF1}"/>
               </a:ext>
             </a:extLst>
           </p:cNvPr>
@@ -17243,8 +17359,8 @@
         </p:nvSpPr>
         <p:spPr>
           <a:xfrm>
-            <a:off x="2933700" y="892177"/>
-            <a:ext cx="8421688" cy="1325563"/>
+            <a:off x="5428430" y="502056"/>
+            <a:ext cx="5111750" cy="1204912"/>
           </a:xfrm>
         </p:spPr>
         <p:txBody>
@@ -17258,36 +17374,36 @@
             <a:pPr rtl="0"/>
             <a:r>
               <a:rPr lang="es-ES" dirty="0"/>
-              <a:t>ÁREAS DE ENFOQUE</a:t>
-            </a:r>
-          </a:p>
-        </p:txBody>
-      </p:sp>
-      <p:sp>
-        <p:nvSpPr>
-          <p:cNvPr id="4" name="Marcador de contenido 3">
-            <a:extLst>
-              <a:ext uri="{FF2B5EF4-FFF2-40B4-BE49-F238E27FC236}">
-                <a16:creationId xmlns:a16="http://schemas.microsoft.com/office/drawing/2014/main" id="{33D8731E-4977-402E-8BFD-895B4D0544CC}"/>
-              </a:ext>
-            </a:extLst>
-          </p:cNvPr>
-          <p:cNvSpPr>
-            <a:spLocks noGrp="1"/>
-          </p:cNvSpPr>
-          <p:nvPr>
-            <p:ph sz="half" idx="2"/>
-          </p:nvPr>
-        </p:nvSpPr>
-        <p:spPr>
-          <a:xfrm>
-            <a:off x="2933700" y="3834606"/>
-            <a:ext cx="3924300" cy="1997867"/>
+              <a:t>limitations</a:t>
+            </a:r>
+          </a:p>
+        </p:txBody>
+      </p:sp>
+      <p:sp>
+        <p:nvSpPr>
+          <p:cNvPr id="3" name="Marcador de texto 2">
+            <a:extLst>
+              <a:ext uri="{FF2B5EF4-FFF2-40B4-BE49-F238E27FC236}">
+                <a16:creationId xmlns:a16="http://schemas.microsoft.com/office/drawing/2014/main" id="{FED19BCA-B61F-4EA6-A1FB-CCA3BD8506FB}"/>
+              </a:ext>
+            </a:extLst>
+          </p:cNvPr>
+          <p:cNvSpPr>
+            <a:spLocks noGrp="1"/>
+          </p:cNvSpPr>
+          <p:nvPr>
+            <p:ph type="body" idx="1"/>
+          </p:nvPr>
+        </p:nvSpPr>
+        <p:spPr>
+          <a:xfrm>
+            <a:off x="5428430" y="2094275"/>
+            <a:ext cx="5550426" cy="2592781"/>
           </a:xfrm>
         </p:spPr>
         <p:txBody>
           <a:bodyPr rtlCol="0">
-            <a:normAutofit/>
+            <a:normAutofit lnSpcReduction="10000"/>
           </a:bodyPr>
           <a:lstStyle>
             <a:defPPr>
@@ -17295,48 +17411,57 @@
             </a:defPPr>
           </a:lstStyle>
           <a:p>
-            <a:pPr rtl="0"/>
+            <a:pPr marL="342900" indent="-342900" rtl="0">
+              <a:buFont typeface="Courier New" panose="02070309020205020404" pitchFamily="49" charset="0"/>
+              <a:buChar char="o"/>
+            </a:pPr>
             <a:r>
               <a:rPr lang="es-ES" dirty="0"/>
-              <a:t>Desarrollar estrategias ganadoras para seguir a la vanguardia de la competencia</a:t>
-            </a:r>
-          </a:p>
-          <a:p>
-            <a:pPr rtl="0"/>
+              <a:t>Database only included top earners for every year 10. It would be interesting to understand if regional data behaves similarly when analyzing a larger sample of athlete earnings.</a:t>
+            </a:r>
+          </a:p>
+          <a:p>
+            <a:pPr marL="342900" indent="-342900" rtl="0">
+              <a:buFont typeface="Courier New" panose="02070309020205020404" pitchFamily="49" charset="0"/>
+              <a:buChar char="o"/>
+            </a:pPr>
             <a:r>
               <a:rPr lang="es-ES" dirty="0"/>
-              <a:t>​Aprovechar los frutos obtenidos para identificar un valor en el terreno de juego</a:t>
-            </a:r>
-          </a:p>
-          <a:p>
-            <a:pPr rtl="0"/>
+              <a:t>We lacked industry data (ex. TV rights, number of spectators, team valuations) to carry out a correlation analysis to understand key drivers for earnings.</a:t>
+            </a:r>
+          </a:p>
+          <a:p>
+            <a:pPr marL="342900" indent="-342900" rtl="0">
+              <a:buFont typeface="Courier New" panose="02070309020205020404" pitchFamily="49" charset="0"/>
+              <a:buChar char="o"/>
+            </a:pPr>
             <a:r>
               <a:rPr lang="es-ES" dirty="0"/>
-              <a:t>​Visualizar la convergencia dirigida al cliente</a:t>
-            </a:r>
-          </a:p>
-        </p:txBody>
-      </p:sp>
-      <p:sp>
-        <p:nvSpPr>
-          <p:cNvPr id="5" name="Marcador de texto 4">
-            <a:extLst>
-              <a:ext uri="{FF2B5EF4-FFF2-40B4-BE49-F238E27FC236}">
-                <a16:creationId xmlns:a16="http://schemas.microsoft.com/office/drawing/2014/main" id="{91CDEC5F-B8EE-4BC1-843F-13135E6E7AB2}"/>
-              </a:ext>
-            </a:extLst>
-          </p:cNvPr>
-          <p:cNvSpPr>
-            <a:spLocks noGrp="1"/>
-          </p:cNvSpPr>
-          <p:nvPr>
-            <p:ph type="body" sz="quarter" idx="3"/>
-          </p:nvPr>
-        </p:nvSpPr>
-        <p:spPr>
-          <a:xfrm>
-            <a:off x="7410173" y="2776936"/>
-            <a:ext cx="3943627" cy="823912"/>
+              <a:t>When it comes to calculating average earnings by country when it comes to athletes there is a limitation in the form of us not having a large enough sample size to illustrate this effectively</a:t>
+            </a:r>
+          </a:p>
+        </p:txBody>
+      </p:sp>
+      <p:sp>
+        <p:nvSpPr>
+          <p:cNvPr id="4" name="Marcador de fecha 3">
+            <a:extLst>
+              <a:ext uri="{FF2B5EF4-FFF2-40B4-BE49-F238E27FC236}">
+                <a16:creationId xmlns:a16="http://schemas.microsoft.com/office/drawing/2014/main" id="{00560550-EE65-43CE-B899-F421E74287A1}"/>
+              </a:ext>
+            </a:extLst>
+          </p:cNvPr>
+          <p:cNvSpPr>
+            <a:spLocks noGrp="1"/>
+          </p:cNvSpPr>
+          <p:nvPr>
+            <p:ph type="dt" sz="half" idx="10"/>
+          </p:nvPr>
+        </p:nvSpPr>
+        <p:spPr>
+          <a:xfrm>
+            <a:off x="838200" y="6356350"/>
+            <a:ext cx="2743200" cy="365125"/>
           </a:xfrm>
         </p:spPr>
         <p:txBody>
@@ -17350,37 +17475,35 @@
             <a:pPr rtl="0"/>
             <a:r>
               <a:rPr lang="es-ES" dirty="0"/>
-              <a:t>OPORTUNIDADES BASADAS EN LA NUBE</a:t>
-            </a:r>
-          </a:p>
-        </p:txBody>
-      </p:sp>
-      <p:sp>
-        <p:nvSpPr>
-          <p:cNvPr id="6" name="Marcador de contenido 5">
-            <a:extLst>
-              <a:ext uri="{FF2B5EF4-FFF2-40B4-BE49-F238E27FC236}">
-                <a16:creationId xmlns:a16="http://schemas.microsoft.com/office/drawing/2014/main" id="{50B65871-FA95-449A-B8BC-90486DE532EF}"/>
-              </a:ext>
-            </a:extLst>
-          </p:cNvPr>
-          <p:cNvSpPr>
-            <a:spLocks noGrp="1"/>
-          </p:cNvSpPr>
-          <p:nvPr>
-            <p:ph sz="quarter" idx="4"/>
-          </p:nvPr>
-        </p:nvSpPr>
-        <p:spPr>
-          <a:xfrm>
-            <a:off x="7410173" y="3834606"/>
-            <a:ext cx="3943627" cy="1997867"/>
-          </a:xfrm>
-        </p:spPr>
-        <p:txBody>
-          <a:bodyPr rtlCol="0">
-            <a:normAutofit/>
-          </a:bodyPr>
+              <a:t>20XX</a:t>
+            </a:r>
+          </a:p>
+        </p:txBody>
+      </p:sp>
+      <p:sp>
+        <p:nvSpPr>
+          <p:cNvPr id="5" name="Marcador de pie de página 4">
+            <a:extLst>
+              <a:ext uri="{FF2B5EF4-FFF2-40B4-BE49-F238E27FC236}">
+                <a16:creationId xmlns:a16="http://schemas.microsoft.com/office/drawing/2014/main" id="{4135E32A-1A8C-43D2-9C6E-12887B4DEDFB}"/>
+              </a:ext>
+            </a:extLst>
+          </p:cNvPr>
+          <p:cNvSpPr>
+            <a:spLocks noGrp="1"/>
+          </p:cNvSpPr>
+          <p:nvPr>
+            <p:ph type="ftr" sz="quarter" idx="11"/>
+          </p:nvPr>
+        </p:nvSpPr>
+        <p:spPr>
+          <a:xfrm>
+            <a:off x="4038600" y="6356350"/>
+            <a:ext cx="4114800" cy="365125"/>
+          </a:xfrm>
+        </p:spPr>
+        <p:txBody>
+          <a:bodyPr rtlCol="0"/>
           <a:lstStyle>
             <a:defPPr>
               <a:defRPr lang="es-ES"/>
@@ -17390,24 +17513,17 @@
             <a:pPr rtl="0"/>
             <a:r>
               <a:rPr lang="es-ES" dirty="0"/>
-              <a:t>Enfoques iterativos para una estrategia corporativa</a:t>
-            </a:r>
-          </a:p>
-          <a:p>
-            <a:pPr rtl="0"/>
-            <a:r>
-              <a:rPr lang="es-ES" dirty="0"/>
-              <a:t>​Establecer un marco de administración desde dentro</a:t>
-            </a:r>
-          </a:p>
-        </p:txBody>
-      </p:sp>
-      <p:sp>
-        <p:nvSpPr>
-          <p:cNvPr id="9" name="Marcador de número de diapositiva 8">
-            <a:extLst>
-              <a:ext uri="{FF2B5EF4-FFF2-40B4-BE49-F238E27FC236}">
-                <a16:creationId xmlns:a16="http://schemas.microsoft.com/office/drawing/2014/main" id="{C396FFDC-ADE8-4009-A466-A81787258E88}"/>
+              <a:t>TÍTULO DE LA PRESENTACIÓN</a:t>
+            </a:r>
+          </a:p>
+        </p:txBody>
+      </p:sp>
+      <p:sp>
+        <p:nvSpPr>
+          <p:cNvPr id="6" name="Marcador de número de diapositiva 5">
+            <a:extLst>
+              <a:ext uri="{FF2B5EF4-FFF2-40B4-BE49-F238E27FC236}">
+                <a16:creationId xmlns:a16="http://schemas.microsoft.com/office/drawing/2014/main" id="{7C4B8313-9270-4128-8674-3A3E42B806BC}"/>
               </a:ext>
             </a:extLst>
           </p:cNvPr>
@@ -17442,78 +17558,10 @@
           </a:p>
         </p:txBody>
       </p:sp>
-      <p:sp>
-        <p:nvSpPr>
-          <p:cNvPr id="15" name="Marcador de pie de página 4">
-            <a:extLst>
-              <a:ext uri="{FF2B5EF4-FFF2-40B4-BE49-F238E27FC236}">
-                <a16:creationId xmlns:a16="http://schemas.microsoft.com/office/drawing/2014/main" id="{D03417DB-B8B1-A6C2-EC39-D9E06005B059}"/>
-              </a:ext>
-            </a:extLst>
-          </p:cNvPr>
-          <p:cNvSpPr>
-            <a:spLocks noGrp="1"/>
-          </p:cNvSpPr>
-          <p:nvPr>
-            <p:ph type="ftr" sz="quarter" idx="11"/>
-          </p:nvPr>
-        </p:nvSpPr>
-        <p:spPr>
-          <a:xfrm>
-            <a:off x="2463800" y="6356350"/>
-            <a:ext cx="3479800" cy="365125"/>
-          </a:xfrm>
-        </p:spPr>
-        <p:txBody>
-          <a:bodyPr rtlCol="0"/>
-          <a:lstStyle>
-            <a:defPPr>
-              <a:defRPr lang="es-ES"/>
-            </a:defPPr>
-          </a:lstStyle>
-          <a:p>
-            <a:pPr rtl="0"/>
-            <a:r>
-              <a:rPr lang="es-ES" dirty="0"/>
-              <a:t>FORBES HIGHEST PAYING ATHLETES ANALYSIS</a:t>
-            </a:r>
-          </a:p>
-        </p:txBody>
-      </p:sp>
-      <p:pic>
-        <p:nvPicPr>
-          <p:cNvPr id="19" name="Picture 18">
-            <a:extLst>
-              <a:ext uri="{FF2B5EF4-FFF2-40B4-BE49-F238E27FC236}">
-                <a16:creationId xmlns:a16="http://schemas.microsoft.com/office/drawing/2014/main" id="{107FBD5C-404A-8952-57AD-16E7D834AE5E}"/>
-              </a:ext>
-            </a:extLst>
-          </p:cNvPr>
-          <p:cNvPicPr>
-            <a:picLocks noChangeAspect="1"/>
-          </p:cNvPicPr>
-          <p:nvPr/>
-        </p:nvPicPr>
-        <p:blipFill>
-          <a:blip r:embed="rId3"/>
-          <a:stretch>
-            <a:fillRect/>
-          </a:stretch>
-        </p:blipFill>
-        <p:spPr>
-          <a:xfrm>
-            <a:off x="0" y="177799"/>
-            <a:ext cx="12192000" cy="6502401"/>
-          </a:xfrm>
-          <a:prstGeom prst="rect">
-            <a:avLst/>
-          </a:prstGeom>
-        </p:spPr>
-      </p:pic>
     </p:spTree>
     <p:extLst>
       <p:ext uri="{BB962C8B-B14F-4D97-AF65-F5344CB8AC3E}">
-        <p14:creationId xmlns:p14="http://schemas.microsoft.com/office/powerpoint/2010/main" val="921118608"/>
+        <p14:creationId xmlns:p14="http://schemas.microsoft.com/office/powerpoint/2010/main" val="1742861620"/>
       </p:ext>
     </p:extLst>
   </p:cSld>
@@ -17545,63 +17593,65 @@
           <p:cNvPr id="2" name="Título 1">
             <a:extLst>
               <a:ext uri="{FF2B5EF4-FFF2-40B4-BE49-F238E27FC236}">
-                <a16:creationId xmlns:a16="http://schemas.microsoft.com/office/drawing/2014/main" id="{8BDF1EDE-5423-435C-B149-87AB1BC22B83}"/>
-              </a:ext>
-            </a:extLst>
-          </p:cNvPr>
-          <p:cNvSpPr>
-            <a:spLocks noGrp="1"/>
-          </p:cNvSpPr>
-          <p:nvPr>
-            <p:ph type="ctrTitle"/>
-          </p:nvPr>
-        </p:nvSpPr>
-        <p:spPr>
-          <a:xfrm>
-            <a:off x="5221715" y="2666632"/>
-            <a:ext cx="4523715" cy="1524735"/>
-          </a:xfrm>
-        </p:spPr>
-        <p:txBody>
-          <a:bodyPr rtlCol="0" anchor="ctr"/>
+                <a16:creationId xmlns:a16="http://schemas.microsoft.com/office/drawing/2014/main" id="{09140014-73D5-419B-8867-972BB18D52D4}"/>
+              </a:ext>
+            </a:extLst>
+          </p:cNvPr>
+          <p:cNvSpPr>
+            <a:spLocks noGrp="1"/>
+          </p:cNvSpPr>
+          <p:nvPr>
+            <p:ph type="title"/>
+          </p:nvPr>
+        </p:nvSpPr>
+        <p:spPr>
+          <a:xfrm>
+            <a:off x="2933700" y="892177"/>
+            <a:ext cx="8421688" cy="1325563"/>
+          </a:xfrm>
+        </p:spPr>
+        <p:txBody>
+          <a:bodyPr rtlCol="0"/>
           <a:lstStyle>
             <a:defPPr>
               <a:defRPr lang="es-ES"/>
             </a:defPPr>
           </a:lstStyle>
           <a:p>
-            <a:pPr algn="ctr" rtl="0"/>
+            <a:pPr rtl="0"/>
             <a:r>
               <a:rPr lang="es-ES" dirty="0"/>
-              <a:t>Thanks!</a:t>
-            </a:r>
-          </a:p>
-        </p:txBody>
-      </p:sp>
-      <p:sp>
-        <p:nvSpPr>
-          <p:cNvPr id="4" name="Marcador de fecha 3">
-            <a:extLst>
-              <a:ext uri="{FF2B5EF4-FFF2-40B4-BE49-F238E27FC236}">
-                <a16:creationId xmlns:a16="http://schemas.microsoft.com/office/drawing/2014/main" id="{A47C7382-18E7-4821-8C61-461D6BBE08FC}"/>
-              </a:ext>
-            </a:extLst>
-          </p:cNvPr>
-          <p:cNvSpPr>
-            <a:spLocks noGrp="1"/>
-          </p:cNvSpPr>
-          <p:nvPr>
-            <p:ph type="dt" sz="half" idx="10"/>
-          </p:nvPr>
-        </p:nvSpPr>
-        <p:spPr>
-          <a:xfrm>
-            <a:off x="4267200" y="6356350"/>
-            <a:ext cx="1774371" cy="365125"/>
-          </a:xfrm>
-        </p:spPr>
-        <p:txBody>
-          <a:bodyPr rtlCol="0"/>
+              <a:t>ÁREAS DE ENFOQUE</a:t>
+            </a:r>
+          </a:p>
+        </p:txBody>
+      </p:sp>
+      <p:sp>
+        <p:nvSpPr>
+          <p:cNvPr id="4" name="Marcador de contenido 3">
+            <a:extLst>
+              <a:ext uri="{FF2B5EF4-FFF2-40B4-BE49-F238E27FC236}">
+                <a16:creationId xmlns:a16="http://schemas.microsoft.com/office/drawing/2014/main" id="{33D8731E-4977-402E-8BFD-895B4D0544CC}"/>
+              </a:ext>
+            </a:extLst>
+          </p:cNvPr>
+          <p:cNvSpPr>
+            <a:spLocks noGrp="1"/>
+          </p:cNvSpPr>
+          <p:nvPr>
+            <p:ph sz="half" idx="2"/>
+          </p:nvPr>
+        </p:nvSpPr>
+        <p:spPr>
+          <a:xfrm>
+            <a:off x="2933700" y="3834606"/>
+            <a:ext cx="3924300" cy="1997867"/>
+          </a:xfrm>
+        </p:spPr>
+        <p:txBody>
+          <a:bodyPr rtlCol="0">
+            <a:normAutofit/>
+          </a:bodyPr>
           <a:lstStyle>
             <a:defPPr>
               <a:defRPr lang="es-ES"/>
@@ -17611,31 +17661,45 @@
             <a:pPr rtl="0"/>
             <a:r>
               <a:rPr lang="es-ES" dirty="0"/>
-              <a:t>20XX</a:t>
-            </a:r>
-          </a:p>
-        </p:txBody>
-      </p:sp>
-      <p:sp>
-        <p:nvSpPr>
-          <p:cNvPr id="5" name="Marcador de pie de página 4">
-            <a:extLst>
-              <a:ext uri="{FF2B5EF4-FFF2-40B4-BE49-F238E27FC236}">
-                <a16:creationId xmlns:a16="http://schemas.microsoft.com/office/drawing/2014/main" id="{3990FA1B-5022-47AB-A0AE-8F5C5797997C}"/>
-              </a:ext>
-            </a:extLst>
-          </p:cNvPr>
-          <p:cNvSpPr>
-            <a:spLocks noGrp="1"/>
-          </p:cNvSpPr>
-          <p:nvPr>
-            <p:ph type="ftr" sz="quarter" idx="11"/>
-          </p:nvPr>
-        </p:nvSpPr>
-        <p:spPr>
-          <a:xfrm>
-            <a:off x="6479721" y="6356350"/>
-            <a:ext cx="2661557" cy="365125"/>
+              <a:t>Desarrollar estrategias ganadoras para seguir a la vanguardia de la competencia</a:t>
+            </a:r>
+          </a:p>
+          <a:p>
+            <a:pPr rtl="0"/>
+            <a:r>
+              <a:rPr lang="es-ES" dirty="0"/>
+              <a:t>​Aprovechar los frutos obtenidos para identificar un valor en el terreno de juego</a:t>
+            </a:r>
+          </a:p>
+          <a:p>
+            <a:pPr rtl="0"/>
+            <a:r>
+              <a:rPr lang="es-ES" dirty="0"/>
+              <a:t>​Visualizar la convergencia dirigida al cliente</a:t>
+            </a:r>
+          </a:p>
+        </p:txBody>
+      </p:sp>
+      <p:sp>
+        <p:nvSpPr>
+          <p:cNvPr id="5" name="Marcador de texto 4">
+            <a:extLst>
+              <a:ext uri="{FF2B5EF4-FFF2-40B4-BE49-F238E27FC236}">
+                <a16:creationId xmlns:a16="http://schemas.microsoft.com/office/drawing/2014/main" id="{91CDEC5F-B8EE-4BC1-843F-13135E6E7AB2}"/>
+              </a:ext>
+            </a:extLst>
+          </p:cNvPr>
+          <p:cNvSpPr>
+            <a:spLocks noGrp="1"/>
+          </p:cNvSpPr>
+          <p:nvPr>
+            <p:ph type="body" sz="quarter" idx="3"/>
+          </p:nvPr>
+        </p:nvSpPr>
+        <p:spPr>
+          <a:xfrm>
+            <a:off x="7410173" y="2776936"/>
+            <a:ext cx="3943627" cy="823912"/>
           </a:xfrm>
         </p:spPr>
         <p:txBody>
@@ -17649,17 +17713,64 @@
             <a:pPr rtl="0"/>
             <a:r>
               <a:rPr lang="es-ES" dirty="0"/>
-              <a:t>TÍTULO DE LA PRESENTACIÓN</a:t>
-            </a:r>
-          </a:p>
-        </p:txBody>
-      </p:sp>
-      <p:sp>
-        <p:nvSpPr>
-          <p:cNvPr id="6" name="Marcador de número de diapositiva 5">
-            <a:extLst>
-              <a:ext uri="{FF2B5EF4-FFF2-40B4-BE49-F238E27FC236}">
-                <a16:creationId xmlns:a16="http://schemas.microsoft.com/office/drawing/2014/main" id="{4C127D99-645F-4FCF-9573-FDFE2A344FA9}"/>
+              <a:t>OPORTUNIDADES BASADAS EN LA NUBE</a:t>
+            </a:r>
+          </a:p>
+        </p:txBody>
+      </p:sp>
+      <p:sp>
+        <p:nvSpPr>
+          <p:cNvPr id="6" name="Marcador de contenido 5">
+            <a:extLst>
+              <a:ext uri="{FF2B5EF4-FFF2-40B4-BE49-F238E27FC236}">
+                <a16:creationId xmlns:a16="http://schemas.microsoft.com/office/drawing/2014/main" id="{50B65871-FA95-449A-B8BC-90486DE532EF}"/>
+              </a:ext>
+            </a:extLst>
+          </p:cNvPr>
+          <p:cNvSpPr>
+            <a:spLocks noGrp="1"/>
+          </p:cNvSpPr>
+          <p:nvPr>
+            <p:ph sz="quarter" idx="4"/>
+          </p:nvPr>
+        </p:nvSpPr>
+        <p:spPr>
+          <a:xfrm>
+            <a:off x="7410173" y="3834606"/>
+            <a:ext cx="3943627" cy="1997867"/>
+          </a:xfrm>
+        </p:spPr>
+        <p:txBody>
+          <a:bodyPr rtlCol="0">
+            <a:normAutofit/>
+          </a:bodyPr>
+          <a:lstStyle>
+            <a:defPPr>
+              <a:defRPr lang="es-ES"/>
+            </a:defPPr>
+          </a:lstStyle>
+          <a:p>
+            <a:pPr rtl="0"/>
+            <a:r>
+              <a:rPr lang="es-ES" dirty="0"/>
+              <a:t>Enfoques iterativos para una estrategia corporativa</a:t>
+            </a:r>
+          </a:p>
+          <a:p>
+            <a:pPr rtl="0"/>
+            <a:r>
+              <a:rPr lang="es-ES" dirty="0"/>
+              <a:t>​Establecer un marco de administración desde dentro</a:t>
+            </a:r>
+          </a:p>
+        </p:txBody>
+      </p:sp>
+      <p:sp>
+        <p:nvSpPr>
+          <p:cNvPr id="9" name="Marcador de número de diapositiva 8">
+            <a:extLst>
+              <a:ext uri="{FF2B5EF4-FFF2-40B4-BE49-F238E27FC236}">
+                <a16:creationId xmlns:a16="http://schemas.microsoft.com/office/drawing/2014/main" id="{C396FFDC-ADE8-4009-A466-A81787258E88}"/>
               </a:ext>
             </a:extLst>
           </p:cNvPr>
@@ -17672,8 +17783,8 @@
         </p:nvSpPr>
         <p:spPr>
           <a:xfrm>
-            <a:off x="9579428" y="6356350"/>
-            <a:ext cx="1774371" cy="365125"/>
+            <a:off x="8610600" y="6356350"/>
+            <a:ext cx="2743200" cy="365125"/>
           </a:xfrm>
         </p:spPr>
         <p:txBody>
@@ -17689,6 +17800,258 @@
               <a:rPr lang="es-ES" smtClean="0"/>
               <a:pPr rtl="0"/>
               <a:t>25</a:t>
+            </a:fld>
+            <a:endParaRPr lang="es-ES" dirty="0"/>
+          </a:p>
+        </p:txBody>
+      </p:sp>
+      <p:sp>
+        <p:nvSpPr>
+          <p:cNvPr id="15" name="Marcador de pie de página 4">
+            <a:extLst>
+              <a:ext uri="{FF2B5EF4-FFF2-40B4-BE49-F238E27FC236}">
+                <a16:creationId xmlns:a16="http://schemas.microsoft.com/office/drawing/2014/main" id="{D03417DB-B8B1-A6C2-EC39-D9E06005B059}"/>
+              </a:ext>
+            </a:extLst>
+          </p:cNvPr>
+          <p:cNvSpPr>
+            <a:spLocks noGrp="1"/>
+          </p:cNvSpPr>
+          <p:nvPr>
+            <p:ph type="ftr" sz="quarter" idx="11"/>
+          </p:nvPr>
+        </p:nvSpPr>
+        <p:spPr>
+          <a:xfrm>
+            <a:off x="2463800" y="6356350"/>
+            <a:ext cx="3479800" cy="365125"/>
+          </a:xfrm>
+        </p:spPr>
+        <p:txBody>
+          <a:bodyPr rtlCol="0"/>
+          <a:lstStyle>
+            <a:defPPr>
+              <a:defRPr lang="es-ES"/>
+            </a:defPPr>
+          </a:lstStyle>
+          <a:p>
+            <a:pPr rtl="0"/>
+            <a:r>
+              <a:rPr lang="es-ES" dirty="0"/>
+              <a:t>FORBES HIGHEST PAYING ATHLETES ANALYSIS</a:t>
+            </a:r>
+          </a:p>
+        </p:txBody>
+      </p:sp>
+      <p:pic>
+        <p:nvPicPr>
+          <p:cNvPr id="19" name="Picture 18">
+            <a:extLst>
+              <a:ext uri="{FF2B5EF4-FFF2-40B4-BE49-F238E27FC236}">
+                <a16:creationId xmlns:a16="http://schemas.microsoft.com/office/drawing/2014/main" id="{107FBD5C-404A-8952-57AD-16E7D834AE5E}"/>
+              </a:ext>
+            </a:extLst>
+          </p:cNvPr>
+          <p:cNvPicPr>
+            <a:picLocks noChangeAspect="1"/>
+          </p:cNvPicPr>
+          <p:nvPr/>
+        </p:nvPicPr>
+        <p:blipFill>
+          <a:blip r:embed="rId3"/>
+          <a:stretch>
+            <a:fillRect/>
+          </a:stretch>
+        </p:blipFill>
+        <p:spPr>
+          <a:xfrm>
+            <a:off x="0" y="177799"/>
+            <a:ext cx="12192000" cy="6502401"/>
+          </a:xfrm>
+          <a:prstGeom prst="rect">
+            <a:avLst/>
+          </a:prstGeom>
+        </p:spPr>
+      </p:pic>
+    </p:spTree>
+    <p:extLst>
+      <p:ext uri="{BB962C8B-B14F-4D97-AF65-F5344CB8AC3E}">
+        <p14:creationId xmlns:p14="http://schemas.microsoft.com/office/powerpoint/2010/main" val="921118608"/>
+      </p:ext>
+    </p:extLst>
+  </p:cSld>
+  <p:clrMapOvr>
+    <a:masterClrMapping/>
+  </p:clrMapOvr>
+</p:sld>
+</file>
+
+<file path=ppt/slides/slide26.xml><?xml version="1.0" encoding="utf-8"?>
+<p:sld xmlns:a="http://schemas.openxmlformats.org/drawingml/2006/main" xmlns:r="http://schemas.openxmlformats.org/officeDocument/2006/relationships" xmlns:p="http://schemas.openxmlformats.org/presentationml/2006/main">
+  <p:cSld>
+    <p:spTree>
+      <p:nvGrpSpPr>
+        <p:cNvPr id="1" name=""/>
+        <p:cNvGrpSpPr/>
+        <p:nvPr/>
+      </p:nvGrpSpPr>
+      <p:grpSpPr>
+        <a:xfrm>
+          <a:off x="0" y="0"/>
+          <a:ext cx="0" cy="0"/>
+          <a:chOff x="0" y="0"/>
+          <a:chExt cx="0" cy="0"/>
+        </a:xfrm>
+      </p:grpSpPr>
+      <p:sp>
+        <p:nvSpPr>
+          <p:cNvPr id="2" name="Título 1">
+            <a:extLst>
+              <a:ext uri="{FF2B5EF4-FFF2-40B4-BE49-F238E27FC236}">
+                <a16:creationId xmlns:a16="http://schemas.microsoft.com/office/drawing/2014/main" id="{8BDF1EDE-5423-435C-B149-87AB1BC22B83}"/>
+              </a:ext>
+            </a:extLst>
+          </p:cNvPr>
+          <p:cNvSpPr>
+            <a:spLocks noGrp="1"/>
+          </p:cNvSpPr>
+          <p:nvPr>
+            <p:ph type="ctrTitle"/>
+          </p:nvPr>
+        </p:nvSpPr>
+        <p:spPr>
+          <a:xfrm>
+            <a:off x="5221715" y="2666632"/>
+            <a:ext cx="4523715" cy="1524735"/>
+          </a:xfrm>
+        </p:spPr>
+        <p:txBody>
+          <a:bodyPr rtlCol="0" anchor="ctr"/>
+          <a:lstStyle>
+            <a:defPPr>
+              <a:defRPr lang="es-ES"/>
+            </a:defPPr>
+          </a:lstStyle>
+          <a:p>
+            <a:pPr algn="ctr" rtl="0"/>
+            <a:r>
+              <a:rPr lang="es-ES" dirty="0"/>
+              <a:t>Thanks!</a:t>
+            </a:r>
+          </a:p>
+        </p:txBody>
+      </p:sp>
+      <p:sp>
+        <p:nvSpPr>
+          <p:cNvPr id="4" name="Marcador de fecha 3">
+            <a:extLst>
+              <a:ext uri="{FF2B5EF4-FFF2-40B4-BE49-F238E27FC236}">
+                <a16:creationId xmlns:a16="http://schemas.microsoft.com/office/drawing/2014/main" id="{A47C7382-18E7-4821-8C61-461D6BBE08FC}"/>
+              </a:ext>
+            </a:extLst>
+          </p:cNvPr>
+          <p:cNvSpPr>
+            <a:spLocks noGrp="1"/>
+          </p:cNvSpPr>
+          <p:nvPr>
+            <p:ph type="dt" sz="half" idx="10"/>
+          </p:nvPr>
+        </p:nvSpPr>
+        <p:spPr>
+          <a:xfrm>
+            <a:off x="4267200" y="6356350"/>
+            <a:ext cx="1774371" cy="365125"/>
+          </a:xfrm>
+        </p:spPr>
+        <p:txBody>
+          <a:bodyPr rtlCol="0"/>
+          <a:lstStyle>
+            <a:defPPr>
+              <a:defRPr lang="es-ES"/>
+            </a:defPPr>
+          </a:lstStyle>
+          <a:p>
+            <a:pPr rtl="0"/>
+            <a:r>
+              <a:rPr lang="es-ES" dirty="0"/>
+              <a:t>20XX</a:t>
+            </a:r>
+          </a:p>
+        </p:txBody>
+      </p:sp>
+      <p:sp>
+        <p:nvSpPr>
+          <p:cNvPr id="5" name="Marcador de pie de página 4">
+            <a:extLst>
+              <a:ext uri="{FF2B5EF4-FFF2-40B4-BE49-F238E27FC236}">
+                <a16:creationId xmlns:a16="http://schemas.microsoft.com/office/drawing/2014/main" id="{3990FA1B-5022-47AB-A0AE-8F5C5797997C}"/>
+              </a:ext>
+            </a:extLst>
+          </p:cNvPr>
+          <p:cNvSpPr>
+            <a:spLocks noGrp="1"/>
+          </p:cNvSpPr>
+          <p:nvPr>
+            <p:ph type="ftr" sz="quarter" idx="11"/>
+          </p:nvPr>
+        </p:nvSpPr>
+        <p:spPr>
+          <a:xfrm>
+            <a:off x="6479721" y="6356350"/>
+            <a:ext cx="2661557" cy="365125"/>
+          </a:xfrm>
+        </p:spPr>
+        <p:txBody>
+          <a:bodyPr rtlCol="0"/>
+          <a:lstStyle>
+            <a:defPPr>
+              <a:defRPr lang="es-ES"/>
+            </a:defPPr>
+          </a:lstStyle>
+          <a:p>
+            <a:pPr rtl="0"/>
+            <a:r>
+              <a:rPr lang="es-ES" dirty="0"/>
+              <a:t>TÍTULO DE LA PRESENTACIÓN</a:t>
+            </a:r>
+          </a:p>
+        </p:txBody>
+      </p:sp>
+      <p:sp>
+        <p:nvSpPr>
+          <p:cNvPr id="6" name="Marcador de número de diapositiva 5">
+            <a:extLst>
+              <a:ext uri="{FF2B5EF4-FFF2-40B4-BE49-F238E27FC236}">
+                <a16:creationId xmlns:a16="http://schemas.microsoft.com/office/drawing/2014/main" id="{4C127D99-645F-4FCF-9573-FDFE2A344FA9}"/>
+              </a:ext>
+            </a:extLst>
+          </p:cNvPr>
+          <p:cNvSpPr>
+            <a:spLocks noGrp="1"/>
+          </p:cNvSpPr>
+          <p:nvPr>
+            <p:ph type="sldNum" sz="quarter" idx="12"/>
+          </p:nvPr>
+        </p:nvSpPr>
+        <p:spPr>
+          <a:xfrm>
+            <a:off x="9579428" y="6356350"/>
+            <a:ext cx="1774371" cy="365125"/>
+          </a:xfrm>
+        </p:spPr>
+        <p:txBody>
+          <a:bodyPr rtlCol="0"/>
+          <a:lstStyle>
+            <a:defPPr>
+              <a:defRPr lang="es-ES"/>
+            </a:defPPr>
+          </a:lstStyle>
+          <a:p>
+            <a:pPr rtl="0"/>
+            <a:fld id="{A49DFD55-3C28-40EF-9E31-A92D2E4017FF}" type="slidenum">
+              <a:rPr lang="es-ES" smtClean="0"/>
+              <a:pPr rtl="0"/>
+              <a:t>26</a:t>
             </a:fld>
             <a:endParaRPr lang="es-ES" dirty="0"/>
           </a:p>
@@ -19840,15 +20203,6 @@
 </file>
 
 <file path=customXml/item1.xml><?xml version="1.0" encoding="utf-8"?>
-<?mso-contentType ?>
-<FormTemplates xmlns="http://schemas.microsoft.com/sharepoint/v3/contenttype/forms">
-  <Display>DocumentLibraryForm</Display>
-  <Edit>DocumentLibraryForm</Edit>
-  <New>DocumentLibraryForm</New>
-</FormTemplates>
-</file>
-
-<file path=customXml/item2.xml><?xml version="1.0" encoding="utf-8"?>
 <ct:contentTypeSchema xmlns:ct="http://schemas.microsoft.com/office/2006/metadata/contentType" xmlns:ma="http://schemas.microsoft.com/office/2006/metadata/properties/metaAttributes" ct:_="" ma:_="" ma:contentTypeName="Document" ma:contentTypeID="0x01010079F111ED35F8CC479449609E8A0923A6" ma:contentTypeVersion="20" ma:contentTypeDescription="Create a new document." ma:contentTypeScope="" ma:versionID="1267097ee5f5874adfcc408041ae252e">
   <xsd:schema xmlns:xsd="http://www.w3.org/2001/XMLSchema" xmlns:xs="http://www.w3.org/2001/XMLSchema" xmlns:p="http://schemas.microsoft.com/office/2006/metadata/properties" xmlns:ns1="http://schemas.microsoft.com/sharepoint/v3" xmlns:ns2="71af3243-3dd4-4a8d-8c0d-dd76da1f02a5" xmlns:ns3="16c05727-aa75-4e4a-9b5f-8a80a1165891" xmlns:ns4="230e9df3-be65-4c73-a93b-d1236ebd677e" targetNamespace="http://schemas.microsoft.com/office/2006/metadata/properties" ma:root="true" ma:fieldsID="395891a93df65b14727750f2c06c306c" ns1:_="" ns2:_="" ns3:_="" ns4:_="">
     <xsd:import namespace="http://schemas.microsoft.com/sharepoint/v3"/>
@@ -20124,6 +20478,15 @@
 </ct:contentTypeSchema>
 </file>
 
+<file path=customXml/item2.xml><?xml version="1.0" encoding="utf-8"?>
+<?mso-contentType ?>
+<FormTemplates xmlns="http://schemas.microsoft.com/sharepoint/v3/contenttype/forms">
+  <Display>DocumentLibraryForm</Display>
+  <Edit>DocumentLibraryForm</Edit>
+  <New>DocumentLibraryForm</New>
+</FormTemplates>
+</file>
+
 <file path=customXml/item3.xml><?xml version="1.0" encoding="utf-8"?>
 <p:properties xmlns:p="http://schemas.microsoft.com/office/2006/metadata/properties" xmlns:xsi="http://www.w3.org/2001/XMLSchema-instance" xmlns:pc="http://schemas.microsoft.com/office/infopath/2007/PartnerControls">
   <documentManagement>
@@ -20144,14 +20507,6 @@
 </file>
 
 <file path=customXml/itemProps1.xml><?xml version="1.0" encoding="utf-8"?>
-<ds:datastoreItem xmlns:ds="http://schemas.openxmlformats.org/officeDocument/2006/customXml" ds:itemID="{0FD6FE22-81A0-4500-AFD0-342D21BB9A2C}">
-  <ds:schemaRefs>
-    <ds:schemaRef ds:uri="http://schemas.microsoft.com/sharepoint/v3/contenttype/forms"/>
-  </ds:schemaRefs>
-</ds:datastoreItem>
-</file>
-
-<file path=customXml/itemProps2.xml><?xml version="1.0" encoding="utf-8"?>
 <ds:datastoreItem xmlns:ds="http://schemas.openxmlformats.org/officeDocument/2006/customXml" ds:itemID="{CC96B61E-1B64-430F-934F-7D1B90028029}">
   <ds:schemaRefs>
     <ds:schemaRef ds:uri="http://schemas.microsoft.com/office/2006/metadata/contentType"/>
@@ -20168,6 +20523,14 @@
     <ds:schemaRef ds:uri="http://purl.org/dc/elements/1.1/"/>
     <ds:schemaRef ds:uri="http://purl.org/dc/terms/"/>
     <ds:schemaRef ds:uri="http://schemas.microsoft.com/internal/obd"/>
+  </ds:schemaRefs>
+</ds:datastoreItem>
+</file>
+
+<file path=customXml/itemProps2.xml><?xml version="1.0" encoding="utf-8"?>
+<ds:datastoreItem xmlns:ds="http://schemas.openxmlformats.org/officeDocument/2006/customXml" ds:itemID="{0FD6FE22-81A0-4500-AFD0-342D21BB9A2C}">
+  <ds:schemaRefs>
+    <ds:schemaRef ds:uri="http://schemas.microsoft.com/sharepoint/v3/contenttype/forms"/>
   </ds:schemaRefs>
 </ds:datastoreItem>
 </file>

</xml_diff>

<commit_message>
more changes and bar charts
</commit_message>
<xml_diff>
--- a/Highest paying athletes.pptx
+++ b/Highest paying athletes.pptx
@@ -5,10 +5,10 @@
     <p:sldMasterId id="2147483648" r:id="rId4"/>
   </p:sldMasterIdLst>
   <p:notesMasterIdLst>
-    <p:notesMasterId r:id="rId31"/>
+    <p:notesMasterId r:id="rId33"/>
   </p:notesMasterIdLst>
   <p:handoutMasterIdLst>
-    <p:handoutMasterId r:id="rId32"/>
+    <p:handoutMasterId r:id="rId34"/>
   </p:handoutMasterIdLst>
   <p:sldIdLst>
     <p:sldId id="256" r:id="rId5"/>
@@ -26,17 +26,19 @@
     <p:sldId id="273" r:id="rId17"/>
     <p:sldId id="285" r:id="rId18"/>
     <p:sldId id="281" r:id="rId19"/>
-    <p:sldId id="291" r:id="rId20"/>
-    <p:sldId id="275" r:id="rId21"/>
-    <p:sldId id="290" r:id="rId22"/>
-    <p:sldId id="270" r:id="rId23"/>
-    <p:sldId id="289" r:id="rId24"/>
-    <p:sldId id="284" r:id="rId25"/>
-    <p:sldId id="288" r:id="rId26"/>
-    <p:sldId id="286" r:id="rId27"/>
-    <p:sldId id="266" r:id="rId28"/>
-    <p:sldId id="287" r:id="rId29"/>
-    <p:sldId id="271" r:id="rId30"/>
+    <p:sldId id="292" r:id="rId20"/>
+    <p:sldId id="293" r:id="rId21"/>
+    <p:sldId id="291" r:id="rId22"/>
+    <p:sldId id="275" r:id="rId23"/>
+    <p:sldId id="290" r:id="rId24"/>
+    <p:sldId id="270" r:id="rId25"/>
+    <p:sldId id="289" r:id="rId26"/>
+    <p:sldId id="284" r:id="rId27"/>
+    <p:sldId id="288" r:id="rId28"/>
+    <p:sldId id="286" r:id="rId29"/>
+    <p:sldId id="266" r:id="rId30"/>
+    <p:sldId id="287" r:id="rId31"/>
+    <p:sldId id="271" r:id="rId32"/>
   </p:sldIdLst>
   <p:sldSz cx="12192000" cy="6858000"/>
   <p:notesSz cx="6858000" cy="9144000"/>
@@ -2658,7 +2660,7 @@
     </p:spTree>
     <p:extLst>
       <p:ext uri="{BB962C8B-B14F-4D97-AF65-F5344CB8AC3E}">
-        <p14:creationId xmlns:p14="http://schemas.microsoft.com/office/powerpoint/2010/main" val="3527123899"/>
+        <p14:creationId xmlns:p14="http://schemas.microsoft.com/office/powerpoint/2010/main" val="2050678020"/>
       </p:ext>
     </p:extLst>
   </p:cSld>
@@ -2743,7 +2745,7 @@
     </p:spTree>
     <p:extLst>
       <p:ext uri="{BB962C8B-B14F-4D97-AF65-F5344CB8AC3E}">
-        <p14:creationId xmlns:p14="http://schemas.microsoft.com/office/powerpoint/2010/main" val="3072382898"/>
+        <p14:creationId xmlns:p14="http://schemas.microsoft.com/office/powerpoint/2010/main" val="2954652686"/>
       </p:ext>
     </p:extLst>
   </p:cSld>
@@ -2828,7 +2830,7 @@
     </p:spTree>
     <p:extLst>
       <p:ext uri="{BB962C8B-B14F-4D97-AF65-F5344CB8AC3E}">
-        <p14:creationId xmlns:p14="http://schemas.microsoft.com/office/powerpoint/2010/main" val="1524502082"/>
+        <p14:creationId xmlns:p14="http://schemas.microsoft.com/office/powerpoint/2010/main" val="3527123899"/>
       </p:ext>
     </p:extLst>
   </p:cSld>
@@ -2913,7 +2915,7 @@
     </p:spTree>
     <p:extLst>
       <p:ext uri="{BB962C8B-B14F-4D97-AF65-F5344CB8AC3E}">
-        <p14:creationId xmlns:p14="http://schemas.microsoft.com/office/powerpoint/2010/main" val="2482224959"/>
+        <p14:creationId xmlns:p14="http://schemas.microsoft.com/office/powerpoint/2010/main" val="3072382898"/>
       </p:ext>
     </p:extLst>
   </p:cSld>
@@ -3083,7 +3085,7 @@
     </p:spTree>
     <p:extLst>
       <p:ext uri="{BB962C8B-B14F-4D97-AF65-F5344CB8AC3E}">
-        <p14:creationId xmlns:p14="http://schemas.microsoft.com/office/powerpoint/2010/main" val="1780030628"/>
+        <p14:creationId xmlns:p14="http://schemas.microsoft.com/office/powerpoint/2010/main" val="1524502082"/>
       </p:ext>
     </p:extLst>
   </p:cSld>
@@ -3168,7 +3170,7 @@
     </p:spTree>
     <p:extLst>
       <p:ext uri="{BB962C8B-B14F-4D97-AF65-F5344CB8AC3E}">
-        <p14:creationId xmlns:p14="http://schemas.microsoft.com/office/powerpoint/2010/main" val="744345855"/>
+        <p14:creationId xmlns:p14="http://schemas.microsoft.com/office/powerpoint/2010/main" val="2482224959"/>
       </p:ext>
     </p:extLst>
   </p:cSld>
@@ -3253,7 +3255,7 @@
     </p:spTree>
     <p:extLst>
       <p:ext uri="{BB962C8B-B14F-4D97-AF65-F5344CB8AC3E}">
-        <p14:creationId xmlns:p14="http://schemas.microsoft.com/office/powerpoint/2010/main" val="4070786815"/>
+        <p14:creationId xmlns:p14="http://schemas.microsoft.com/office/powerpoint/2010/main" val="1780030628"/>
       </p:ext>
     </p:extLst>
   </p:cSld>
@@ -3338,7 +3340,7 @@
     </p:spTree>
     <p:extLst>
       <p:ext uri="{BB962C8B-B14F-4D97-AF65-F5344CB8AC3E}">
-        <p14:creationId xmlns:p14="http://schemas.microsoft.com/office/powerpoint/2010/main" val="324268012"/>
+        <p14:creationId xmlns:p14="http://schemas.microsoft.com/office/powerpoint/2010/main" val="744345855"/>
       </p:ext>
     </p:extLst>
   </p:cSld>
@@ -3423,7 +3425,7 @@
     </p:spTree>
     <p:extLst>
       <p:ext uri="{BB962C8B-B14F-4D97-AF65-F5344CB8AC3E}">
-        <p14:creationId xmlns:p14="http://schemas.microsoft.com/office/powerpoint/2010/main" val="954942207"/>
+        <p14:creationId xmlns:p14="http://schemas.microsoft.com/office/powerpoint/2010/main" val="4070786815"/>
       </p:ext>
     </p:extLst>
   </p:cSld>
@@ -3508,7 +3510,7 @@
     </p:spTree>
     <p:extLst>
       <p:ext uri="{BB962C8B-B14F-4D97-AF65-F5344CB8AC3E}">
-        <p14:creationId xmlns:p14="http://schemas.microsoft.com/office/powerpoint/2010/main" val="2572684225"/>
+        <p14:creationId xmlns:p14="http://schemas.microsoft.com/office/powerpoint/2010/main" val="324268012"/>
       </p:ext>
     </p:extLst>
   </p:cSld>
@@ -3585,6 +3587,176 @@
             <a:fld id="{22289C57-55D7-40A4-A101-E74FAC7A092B}" type="slidenum">
               <a:rPr lang="es-ES" smtClean="0"/>
               <a:t>26</a:t>
+            </a:fld>
+            <a:endParaRPr lang="es-ES" dirty="0"/>
+          </a:p>
+        </p:txBody>
+      </p:sp>
+    </p:spTree>
+    <p:extLst>
+      <p:ext uri="{BB962C8B-B14F-4D97-AF65-F5344CB8AC3E}">
+        <p14:creationId xmlns:p14="http://schemas.microsoft.com/office/powerpoint/2010/main" val="954942207"/>
+      </p:ext>
+    </p:extLst>
+  </p:cSld>
+  <p:clrMapOvr>
+    <a:masterClrMapping/>
+  </p:clrMapOvr>
+</p:notes>
+</file>
+
+<file path=ppt/notesSlides/notesSlide27.xml><?xml version="1.0" encoding="utf-8"?>
+<p:notes xmlns:a="http://schemas.openxmlformats.org/drawingml/2006/main" xmlns:r="http://schemas.openxmlformats.org/officeDocument/2006/relationships" xmlns:p="http://schemas.openxmlformats.org/presentationml/2006/main">
+  <p:cSld>
+    <p:spTree>
+      <p:nvGrpSpPr>
+        <p:cNvPr id="1" name=""/>
+        <p:cNvGrpSpPr/>
+        <p:nvPr/>
+      </p:nvGrpSpPr>
+      <p:grpSpPr>
+        <a:xfrm>
+          <a:off x="0" y="0"/>
+          <a:ext cx="0" cy="0"/>
+          <a:chOff x="0" y="0"/>
+          <a:chExt cx="0" cy="0"/>
+        </a:xfrm>
+      </p:grpSpPr>
+      <p:sp>
+        <p:nvSpPr>
+          <p:cNvPr id="2" name="Marcador de imagen de diapositiva 1"/>
+          <p:cNvSpPr>
+            <a:spLocks noGrp="1" noRot="1" noChangeAspect="1"/>
+          </p:cNvSpPr>
+          <p:nvPr>
+            <p:ph type="sldImg"/>
+          </p:nvPr>
+        </p:nvSpPr>
+        <p:spPr/>
+      </p:sp>
+      <p:sp>
+        <p:nvSpPr>
+          <p:cNvPr id="3" name="Marcador de notas 2"/>
+          <p:cNvSpPr>
+            <a:spLocks noGrp="1"/>
+          </p:cNvSpPr>
+          <p:nvPr>
+            <p:ph type="body" idx="1"/>
+          </p:nvPr>
+        </p:nvSpPr>
+        <p:spPr/>
+        <p:txBody>
+          <a:bodyPr/>
+          <a:lstStyle/>
+          <a:p>
+            <a:endParaRPr lang="es-ES" dirty="0"/>
+          </a:p>
+        </p:txBody>
+      </p:sp>
+      <p:sp>
+        <p:nvSpPr>
+          <p:cNvPr id="4" name="Marcador de número de diapositiva 3"/>
+          <p:cNvSpPr>
+            <a:spLocks noGrp="1"/>
+          </p:cNvSpPr>
+          <p:nvPr>
+            <p:ph type="sldNum" sz="quarter" idx="5"/>
+          </p:nvPr>
+        </p:nvSpPr>
+        <p:spPr/>
+        <p:txBody>
+          <a:bodyPr/>
+          <a:lstStyle/>
+          <a:p>
+            <a:pPr rtl="0"/>
+            <a:fld id="{22289C57-55D7-40A4-A101-E74FAC7A092B}" type="slidenum">
+              <a:rPr lang="es-ES" smtClean="0"/>
+              <a:t>27</a:t>
+            </a:fld>
+            <a:endParaRPr lang="es-ES" dirty="0"/>
+          </a:p>
+        </p:txBody>
+      </p:sp>
+    </p:spTree>
+    <p:extLst>
+      <p:ext uri="{BB962C8B-B14F-4D97-AF65-F5344CB8AC3E}">
+        <p14:creationId xmlns:p14="http://schemas.microsoft.com/office/powerpoint/2010/main" val="2572684225"/>
+      </p:ext>
+    </p:extLst>
+  </p:cSld>
+  <p:clrMapOvr>
+    <a:masterClrMapping/>
+  </p:clrMapOvr>
+</p:notes>
+</file>
+
+<file path=ppt/notesSlides/notesSlide28.xml><?xml version="1.0" encoding="utf-8"?>
+<p:notes xmlns:a="http://schemas.openxmlformats.org/drawingml/2006/main" xmlns:r="http://schemas.openxmlformats.org/officeDocument/2006/relationships" xmlns:p="http://schemas.openxmlformats.org/presentationml/2006/main">
+  <p:cSld>
+    <p:spTree>
+      <p:nvGrpSpPr>
+        <p:cNvPr id="1" name=""/>
+        <p:cNvGrpSpPr/>
+        <p:nvPr/>
+      </p:nvGrpSpPr>
+      <p:grpSpPr>
+        <a:xfrm>
+          <a:off x="0" y="0"/>
+          <a:ext cx="0" cy="0"/>
+          <a:chOff x="0" y="0"/>
+          <a:chExt cx="0" cy="0"/>
+        </a:xfrm>
+      </p:grpSpPr>
+      <p:sp>
+        <p:nvSpPr>
+          <p:cNvPr id="2" name="Marcador de imagen de diapositiva 1"/>
+          <p:cNvSpPr>
+            <a:spLocks noGrp="1" noRot="1" noChangeAspect="1"/>
+          </p:cNvSpPr>
+          <p:nvPr>
+            <p:ph type="sldImg"/>
+          </p:nvPr>
+        </p:nvSpPr>
+        <p:spPr/>
+      </p:sp>
+      <p:sp>
+        <p:nvSpPr>
+          <p:cNvPr id="3" name="Marcador de notas 2"/>
+          <p:cNvSpPr>
+            <a:spLocks noGrp="1"/>
+          </p:cNvSpPr>
+          <p:nvPr>
+            <p:ph type="body" idx="1"/>
+          </p:nvPr>
+        </p:nvSpPr>
+        <p:spPr/>
+        <p:txBody>
+          <a:bodyPr/>
+          <a:lstStyle/>
+          <a:p>
+            <a:endParaRPr lang="es-ES" dirty="0"/>
+          </a:p>
+        </p:txBody>
+      </p:sp>
+      <p:sp>
+        <p:nvSpPr>
+          <p:cNvPr id="4" name="Marcador de número de diapositiva 3"/>
+          <p:cNvSpPr>
+            <a:spLocks noGrp="1"/>
+          </p:cNvSpPr>
+          <p:nvPr>
+            <p:ph type="sldNum" sz="quarter" idx="5"/>
+          </p:nvPr>
+        </p:nvSpPr>
+        <p:spPr/>
+        <p:txBody>
+          <a:bodyPr/>
+          <a:lstStyle/>
+          <a:p>
+            <a:pPr rtl="0"/>
+            <a:fld id="{22289C57-55D7-40A4-A101-E74FAC7A092B}" type="slidenum">
+              <a:rPr lang="es-ES" smtClean="0"/>
+              <a:t>28</a:t>
             </a:fld>
             <a:endParaRPr lang="es-ES" dirty="0"/>
           </a:p>
@@ -15009,12 +15181,50 @@
           </a:p>
         </p:txBody>
       </p:sp>
+      <p:sp>
+        <p:nvSpPr>
+          <p:cNvPr id="16" name="Marcador de pie de página 56">
+            <a:extLst>
+              <a:ext uri="{FF2B5EF4-FFF2-40B4-BE49-F238E27FC236}">
+                <a16:creationId xmlns:a16="http://schemas.microsoft.com/office/drawing/2014/main" id="{CCB864C7-E6EE-4585-0CA8-B3318E44A37F}"/>
+              </a:ext>
+            </a:extLst>
+          </p:cNvPr>
+          <p:cNvSpPr>
+            <a:spLocks noGrp="1"/>
+          </p:cNvSpPr>
+          <p:nvPr>
+            <p:ph type="ftr" sz="quarter" idx="11"/>
+          </p:nvPr>
+        </p:nvSpPr>
+        <p:spPr>
+          <a:xfrm>
+            <a:off x="4038600" y="6356350"/>
+            <a:ext cx="4114800" cy="365125"/>
+          </a:xfrm>
+        </p:spPr>
+        <p:txBody>
+          <a:bodyPr rtlCol="0"/>
+          <a:lstStyle>
+            <a:defPPr>
+              <a:defRPr lang="es-ES"/>
+            </a:defPPr>
+          </a:lstStyle>
+          <a:p>
+            <a:pPr rtl="0"/>
+            <a:r>
+              <a:rPr lang="es-ES" dirty="0"/>
+              <a:t>FORBES HIGHEST PAYING ATHLETES ANALYSIS</a:t>
+            </a:r>
+          </a:p>
+        </p:txBody>
+      </p:sp>
       <p:pic>
         <p:nvPicPr>
-          <p:cNvPr id="12" name="Picture 11">
-            <a:extLst>
-              <a:ext uri="{FF2B5EF4-FFF2-40B4-BE49-F238E27FC236}">
-                <a16:creationId xmlns:a16="http://schemas.microsoft.com/office/drawing/2014/main" id="{CD8A96B9-9D83-6DF1-D009-6FD5AF978E41}"/>
+          <p:cNvPr id="24" name="Picture 23">
+            <a:extLst>
+              <a:ext uri="{FF2B5EF4-FFF2-40B4-BE49-F238E27FC236}">
+                <a16:creationId xmlns:a16="http://schemas.microsoft.com/office/drawing/2014/main" id="{43F86848-F367-C172-5420-2F2DDD93E76B}"/>
               </a:ext>
             </a:extLst>
           </p:cNvPr>
@@ -15031,7 +15241,7 @@
         </p:blipFill>
         <p:spPr>
           <a:xfrm>
-            <a:off x="0" y="36511"/>
+            <a:off x="0" y="177799"/>
             <a:ext cx="12192000" cy="6502401"/>
           </a:xfrm>
           <a:prstGeom prst="rect">
@@ -15039,48 +15249,10 @@
           </a:prstGeom>
         </p:spPr>
       </p:pic>
-      <p:sp>
-        <p:nvSpPr>
-          <p:cNvPr id="16" name="Marcador de pie de página 56">
-            <a:extLst>
-              <a:ext uri="{FF2B5EF4-FFF2-40B4-BE49-F238E27FC236}">
-                <a16:creationId xmlns:a16="http://schemas.microsoft.com/office/drawing/2014/main" id="{CCB864C7-E6EE-4585-0CA8-B3318E44A37F}"/>
-              </a:ext>
-            </a:extLst>
-          </p:cNvPr>
-          <p:cNvSpPr>
-            <a:spLocks noGrp="1"/>
-          </p:cNvSpPr>
-          <p:nvPr>
-            <p:ph type="ftr" sz="quarter" idx="11"/>
-          </p:nvPr>
-        </p:nvSpPr>
-        <p:spPr>
-          <a:xfrm>
-            <a:off x="4038600" y="6356350"/>
-            <a:ext cx="4114800" cy="365125"/>
-          </a:xfrm>
-        </p:spPr>
-        <p:txBody>
-          <a:bodyPr rtlCol="0"/>
-          <a:lstStyle>
-            <a:defPPr>
-              <a:defRPr lang="es-ES"/>
-            </a:defPPr>
-          </a:lstStyle>
-          <a:p>
-            <a:pPr rtl="0"/>
-            <a:r>
-              <a:rPr lang="es-ES" dirty="0"/>
-              <a:t>FORBES HIGHEST PAYING ATHLETES ANALYSIS</a:t>
-            </a:r>
-          </a:p>
-        </p:txBody>
-      </p:sp>
     </p:spTree>
     <p:extLst>
       <p:ext uri="{BB962C8B-B14F-4D97-AF65-F5344CB8AC3E}">
-        <p14:creationId xmlns:p14="http://schemas.microsoft.com/office/powerpoint/2010/main" val="3590459948"/>
+        <p14:creationId xmlns:p14="http://schemas.microsoft.com/office/powerpoint/2010/main" val="384096794"/>
       </p:ext>
     </p:extLst>
   </p:cSld>
@@ -15248,82 +15420,6 @@
       </p:sp>
       <p:sp>
         <p:nvSpPr>
-          <p:cNvPr id="7" name="Marcador de fecha 6">
-            <a:extLst>
-              <a:ext uri="{FF2B5EF4-FFF2-40B4-BE49-F238E27FC236}">
-                <a16:creationId xmlns:a16="http://schemas.microsoft.com/office/drawing/2014/main" id="{B2A46C4A-D036-4440-BB64-6754F4FF27C1}"/>
-              </a:ext>
-            </a:extLst>
-          </p:cNvPr>
-          <p:cNvSpPr>
-            <a:spLocks noGrp="1"/>
-          </p:cNvSpPr>
-          <p:nvPr>
-            <p:ph type="dt" sz="half" idx="10"/>
-          </p:nvPr>
-        </p:nvSpPr>
-        <p:spPr>
-          <a:xfrm>
-            <a:off x="838200" y="6356350"/>
-            <a:ext cx="2743200" cy="365125"/>
-          </a:xfrm>
-        </p:spPr>
-        <p:txBody>
-          <a:bodyPr rtlCol="0"/>
-          <a:lstStyle>
-            <a:defPPr>
-              <a:defRPr lang="es-ES"/>
-            </a:defPPr>
-          </a:lstStyle>
-          <a:p>
-            <a:pPr rtl="0"/>
-            <a:r>
-              <a:rPr lang="es-ES" dirty="0"/>
-              <a:t>20XX</a:t>
-            </a:r>
-          </a:p>
-        </p:txBody>
-      </p:sp>
-      <p:sp>
-        <p:nvSpPr>
-          <p:cNvPr id="8" name="Marcador de pie de página 7">
-            <a:extLst>
-              <a:ext uri="{FF2B5EF4-FFF2-40B4-BE49-F238E27FC236}">
-                <a16:creationId xmlns:a16="http://schemas.microsoft.com/office/drawing/2014/main" id="{905F172A-5D5D-43CD-A187-DA0D303F4144}"/>
-              </a:ext>
-            </a:extLst>
-          </p:cNvPr>
-          <p:cNvSpPr>
-            <a:spLocks noGrp="1"/>
-          </p:cNvSpPr>
-          <p:nvPr>
-            <p:ph type="ftr" sz="quarter" idx="11"/>
-          </p:nvPr>
-        </p:nvSpPr>
-        <p:spPr>
-          <a:xfrm>
-            <a:off x="4038600" y="6356350"/>
-            <a:ext cx="4114800" cy="365125"/>
-          </a:xfrm>
-        </p:spPr>
-        <p:txBody>
-          <a:bodyPr rtlCol="0"/>
-          <a:lstStyle>
-            <a:defPPr>
-              <a:defRPr lang="es-ES"/>
-            </a:defPPr>
-          </a:lstStyle>
-          <a:p>
-            <a:pPr rtl="0"/>
-            <a:r>
-              <a:rPr lang="es-ES" dirty="0"/>
-              <a:t>TÍTULO DE LA PRESENTACIÓN</a:t>
-            </a:r>
-          </a:p>
-        </p:txBody>
-      </p:sp>
-      <p:sp>
-        <p:nvSpPr>
           <p:cNvPr id="9" name="Marcador de número de diapositiva 8">
             <a:extLst>
               <a:ext uri="{FF2B5EF4-FFF2-40B4-BE49-F238E27FC236}">
@@ -15362,12 +15458,50 @@
           </a:p>
         </p:txBody>
       </p:sp>
+      <p:sp>
+        <p:nvSpPr>
+          <p:cNvPr id="16" name="Marcador de pie de página 56">
+            <a:extLst>
+              <a:ext uri="{FF2B5EF4-FFF2-40B4-BE49-F238E27FC236}">
+                <a16:creationId xmlns:a16="http://schemas.microsoft.com/office/drawing/2014/main" id="{CCB864C7-E6EE-4585-0CA8-B3318E44A37F}"/>
+              </a:ext>
+            </a:extLst>
+          </p:cNvPr>
+          <p:cNvSpPr>
+            <a:spLocks noGrp="1"/>
+          </p:cNvSpPr>
+          <p:nvPr>
+            <p:ph type="ftr" sz="quarter" idx="11"/>
+          </p:nvPr>
+        </p:nvSpPr>
+        <p:spPr>
+          <a:xfrm>
+            <a:off x="4038600" y="6356350"/>
+            <a:ext cx="4114800" cy="365125"/>
+          </a:xfrm>
+        </p:spPr>
+        <p:txBody>
+          <a:bodyPr rtlCol="0"/>
+          <a:lstStyle>
+            <a:defPPr>
+              <a:defRPr lang="es-ES"/>
+            </a:defPPr>
+          </a:lstStyle>
+          <a:p>
+            <a:pPr rtl="0"/>
+            <a:r>
+              <a:rPr lang="es-ES" dirty="0"/>
+              <a:t>FORBES HIGHEST PAYING ATHLETES ANALYSIS</a:t>
+            </a:r>
+          </a:p>
+        </p:txBody>
+      </p:sp>
       <p:pic>
         <p:nvPicPr>
-          <p:cNvPr id="13" name="Picture 12" descr="A screen shot of a graph&#10;&#10;Description automatically generated">
-            <a:extLst>
-              <a:ext uri="{FF2B5EF4-FFF2-40B4-BE49-F238E27FC236}">
-                <a16:creationId xmlns:a16="http://schemas.microsoft.com/office/drawing/2014/main" id="{E60AB1D9-9C5A-747D-509D-E89744A34532}"/>
+          <p:cNvPr id="8" name="Picture 7">
+            <a:extLst>
+              <a:ext uri="{FF2B5EF4-FFF2-40B4-BE49-F238E27FC236}">
+                <a16:creationId xmlns:a16="http://schemas.microsoft.com/office/drawing/2014/main" id="{6CB5EC07-EC15-7284-387E-7D3E4B92E003}"/>
               </a:ext>
             </a:extLst>
           </p:cNvPr>
@@ -15384,174 +15518,18 @@
         </p:blipFill>
         <p:spPr>
           <a:xfrm>
-            <a:off x="952500" y="-270704"/>
-            <a:ext cx="10287000" cy="6858000"/>
+            <a:off x="0" y="177799"/>
+            <a:ext cx="12192000" cy="6502401"/>
           </a:xfrm>
           <a:prstGeom prst="rect">
             <a:avLst/>
           </a:prstGeom>
         </p:spPr>
       </p:pic>
-      <p:sp>
-        <p:nvSpPr>
-          <p:cNvPr id="3" name="Oval 2">
-            <a:extLst>
-              <a:ext uri="{FF2B5EF4-FFF2-40B4-BE49-F238E27FC236}">
-                <a16:creationId xmlns:a16="http://schemas.microsoft.com/office/drawing/2014/main" id="{6998A596-109F-B8E6-01A0-E9158D7D8FC0}"/>
-              </a:ext>
-            </a:extLst>
-          </p:cNvPr>
-          <p:cNvSpPr/>
-          <p:nvPr/>
-        </p:nvSpPr>
-        <p:spPr>
-          <a:xfrm>
-            <a:off x="8379242" y="553419"/>
-            <a:ext cx="542236" cy="520008"/>
-          </a:xfrm>
-          <a:prstGeom prst="ellipse">
-            <a:avLst/>
-          </a:prstGeom>
-          <a:noFill/>
-          <a:ln w="28575">
-            <a:solidFill>
-              <a:srgbClr val="AE2012"/>
-            </a:solidFill>
-          </a:ln>
-        </p:spPr>
-        <p:style>
-          <a:lnRef idx="2">
-            <a:schemeClr val="accent1">
-              <a:shade val="15000"/>
-            </a:schemeClr>
-          </a:lnRef>
-          <a:fillRef idx="1">
-            <a:schemeClr val="accent1"/>
-          </a:fillRef>
-          <a:effectRef idx="0">
-            <a:schemeClr val="accent1"/>
-          </a:effectRef>
-          <a:fontRef idx="minor">
-            <a:schemeClr val="lt1"/>
-          </a:fontRef>
-        </p:style>
-        <p:txBody>
-          <a:bodyPr rtlCol="0" anchor="ctr"/>
-          <a:lstStyle/>
-          <a:p>
-            <a:pPr algn="ctr"/>
-            <a:endParaRPr lang="es-US" dirty="0"/>
-          </a:p>
-        </p:txBody>
-      </p:sp>
-      <p:sp>
-        <p:nvSpPr>
-          <p:cNvPr id="5" name="Oval 4">
-            <a:extLst>
-              <a:ext uri="{FF2B5EF4-FFF2-40B4-BE49-F238E27FC236}">
-                <a16:creationId xmlns:a16="http://schemas.microsoft.com/office/drawing/2014/main" id="{C7C02EDF-94D5-CA69-341D-1FC4D160C02F}"/>
-              </a:ext>
-            </a:extLst>
-          </p:cNvPr>
-          <p:cNvSpPr/>
-          <p:nvPr/>
-        </p:nvSpPr>
-        <p:spPr>
-          <a:xfrm>
-            <a:off x="9093212" y="1068592"/>
-            <a:ext cx="542236" cy="520008"/>
-          </a:xfrm>
-          <a:prstGeom prst="ellipse">
-            <a:avLst/>
-          </a:prstGeom>
-          <a:noFill/>
-          <a:ln w="28575">
-            <a:solidFill>
-              <a:srgbClr val="AE2012"/>
-            </a:solidFill>
-          </a:ln>
-        </p:spPr>
-        <p:style>
-          <a:lnRef idx="2">
-            <a:schemeClr val="accent1">
-              <a:shade val="15000"/>
-            </a:schemeClr>
-          </a:lnRef>
-          <a:fillRef idx="1">
-            <a:schemeClr val="accent1"/>
-          </a:fillRef>
-          <a:effectRef idx="0">
-            <a:schemeClr val="accent1"/>
-          </a:effectRef>
-          <a:fontRef idx="minor">
-            <a:schemeClr val="lt1"/>
-          </a:fontRef>
-        </p:style>
-        <p:txBody>
-          <a:bodyPr rtlCol="0" anchor="ctr"/>
-          <a:lstStyle/>
-          <a:p>
-            <a:pPr algn="ctr"/>
-            <a:endParaRPr lang="es-US" dirty="0"/>
-          </a:p>
-        </p:txBody>
-      </p:sp>
-      <p:sp>
-        <p:nvSpPr>
-          <p:cNvPr id="10" name="Oval 9">
-            <a:extLst>
-              <a:ext uri="{FF2B5EF4-FFF2-40B4-BE49-F238E27FC236}">
-                <a16:creationId xmlns:a16="http://schemas.microsoft.com/office/drawing/2014/main" id="{64A443F8-ECCA-45EA-A97B-BE2AF1627D03}"/>
-              </a:ext>
-            </a:extLst>
-          </p:cNvPr>
-          <p:cNvSpPr/>
-          <p:nvPr/>
-        </p:nvSpPr>
-        <p:spPr>
-          <a:xfrm>
-            <a:off x="8372608" y="2892446"/>
-            <a:ext cx="542236" cy="520008"/>
-          </a:xfrm>
-          <a:prstGeom prst="ellipse">
-            <a:avLst/>
-          </a:prstGeom>
-          <a:noFill/>
-          <a:ln w="28575">
-            <a:solidFill>
-              <a:srgbClr val="AE2012"/>
-            </a:solidFill>
-          </a:ln>
-        </p:spPr>
-        <p:style>
-          <a:lnRef idx="2">
-            <a:schemeClr val="accent1">
-              <a:shade val="15000"/>
-            </a:schemeClr>
-          </a:lnRef>
-          <a:fillRef idx="1">
-            <a:schemeClr val="accent1"/>
-          </a:fillRef>
-          <a:effectRef idx="0">
-            <a:schemeClr val="accent1"/>
-          </a:effectRef>
-          <a:fontRef idx="minor">
-            <a:schemeClr val="lt1"/>
-          </a:fontRef>
-        </p:style>
-        <p:txBody>
-          <a:bodyPr rtlCol="0" anchor="ctr"/>
-          <a:lstStyle/>
-          <a:p>
-            <a:pPr algn="ctr"/>
-            <a:endParaRPr lang="es-US" dirty="0"/>
-          </a:p>
-        </p:txBody>
-      </p:sp>
     </p:spTree>
     <p:extLst>
       <p:ext uri="{BB962C8B-B14F-4D97-AF65-F5344CB8AC3E}">
-        <p14:creationId xmlns:p14="http://schemas.microsoft.com/office/powerpoint/2010/main" val="144498883"/>
+        <p14:creationId xmlns:p14="http://schemas.microsoft.com/office/powerpoint/2010/main" val="3769297908"/>
       </p:ext>
     </p:extLst>
   </p:cSld>
@@ -15719,82 +15697,6 @@
       </p:sp>
       <p:sp>
         <p:nvSpPr>
-          <p:cNvPr id="7" name="Marcador de fecha 6">
-            <a:extLst>
-              <a:ext uri="{FF2B5EF4-FFF2-40B4-BE49-F238E27FC236}">
-                <a16:creationId xmlns:a16="http://schemas.microsoft.com/office/drawing/2014/main" id="{B2A46C4A-D036-4440-BB64-6754F4FF27C1}"/>
-              </a:ext>
-            </a:extLst>
-          </p:cNvPr>
-          <p:cNvSpPr>
-            <a:spLocks noGrp="1"/>
-          </p:cNvSpPr>
-          <p:nvPr>
-            <p:ph type="dt" sz="half" idx="10"/>
-          </p:nvPr>
-        </p:nvSpPr>
-        <p:spPr>
-          <a:xfrm>
-            <a:off x="838200" y="6356350"/>
-            <a:ext cx="2743200" cy="365125"/>
-          </a:xfrm>
-        </p:spPr>
-        <p:txBody>
-          <a:bodyPr rtlCol="0"/>
-          <a:lstStyle>
-            <a:defPPr>
-              <a:defRPr lang="es-ES"/>
-            </a:defPPr>
-          </a:lstStyle>
-          <a:p>
-            <a:pPr rtl="0"/>
-            <a:r>
-              <a:rPr lang="es-ES" dirty="0"/>
-              <a:t>20XX</a:t>
-            </a:r>
-          </a:p>
-        </p:txBody>
-      </p:sp>
-      <p:sp>
-        <p:nvSpPr>
-          <p:cNvPr id="8" name="Marcador de pie de página 7">
-            <a:extLst>
-              <a:ext uri="{FF2B5EF4-FFF2-40B4-BE49-F238E27FC236}">
-                <a16:creationId xmlns:a16="http://schemas.microsoft.com/office/drawing/2014/main" id="{905F172A-5D5D-43CD-A187-DA0D303F4144}"/>
-              </a:ext>
-            </a:extLst>
-          </p:cNvPr>
-          <p:cNvSpPr>
-            <a:spLocks noGrp="1"/>
-          </p:cNvSpPr>
-          <p:nvPr>
-            <p:ph type="ftr" sz="quarter" idx="11"/>
-          </p:nvPr>
-        </p:nvSpPr>
-        <p:spPr>
-          <a:xfrm>
-            <a:off x="4038600" y="6356350"/>
-            <a:ext cx="4114800" cy="365125"/>
-          </a:xfrm>
-        </p:spPr>
-        <p:txBody>
-          <a:bodyPr rtlCol="0"/>
-          <a:lstStyle>
-            <a:defPPr>
-              <a:defRPr lang="es-ES"/>
-            </a:defPPr>
-          </a:lstStyle>
-          <a:p>
-            <a:pPr rtl="0"/>
-            <a:r>
-              <a:rPr lang="es-ES" dirty="0"/>
-              <a:t>TÍTULO DE LA PRESENTACIÓN</a:t>
-            </a:r>
-          </a:p>
-        </p:txBody>
-      </p:sp>
-      <p:sp>
-        <p:nvSpPr>
           <p:cNvPr id="9" name="Marcador de número de diapositiva 8">
             <a:extLst>
               <a:ext uri="{FF2B5EF4-FFF2-40B4-BE49-F238E27FC236}">
@@ -15835,10 +15737,10 @@
       </p:sp>
       <p:pic>
         <p:nvPicPr>
-          <p:cNvPr id="11" name="Picture 10">
-            <a:extLst>
-              <a:ext uri="{FF2B5EF4-FFF2-40B4-BE49-F238E27FC236}">
-                <a16:creationId xmlns:a16="http://schemas.microsoft.com/office/drawing/2014/main" id="{0014701C-A515-45B2-03F5-C4EF3D5AD0B3}"/>
+          <p:cNvPr id="12" name="Picture 11">
+            <a:extLst>
+              <a:ext uri="{FF2B5EF4-FFF2-40B4-BE49-F238E27FC236}">
+                <a16:creationId xmlns:a16="http://schemas.microsoft.com/office/drawing/2014/main" id="{CD8A96B9-9D83-6DF1-D009-6FD5AF978E41}"/>
               </a:ext>
             </a:extLst>
           </p:cNvPr>
@@ -15855,139 +15757,56 @@
         </p:blipFill>
         <p:spPr>
           <a:xfrm>
-            <a:off x="1085282" y="333698"/>
-            <a:ext cx="4437499" cy="5498775"/>
+            <a:off x="0" y="36511"/>
+            <a:ext cx="12192000" cy="6502401"/>
           </a:xfrm>
           <a:prstGeom prst="rect">
             <a:avLst/>
           </a:prstGeom>
         </p:spPr>
       </p:pic>
-      <p:pic>
-        <p:nvPicPr>
-          <p:cNvPr id="14" name="Picture 13">
-            <a:extLst>
-              <a:ext uri="{FF2B5EF4-FFF2-40B4-BE49-F238E27FC236}">
-                <a16:creationId xmlns:a16="http://schemas.microsoft.com/office/drawing/2014/main" id="{A881FA41-88CD-A684-62A8-FD4B7D8A17D4}"/>
-              </a:ext>
-            </a:extLst>
-          </p:cNvPr>
-          <p:cNvPicPr>
-            <a:picLocks noChangeAspect="1"/>
-          </p:cNvPicPr>
-          <p:nvPr/>
-        </p:nvPicPr>
-        <p:blipFill>
-          <a:blip r:embed="rId4"/>
-          <a:stretch>
-            <a:fillRect/>
-          </a:stretch>
-        </p:blipFill>
-        <p:spPr>
-          <a:xfrm>
-            <a:off x="7239001" y="333698"/>
-            <a:ext cx="4114800" cy="5498775"/>
-          </a:xfrm>
-          <a:prstGeom prst="rect">
-            <a:avLst/>
-          </a:prstGeom>
-        </p:spPr>
-      </p:pic>
-      <p:sp>
-        <p:nvSpPr>
-          <p:cNvPr id="15" name="TextBox 14">
-            <a:extLst>
-              <a:ext uri="{FF2B5EF4-FFF2-40B4-BE49-F238E27FC236}">
-                <a16:creationId xmlns:a16="http://schemas.microsoft.com/office/drawing/2014/main" id="{FF61D288-9C04-EAA5-40C4-740D1B4F638F}"/>
-              </a:ext>
-            </a:extLst>
-          </p:cNvPr>
-          <p:cNvSpPr txBox="1"/>
-          <p:nvPr/>
-        </p:nvSpPr>
-        <p:spPr>
-          <a:xfrm>
-            <a:off x="8280134" y="5909745"/>
-            <a:ext cx="2203704" cy="369332"/>
-          </a:xfrm>
-          <a:prstGeom prst="rect">
-            <a:avLst/>
-          </a:prstGeom>
-          <a:noFill/>
-        </p:spPr>
-        <p:txBody>
-          <a:bodyPr wrap="square" rtlCol="0">
-            <a:spAutoFit/>
-          </a:bodyPr>
-          <a:lstStyle/>
-          <a:p>
-            <a:r>
-              <a:rPr lang="en-US" dirty="0">
-                <a:solidFill>
-                  <a:schemeClr val="bg1"/>
-                </a:solidFill>
-              </a:rPr>
-              <a:t>Image from Forbes</a:t>
-            </a:r>
-          </a:p>
-        </p:txBody>
-      </p:sp>
-      <p:sp>
-        <p:nvSpPr>
-          <p:cNvPr id="16" name="TextBox 15">
-            <a:extLst>
-              <a:ext uri="{FF2B5EF4-FFF2-40B4-BE49-F238E27FC236}">
-                <a16:creationId xmlns:a16="http://schemas.microsoft.com/office/drawing/2014/main" id="{8E11B57D-925A-58EE-040B-FECEB23EABF7}"/>
-              </a:ext>
-            </a:extLst>
-          </p:cNvPr>
-          <p:cNvSpPr txBox="1"/>
-          <p:nvPr/>
-        </p:nvSpPr>
-        <p:spPr>
-          <a:xfrm>
-            <a:off x="2372109" y="5909745"/>
-            <a:ext cx="1863844" cy="369332"/>
-          </a:xfrm>
-          <a:prstGeom prst="rect">
-            <a:avLst/>
-          </a:prstGeom>
-          <a:noFill/>
-        </p:spPr>
-        <p:txBody>
-          <a:bodyPr wrap="none" rtlCol="0">
-            <a:spAutoFit/>
-          </a:bodyPr>
-          <a:lstStyle/>
-          <a:p>
-            <a:r>
-              <a:rPr lang="en-US" dirty="0">
-                <a:solidFill>
-                  <a:schemeClr val="bg1"/>
-                </a:solidFill>
-              </a:rPr>
-              <a:t>Photo from </a:t>
-            </a:r>
-            <a:r>
-              <a:rPr lang="en-US" dirty="0" err="1">
-                <a:solidFill>
-                  <a:schemeClr val="bg1"/>
-                </a:solidFill>
-              </a:rPr>
-              <a:t>Imdb</a:t>
-            </a:r>
-            <a:endParaRPr lang="en-US" dirty="0">
-              <a:solidFill>
-                <a:schemeClr val="bg1"/>
-              </a:solidFill>
-            </a:endParaRPr>
+      <p:sp>
+        <p:nvSpPr>
+          <p:cNvPr id="16" name="Marcador de pie de página 56">
+            <a:extLst>
+              <a:ext uri="{FF2B5EF4-FFF2-40B4-BE49-F238E27FC236}">
+                <a16:creationId xmlns:a16="http://schemas.microsoft.com/office/drawing/2014/main" id="{CCB864C7-E6EE-4585-0CA8-B3318E44A37F}"/>
+              </a:ext>
+            </a:extLst>
+          </p:cNvPr>
+          <p:cNvSpPr>
+            <a:spLocks noGrp="1"/>
+          </p:cNvSpPr>
+          <p:nvPr>
+            <p:ph type="ftr" sz="quarter" idx="11"/>
+          </p:nvPr>
+        </p:nvSpPr>
+        <p:spPr>
+          <a:xfrm>
+            <a:off x="4038600" y="6356350"/>
+            <a:ext cx="4114800" cy="365125"/>
+          </a:xfrm>
+        </p:spPr>
+        <p:txBody>
+          <a:bodyPr rtlCol="0"/>
+          <a:lstStyle>
+            <a:defPPr>
+              <a:defRPr lang="es-ES"/>
+            </a:defPPr>
+          </a:lstStyle>
+          <a:p>
+            <a:pPr rtl="0"/>
+            <a:r>
+              <a:rPr lang="es-ES" dirty="0"/>
+              <a:t>FORBES HIGHEST PAYING ATHLETES ANALYSIS</a:t>
+            </a:r>
           </a:p>
         </p:txBody>
       </p:sp>
     </p:spTree>
     <p:extLst>
       <p:ext uri="{BB962C8B-B14F-4D97-AF65-F5344CB8AC3E}">
-        <p14:creationId xmlns:p14="http://schemas.microsoft.com/office/powerpoint/2010/main" val="4070989650"/>
+        <p14:creationId xmlns:p14="http://schemas.microsoft.com/office/powerpoint/2010/main" val="3590459948"/>
       </p:ext>
     </p:extLst>
   </p:cSld>
@@ -16016,10 +15835,10 @@
       </p:grpSpPr>
       <p:sp>
         <p:nvSpPr>
-          <p:cNvPr id="3" name="Título 2">
-            <a:extLst>
-              <a:ext uri="{FF2B5EF4-FFF2-40B4-BE49-F238E27FC236}">
-                <a16:creationId xmlns:a16="http://schemas.microsoft.com/office/drawing/2014/main" id="{77762301-F83A-4BEA-9D11-E6C99FB574A8}"/>
+          <p:cNvPr id="2" name="Título 1">
+            <a:extLst>
+              <a:ext uri="{FF2B5EF4-FFF2-40B4-BE49-F238E27FC236}">
+                <a16:creationId xmlns:a16="http://schemas.microsoft.com/office/drawing/2014/main" id="{09140014-73D5-419B-8867-972BB18D52D4}"/>
               </a:ext>
             </a:extLst>
           </p:cNvPr>
@@ -16032,8 +15851,8 @@
         </p:nvSpPr>
         <p:spPr>
           <a:xfrm>
-            <a:off x="838200" y="365125"/>
-            <a:ext cx="10515600" cy="1325563"/>
+            <a:off x="2933700" y="892177"/>
+            <a:ext cx="8421688" cy="1325563"/>
           </a:xfrm>
         </p:spPr>
         <p:txBody>
@@ -16047,35 +15866,37 @@
             <a:pPr rtl="0"/>
             <a:r>
               <a:rPr lang="es-ES" dirty="0"/>
-              <a:t>Top yearly earnings</a:t>
-            </a:r>
-          </a:p>
-        </p:txBody>
-      </p:sp>
-      <p:sp>
-        <p:nvSpPr>
-          <p:cNvPr id="6" name="Marcador de fecha 5">
-            <a:extLst>
-              <a:ext uri="{FF2B5EF4-FFF2-40B4-BE49-F238E27FC236}">
-                <a16:creationId xmlns:a16="http://schemas.microsoft.com/office/drawing/2014/main" id="{3627CC26-34EF-4BB9-B289-9EC56B07D1E6}"/>
-              </a:ext>
-            </a:extLst>
-          </p:cNvPr>
-          <p:cNvSpPr>
-            <a:spLocks noGrp="1"/>
-          </p:cNvSpPr>
-          <p:nvPr>
-            <p:ph type="dt" sz="half" idx="10"/>
-          </p:nvPr>
-        </p:nvSpPr>
-        <p:spPr>
-          <a:xfrm>
-            <a:off x="838200" y="6356350"/>
-            <a:ext cx="2743200" cy="365125"/>
-          </a:xfrm>
-        </p:spPr>
-        <p:txBody>
-          <a:bodyPr rtlCol="0"/>
+              <a:t>ÁREAS DE ENFOQUE</a:t>
+            </a:r>
+          </a:p>
+        </p:txBody>
+      </p:sp>
+      <p:sp>
+        <p:nvSpPr>
+          <p:cNvPr id="4" name="Marcador de contenido 3">
+            <a:extLst>
+              <a:ext uri="{FF2B5EF4-FFF2-40B4-BE49-F238E27FC236}">
+                <a16:creationId xmlns:a16="http://schemas.microsoft.com/office/drawing/2014/main" id="{33D8731E-4977-402E-8BFD-895B4D0544CC}"/>
+              </a:ext>
+            </a:extLst>
+          </p:cNvPr>
+          <p:cNvSpPr>
+            <a:spLocks noGrp="1"/>
+          </p:cNvSpPr>
+          <p:nvPr>
+            <p:ph sz="half" idx="2"/>
+          </p:nvPr>
+        </p:nvSpPr>
+        <p:spPr>
+          <a:xfrm>
+            <a:off x="2933700" y="3834606"/>
+            <a:ext cx="3924300" cy="1997867"/>
+          </a:xfrm>
+        </p:spPr>
+        <p:txBody>
+          <a:bodyPr rtlCol="0">
+            <a:normAutofit/>
+          </a:bodyPr>
           <a:lstStyle>
             <a:defPPr>
               <a:defRPr lang="es-ES"/>
@@ -16085,35 +15906,51 @@
             <a:pPr rtl="0"/>
             <a:r>
               <a:rPr lang="es-ES" dirty="0"/>
-              <a:t>20XX</a:t>
-            </a:r>
-          </a:p>
-        </p:txBody>
-      </p:sp>
-      <p:sp>
-        <p:nvSpPr>
-          <p:cNvPr id="7" name="Marcador de pie de página 6">
-            <a:extLst>
-              <a:ext uri="{FF2B5EF4-FFF2-40B4-BE49-F238E27FC236}">
-                <a16:creationId xmlns:a16="http://schemas.microsoft.com/office/drawing/2014/main" id="{4E98E6AD-9D37-499C-898E-ED12AC36D31D}"/>
-              </a:ext>
-            </a:extLst>
-          </p:cNvPr>
-          <p:cNvSpPr>
-            <a:spLocks noGrp="1"/>
-          </p:cNvSpPr>
-          <p:nvPr>
-            <p:ph type="ftr" sz="quarter" idx="11"/>
-          </p:nvPr>
-        </p:nvSpPr>
-        <p:spPr>
-          <a:xfrm>
-            <a:off x="4038600" y="6356350"/>
-            <a:ext cx="4114800" cy="365125"/>
-          </a:xfrm>
-        </p:spPr>
-        <p:txBody>
-          <a:bodyPr rtlCol="0"/>
+              <a:t>Desarrollar estrategias ganadoras para seguir a la vanguardia de la competencia</a:t>
+            </a:r>
+          </a:p>
+          <a:p>
+            <a:pPr rtl="0"/>
+            <a:r>
+              <a:rPr lang="es-ES" dirty="0"/>
+              <a:t>​Aprovechar los frutos obtenidos para identificar un valor en el terreno de juego</a:t>
+            </a:r>
+          </a:p>
+          <a:p>
+            <a:pPr rtl="0"/>
+            <a:r>
+              <a:rPr lang="es-ES" dirty="0"/>
+              <a:t>​Visualizar la convergencia dirigida al cliente</a:t>
+            </a:r>
+          </a:p>
+        </p:txBody>
+      </p:sp>
+      <p:sp>
+        <p:nvSpPr>
+          <p:cNvPr id="6" name="Marcador de contenido 5">
+            <a:extLst>
+              <a:ext uri="{FF2B5EF4-FFF2-40B4-BE49-F238E27FC236}">
+                <a16:creationId xmlns:a16="http://schemas.microsoft.com/office/drawing/2014/main" id="{50B65871-FA95-449A-B8BC-90486DE532EF}"/>
+              </a:ext>
+            </a:extLst>
+          </p:cNvPr>
+          <p:cNvSpPr>
+            <a:spLocks noGrp="1"/>
+          </p:cNvSpPr>
+          <p:nvPr>
+            <p:ph sz="quarter" idx="4"/>
+          </p:nvPr>
+        </p:nvSpPr>
+        <p:spPr>
+          <a:xfrm>
+            <a:off x="7410173" y="3834606"/>
+            <a:ext cx="3943627" cy="1997867"/>
+          </a:xfrm>
+        </p:spPr>
+        <p:txBody>
+          <a:bodyPr rtlCol="0">
+            <a:normAutofit/>
+          </a:bodyPr>
           <a:lstStyle>
             <a:defPPr>
               <a:defRPr lang="es-ES"/>
@@ -16123,6 +15960,89 @@
             <a:pPr rtl="0"/>
             <a:r>
               <a:rPr lang="es-ES" dirty="0"/>
+              <a:t>Enfoques iterativos para una estrategia corporativa</a:t>
+            </a:r>
+          </a:p>
+          <a:p>
+            <a:pPr rtl="0"/>
+            <a:r>
+              <a:rPr lang="es-ES" dirty="0"/>
+              <a:t>​Establecer un marco de administración desde dentro</a:t>
+            </a:r>
+          </a:p>
+        </p:txBody>
+      </p:sp>
+      <p:sp>
+        <p:nvSpPr>
+          <p:cNvPr id="7" name="Marcador de fecha 6">
+            <a:extLst>
+              <a:ext uri="{FF2B5EF4-FFF2-40B4-BE49-F238E27FC236}">
+                <a16:creationId xmlns:a16="http://schemas.microsoft.com/office/drawing/2014/main" id="{B2A46C4A-D036-4440-BB64-6754F4FF27C1}"/>
+              </a:ext>
+            </a:extLst>
+          </p:cNvPr>
+          <p:cNvSpPr>
+            <a:spLocks noGrp="1"/>
+          </p:cNvSpPr>
+          <p:nvPr>
+            <p:ph type="dt" sz="half" idx="10"/>
+          </p:nvPr>
+        </p:nvSpPr>
+        <p:spPr>
+          <a:xfrm>
+            <a:off x="838200" y="6356350"/>
+            <a:ext cx="2743200" cy="365125"/>
+          </a:xfrm>
+        </p:spPr>
+        <p:txBody>
+          <a:bodyPr rtlCol="0"/>
+          <a:lstStyle>
+            <a:defPPr>
+              <a:defRPr lang="es-ES"/>
+            </a:defPPr>
+          </a:lstStyle>
+          <a:p>
+            <a:pPr rtl="0"/>
+            <a:r>
+              <a:rPr lang="es-ES" dirty="0"/>
+              <a:t>20XX</a:t>
+            </a:r>
+          </a:p>
+        </p:txBody>
+      </p:sp>
+      <p:sp>
+        <p:nvSpPr>
+          <p:cNvPr id="8" name="Marcador de pie de página 7">
+            <a:extLst>
+              <a:ext uri="{FF2B5EF4-FFF2-40B4-BE49-F238E27FC236}">
+                <a16:creationId xmlns:a16="http://schemas.microsoft.com/office/drawing/2014/main" id="{905F172A-5D5D-43CD-A187-DA0D303F4144}"/>
+              </a:ext>
+            </a:extLst>
+          </p:cNvPr>
+          <p:cNvSpPr>
+            <a:spLocks noGrp="1"/>
+          </p:cNvSpPr>
+          <p:nvPr>
+            <p:ph type="ftr" sz="quarter" idx="11"/>
+          </p:nvPr>
+        </p:nvSpPr>
+        <p:spPr>
+          <a:xfrm>
+            <a:off x="4038600" y="6356350"/>
+            <a:ext cx="4114800" cy="365125"/>
+          </a:xfrm>
+        </p:spPr>
+        <p:txBody>
+          <a:bodyPr rtlCol="0"/>
+          <a:lstStyle>
+            <a:defPPr>
+              <a:defRPr lang="es-ES"/>
+            </a:defPPr>
+          </a:lstStyle>
+          <a:p>
+            <a:pPr rtl="0"/>
+            <a:r>
+              <a:rPr lang="es-ES" dirty="0"/>
               <a:t>TÍTULO DE LA PRESENTACIÓN</a:t>
             </a:r>
           </a:p>
@@ -16130,10 +16050,10 @@
       </p:sp>
       <p:sp>
         <p:nvSpPr>
-          <p:cNvPr id="8" name="Marcador de número de diapositiva 7">
-            <a:extLst>
-              <a:ext uri="{FF2B5EF4-FFF2-40B4-BE49-F238E27FC236}">
-                <a16:creationId xmlns:a16="http://schemas.microsoft.com/office/drawing/2014/main" id="{92908AF9-2A07-4B50-BC13-471792106EC8}"/>
+          <p:cNvPr id="9" name="Marcador de número de diapositiva 8">
+            <a:extLst>
+              <a:ext uri="{FF2B5EF4-FFF2-40B4-BE49-F238E27FC236}">
+                <a16:creationId xmlns:a16="http://schemas.microsoft.com/office/drawing/2014/main" id="{C396FFDC-ADE8-4009-A466-A81787258E88}"/>
               </a:ext>
             </a:extLst>
           </p:cNvPr>
@@ -16170,10 +16090,10 @@
       </p:sp>
       <p:pic>
         <p:nvPicPr>
-          <p:cNvPr id="12" name="Picture 11">
-            <a:extLst>
-              <a:ext uri="{FF2B5EF4-FFF2-40B4-BE49-F238E27FC236}">
-                <a16:creationId xmlns:a16="http://schemas.microsoft.com/office/drawing/2014/main" id="{A612C06D-D748-DBF6-C6F2-9FD984C2E43C}"/>
+          <p:cNvPr id="13" name="Picture 12" descr="A screen shot of a graph&#10;&#10;Description automatically generated">
+            <a:extLst>
+              <a:ext uri="{FF2B5EF4-FFF2-40B4-BE49-F238E27FC236}">
+                <a16:creationId xmlns:a16="http://schemas.microsoft.com/office/drawing/2014/main" id="{E60AB1D9-9C5A-747D-509D-E89744A34532}"/>
               </a:ext>
             </a:extLst>
           </p:cNvPr>
@@ -16182,25 +16102,182 @@
           </p:cNvPicPr>
           <p:nvPr/>
         </p:nvPicPr>
-        <p:blipFill rotWithShape="1">
+        <p:blipFill>
           <a:blip r:embed="rId3"/>
-          <a:srcRect l="1029" t="899" r="4413" b="4063"/>
-          <a:stretch/>
+          <a:stretch>
+            <a:fillRect/>
+          </a:stretch>
         </p:blipFill>
         <p:spPr>
           <a:xfrm>
-            <a:off x="331694" y="1564341"/>
-            <a:ext cx="11528612" cy="4173071"/>
+            <a:off x="952500" y="-270704"/>
+            <a:ext cx="10287000" cy="6858000"/>
           </a:xfrm>
           <a:prstGeom prst="rect">
             <a:avLst/>
           </a:prstGeom>
         </p:spPr>
       </p:pic>
+      <p:sp>
+        <p:nvSpPr>
+          <p:cNvPr id="3" name="Oval 2">
+            <a:extLst>
+              <a:ext uri="{FF2B5EF4-FFF2-40B4-BE49-F238E27FC236}">
+                <a16:creationId xmlns:a16="http://schemas.microsoft.com/office/drawing/2014/main" id="{6998A596-109F-B8E6-01A0-E9158D7D8FC0}"/>
+              </a:ext>
+            </a:extLst>
+          </p:cNvPr>
+          <p:cNvSpPr/>
+          <p:nvPr/>
+        </p:nvSpPr>
+        <p:spPr>
+          <a:xfrm>
+            <a:off x="8379242" y="553419"/>
+            <a:ext cx="542236" cy="520008"/>
+          </a:xfrm>
+          <a:prstGeom prst="ellipse">
+            <a:avLst/>
+          </a:prstGeom>
+          <a:noFill/>
+          <a:ln w="28575">
+            <a:solidFill>
+              <a:srgbClr val="AE2012"/>
+            </a:solidFill>
+          </a:ln>
+        </p:spPr>
+        <p:style>
+          <a:lnRef idx="2">
+            <a:schemeClr val="accent1">
+              <a:shade val="15000"/>
+            </a:schemeClr>
+          </a:lnRef>
+          <a:fillRef idx="1">
+            <a:schemeClr val="accent1"/>
+          </a:fillRef>
+          <a:effectRef idx="0">
+            <a:schemeClr val="accent1"/>
+          </a:effectRef>
+          <a:fontRef idx="minor">
+            <a:schemeClr val="lt1"/>
+          </a:fontRef>
+        </p:style>
+        <p:txBody>
+          <a:bodyPr rtlCol="0" anchor="ctr"/>
+          <a:lstStyle/>
+          <a:p>
+            <a:pPr algn="ctr"/>
+            <a:endParaRPr lang="es-US" dirty="0"/>
+          </a:p>
+        </p:txBody>
+      </p:sp>
+      <p:sp>
+        <p:nvSpPr>
+          <p:cNvPr id="5" name="Oval 4">
+            <a:extLst>
+              <a:ext uri="{FF2B5EF4-FFF2-40B4-BE49-F238E27FC236}">
+                <a16:creationId xmlns:a16="http://schemas.microsoft.com/office/drawing/2014/main" id="{C7C02EDF-94D5-CA69-341D-1FC4D160C02F}"/>
+              </a:ext>
+            </a:extLst>
+          </p:cNvPr>
+          <p:cNvSpPr/>
+          <p:nvPr/>
+        </p:nvSpPr>
+        <p:spPr>
+          <a:xfrm>
+            <a:off x="9093212" y="1068592"/>
+            <a:ext cx="542236" cy="520008"/>
+          </a:xfrm>
+          <a:prstGeom prst="ellipse">
+            <a:avLst/>
+          </a:prstGeom>
+          <a:noFill/>
+          <a:ln w="28575">
+            <a:solidFill>
+              <a:srgbClr val="AE2012"/>
+            </a:solidFill>
+          </a:ln>
+        </p:spPr>
+        <p:style>
+          <a:lnRef idx="2">
+            <a:schemeClr val="accent1">
+              <a:shade val="15000"/>
+            </a:schemeClr>
+          </a:lnRef>
+          <a:fillRef idx="1">
+            <a:schemeClr val="accent1"/>
+          </a:fillRef>
+          <a:effectRef idx="0">
+            <a:schemeClr val="accent1"/>
+          </a:effectRef>
+          <a:fontRef idx="minor">
+            <a:schemeClr val="lt1"/>
+          </a:fontRef>
+        </p:style>
+        <p:txBody>
+          <a:bodyPr rtlCol="0" anchor="ctr"/>
+          <a:lstStyle/>
+          <a:p>
+            <a:pPr algn="ctr"/>
+            <a:endParaRPr lang="es-US" dirty="0"/>
+          </a:p>
+        </p:txBody>
+      </p:sp>
+      <p:sp>
+        <p:nvSpPr>
+          <p:cNvPr id="10" name="Oval 9">
+            <a:extLst>
+              <a:ext uri="{FF2B5EF4-FFF2-40B4-BE49-F238E27FC236}">
+                <a16:creationId xmlns:a16="http://schemas.microsoft.com/office/drawing/2014/main" id="{64A443F8-ECCA-45EA-A97B-BE2AF1627D03}"/>
+              </a:ext>
+            </a:extLst>
+          </p:cNvPr>
+          <p:cNvSpPr/>
+          <p:nvPr/>
+        </p:nvSpPr>
+        <p:spPr>
+          <a:xfrm>
+            <a:off x="8372608" y="2892446"/>
+            <a:ext cx="542236" cy="520008"/>
+          </a:xfrm>
+          <a:prstGeom prst="ellipse">
+            <a:avLst/>
+          </a:prstGeom>
+          <a:noFill/>
+          <a:ln w="28575">
+            <a:solidFill>
+              <a:srgbClr val="AE2012"/>
+            </a:solidFill>
+          </a:ln>
+        </p:spPr>
+        <p:style>
+          <a:lnRef idx="2">
+            <a:schemeClr val="accent1">
+              <a:shade val="15000"/>
+            </a:schemeClr>
+          </a:lnRef>
+          <a:fillRef idx="1">
+            <a:schemeClr val="accent1"/>
+          </a:fillRef>
+          <a:effectRef idx="0">
+            <a:schemeClr val="accent1"/>
+          </a:effectRef>
+          <a:fontRef idx="minor">
+            <a:schemeClr val="lt1"/>
+          </a:fontRef>
+        </p:style>
+        <p:txBody>
+          <a:bodyPr rtlCol="0" anchor="ctr"/>
+          <a:lstStyle/>
+          <a:p>
+            <a:pPr algn="ctr"/>
+            <a:endParaRPr lang="es-US" dirty="0"/>
+          </a:p>
+        </p:txBody>
+      </p:sp>
     </p:spTree>
     <p:extLst>
       <p:ext uri="{BB962C8B-B14F-4D97-AF65-F5344CB8AC3E}">
-        <p14:creationId xmlns:p14="http://schemas.microsoft.com/office/powerpoint/2010/main" val="2896385493"/>
+        <p14:creationId xmlns:p14="http://schemas.microsoft.com/office/powerpoint/2010/main" val="144498883"/>
       </p:ext>
     </p:extLst>
   </p:cSld>
@@ -16530,24 +16607,24 @@
       </p:sp>
       <p:sp>
         <p:nvSpPr>
-          <p:cNvPr id="8" name="Marcador de pie de página 7">
-            <a:extLst>
-              <a:ext uri="{FF2B5EF4-FFF2-40B4-BE49-F238E27FC236}">
-                <a16:creationId xmlns:a16="http://schemas.microsoft.com/office/drawing/2014/main" id="{905F172A-5D5D-43CD-A187-DA0D303F4144}"/>
-              </a:ext>
-            </a:extLst>
-          </p:cNvPr>
-          <p:cNvSpPr>
-            <a:spLocks noGrp="1"/>
-          </p:cNvSpPr>
-          <p:nvPr>
-            <p:ph type="ftr" sz="quarter" idx="11"/>
-          </p:nvPr>
-        </p:nvSpPr>
-        <p:spPr>
-          <a:xfrm>
-            <a:off x="7324586" y="6250730"/>
-            <a:ext cx="4114800" cy="365125"/>
+          <p:cNvPr id="7" name="Marcador de fecha 6">
+            <a:extLst>
+              <a:ext uri="{FF2B5EF4-FFF2-40B4-BE49-F238E27FC236}">
+                <a16:creationId xmlns:a16="http://schemas.microsoft.com/office/drawing/2014/main" id="{B2A46C4A-D036-4440-BB64-6754F4FF27C1}"/>
+              </a:ext>
+            </a:extLst>
+          </p:cNvPr>
+          <p:cNvSpPr>
+            <a:spLocks noGrp="1"/>
+          </p:cNvSpPr>
+          <p:nvPr>
+            <p:ph type="dt" sz="half" idx="10"/>
+          </p:nvPr>
+        </p:nvSpPr>
+        <p:spPr>
+          <a:xfrm>
+            <a:off x="838200" y="6356350"/>
+            <a:ext cx="2743200" cy="365125"/>
           </a:xfrm>
         </p:spPr>
         <p:txBody>
@@ -16561,7 +16638,45 @@
             <a:pPr rtl="0"/>
             <a:r>
               <a:rPr lang="es-ES" dirty="0"/>
-              <a:t>FORBES HIGHEST PAYING ATHLETES ANALYSIS</a:t>
+              <a:t>20XX</a:t>
+            </a:r>
+          </a:p>
+        </p:txBody>
+      </p:sp>
+      <p:sp>
+        <p:nvSpPr>
+          <p:cNvPr id="8" name="Marcador de pie de página 7">
+            <a:extLst>
+              <a:ext uri="{FF2B5EF4-FFF2-40B4-BE49-F238E27FC236}">
+                <a16:creationId xmlns:a16="http://schemas.microsoft.com/office/drawing/2014/main" id="{905F172A-5D5D-43CD-A187-DA0D303F4144}"/>
+              </a:ext>
+            </a:extLst>
+          </p:cNvPr>
+          <p:cNvSpPr>
+            <a:spLocks noGrp="1"/>
+          </p:cNvSpPr>
+          <p:nvPr>
+            <p:ph type="ftr" sz="quarter" idx="11"/>
+          </p:nvPr>
+        </p:nvSpPr>
+        <p:spPr>
+          <a:xfrm>
+            <a:off x="4038600" y="6356350"/>
+            <a:ext cx="4114800" cy="365125"/>
+          </a:xfrm>
+        </p:spPr>
+        <p:txBody>
+          <a:bodyPr rtlCol="0"/>
+          <a:lstStyle>
+            <a:defPPr>
+              <a:defRPr lang="es-ES"/>
+            </a:defPPr>
+          </a:lstStyle>
+          <a:p>
+            <a:pPr rtl="0"/>
+            <a:r>
+              <a:rPr lang="es-ES" dirty="0"/>
+              <a:t>TÍTULO DE LA PRESENTACIÓN</a:t>
             </a:r>
           </a:p>
         </p:txBody>
@@ -16608,10 +16723,10 @@
       </p:sp>
       <p:pic>
         <p:nvPicPr>
-          <p:cNvPr id="12" name="Picture 11">
-            <a:extLst>
-              <a:ext uri="{FF2B5EF4-FFF2-40B4-BE49-F238E27FC236}">
-                <a16:creationId xmlns:a16="http://schemas.microsoft.com/office/drawing/2014/main" id="{6A1B3BD1-61A8-5FB1-E2CA-6B055E9BE4D3}"/>
+          <p:cNvPr id="11" name="Picture 10">
+            <a:extLst>
+              <a:ext uri="{FF2B5EF4-FFF2-40B4-BE49-F238E27FC236}">
+                <a16:creationId xmlns:a16="http://schemas.microsoft.com/office/drawing/2014/main" id="{0014701C-A515-45B2-03F5-C4EF3D5AD0B3}"/>
               </a:ext>
             </a:extLst>
           </p:cNvPr>
@@ -16628,18 +16743,139 @@
         </p:blipFill>
         <p:spPr>
           <a:xfrm>
-            <a:off x="1327199" y="33558"/>
-            <a:ext cx="6909257" cy="6687917"/>
+            <a:off x="1085282" y="333698"/>
+            <a:ext cx="4437499" cy="5498775"/>
           </a:xfrm>
           <a:prstGeom prst="rect">
             <a:avLst/>
           </a:prstGeom>
         </p:spPr>
       </p:pic>
+      <p:pic>
+        <p:nvPicPr>
+          <p:cNvPr id="14" name="Picture 13">
+            <a:extLst>
+              <a:ext uri="{FF2B5EF4-FFF2-40B4-BE49-F238E27FC236}">
+                <a16:creationId xmlns:a16="http://schemas.microsoft.com/office/drawing/2014/main" id="{A881FA41-88CD-A684-62A8-FD4B7D8A17D4}"/>
+              </a:ext>
+            </a:extLst>
+          </p:cNvPr>
+          <p:cNvPicPr>
+            <a:picLocks noChangeAspect="1"/>
+          </p:cNvPicPr>
+          <p:nvPr/>
+        </p:nvPicPr>
+        <p:blipFill>
+          <a:blip r:embed="rId4"/>
+          <a:stretch>
+            <a:fillRect/>
+          </a:stretch>
+        </p:blipFill>
+        <p:spPr>
+          <a:xfrm>
+            <a:off x="7239001" y="333698"/>
+            <a:ext cx="4114800" cy="5498775"/>
+          </a:xfrm>
+          <a:prstGeom prst="rect">
+            <a:avLst/>
+          </a:prstGeom>
+        </p:spPr>
+      </p:pic>
+      <p:sp>
+        <p:nvSpPr>
+          <p:cNvPr id="15" name="TextBox 14">
+            <a:extLst>
+              <a:ext uri="{FF2B5EF4-FFF2-40B4-BE49-F238E27FC236}">
+                <a16:creationId xmlns:a16="http://schemas.microsoft.com/office/drawing/2014/main" id="{FF61D288-9C04-EAA5-40C4-740D1B4F638F}"/>
+              </a:ext>
+            </a:extLst>
+          </p:cNvPr>
+          <p:cNvSpPr txBox="1"/>
+          <p:nvPr/>
+        </p:nvSpPr>
+        <p:spPr>
+          <a:xfrm>
+            <a:off x="8280134" y="5909745"/>
+            <a:ext cx="2203704" cy="369332"/>
+          </a:xfrm>
+          <a:prstGeom prst="rect">
+            <a:avLst/>
+          </a:prstGeom>
+          <a:noFill/>
+        </p:spPr>
+        <p:txBody>
+          <a:bodyPr wrap="square" rtlCol="0">
+            <a:spAutoFit/>
+          </a:bodyPr>
+          <a:lstStyle/>
+          <a:p>
+            <a:r>
+              <a:rPr lang="en-US" dirty="0">
+                <a:solidFill>
+                  <a:schemeClr val="bg1"/>
+                </a:solidFill>
+              </a:rPr>
+              <a:t>Image from Forbes</a:t>
+            </a:r>
+          </a:p>
+        </p:txBody>
+      </p:sp>
+      <p:sp>
+        <p:nvSpPr>
+          <p:cNvPr id="16" name="TextBox 15">
+            <a:extLst>
+              <a:ext uri="{FF2B5EF4-FFF2-40B4-BE49-F238E27FC236}">
+                <a16:creationId xmlns:a16="http://schemas.microsoft.com/office/drawing/2014/main" id="{8E11B57D-925A-58EE-040B-FECEB23EABF7}"/>
+              </a:ext>
+            </a:extLst>
+          </p:cNvPr>
+          <p:cNvSpPr txBox="1"/>
+          <p:nvPr/>
+        </p:nvSpPr>
+        <p:spPr>
+          <a:xfrm>
+            <a:off x="2372109" y="5909745"/>
+            <a:ext cx="1863844" cy="369332"/>
+          </a:xfrm>
+          <a:prstGeom prst="rect">
+            <a:avLst/>
+          </a:prstGeom>
+          <a:noFill/>
+        </p:spPr>
+        <p:txBody>
+          <a:bodyPr wrap="none" rtlCol="0">
+            <a:spAutoFit/>
+          </a:bodyPr>
+          <a:lstStyle/>
+          <a:p>
+            <a:r>
+              <a:rPr lang="en-US" dirty="0">
+                <a:solidFill>
+                  <a:schemeClr val="bg1"/>
+                </a:solidFill>
+              </a:rPr>
+              <a:t>Photo from </a:t>
+            </a:r>
+            <a:r>
+              <a:rPr lang="en-US" dirty="0" err="1">
+                <a:solidFill>
+                  <a:schemeClr val="bg1"/>
+                </a:solidFill>
+              </a:rPr>
+              <a:t>Imdb</a:t>
+            </a:r>
+            <a:endParaRPr lang="en-US" dirty="0">
+              <a:solidFill>
+                <a:schemeClr val="bg1"/>
+              </a:solidFill>
+            </a:endParaRPr>
+          </a:p>
+        </p:txBody>
+      </p:sp>
     </p:spTree>
     <p:extLst>
       <p:ext uri="{BB962C8B-B14F-4D97-AF65-F5344CB8AC3E}">
-        <p14:creationId xmlns:p14="http://schemas.microsoft.com/office/powerpoint/2010/main" val="367634751"/>
+        <p14:creationId xmlns:p14="http://schemas.microsoft.com/office/powerpoint/2010/main" val="4070989650"/>
       </p:ext>
     </p:extLst>
   </p:cSld>
@@ -16668,10 +16904,10 @@
       </p:grpSpPr>
       <p:sp>
         <p:nvSpPr>
-          <p:cNvPr id="2" name="Título 1">
-            <a:extLst>
-              <a:ext uri="{FF2B5EF4-FFF2-40B4-BE49-F238E27FC236}">
-                <a16:creationId xmlns:a16="http://schemas.microsoft.com/office/drawing/2014/main" id="{42DD0E59-4C68-4F87-9821-23C69713D980}"/>
+          <p:cNvPr id="3" name="Título 2">
+            <a:extLst>
+              <a:ext uri="{FF2B5EF4-FFF2-40B4-BE49-F238E27FC236}">
+                <a16:creationId xmlns:a16="http://schemas.microsoft.com/office/drawing/2014/main" id="{77762301-F83A-4BEA-9D11-E6C99FB574A8}"/>
               </a:ext>
             </a:extLst>
           </p:cNvPr>
@@ -16684,8 +16920,8 @@
         </p:nvSpPr>
         <p:spPr>
           <a:xfrm>
-            <a:off x="1885156" y="892177"/>
-            <a:ext cx="8421688" cy="1325563"/>
+            <a:off x="838200" y="365125"/>
+            <a:ext cx="10515600" cy="1325563"/>
           </a:xfrm>
         </p:spPr>
         <p:txBody>
@@ -16699,17 +16935,17 @@
             <a:pPr rtl="0"/>
             <a:r>
               <a:rPr lang="es-ES" dirty="0"/>
-              <a:t>Conclusions</a:t>
-            </a:r>
-          </a:p>
-        </p:txBody>
-      </p:sp>
-      <p:sp>
-        <p:nvSpPr>
-          <p:cNvPr id="56" name="Marcador de fecha 55">
-            <a:extLst>
-              <a:ext uri="{FF2B5EF4-FFF2-40B4-BE49-F238E27FC236}">
-                <a16:creationId xmlns:a16="http://schemas.microsoft.com/office/drawing/2014/main" id="{B289356A-BDA0-4234-84F2-9F2F25D0D7BD}"/>
+              <a:t>Top yearly earnings</a:t>
+            </a:r>
+          </a:p>
+        </p:txBody>
+      </p:sp>
+      <p:sp>
+        <p:nvSpPr>
+          <p:cNvPr id="6" name="Marcador de fecha 5">
+            <a:extLst>
+              <a:ext uri="{FF2B5EF4-FFF2-40B4-BE49-F238E27FC236}">
+                <a16:creationId xmlns:a16="http://schemas.microsoft.com/office/drawing/2014/main" id="{3627CC26-34EF-4BB9-B289-9EC56B07D1E6}"/>
               </a:ext>
             </a:extLst>
           </p:cNvPr>
@@ -16744,10 +16980,10 @@
       </p:sp>
       <p:sp>
         <p:nvSpPr>
-          <p:cNvPr id="57" name="Marcador de pie de página 56">
-            <a:extLst>
-              <a:ext uri="{FF2B5EF4-FFF2-40B4-BE49-F238E27FC236}">
-                <a16:creationId xmlns:a16="http://schemas.microsoft.com/office/drawing/2014/main" id="{3A38BE84-957B-46B9-A315-4B5064DFF1A1}"/>
+          <p:cNvPr id="7" name="Marcador de pie de página 6">
+            <a:extLst>
+              <a:ext uri="{FF2B5EF4-FFF2-40B4-BE49-F238E27FC236}">
+                <a16:creationId xmlns:a16="http://schemas.microsoft.com/office/drawing/2014/main" id="{4E98E6AD-9D37-499C-898E-ED12AC36D31D}"/>
               </a:ext>
             </a:extLst>
           </p:cNvPr>
@@ -16782,10 +17018,10 @@
       </p:sp>
       <p:sp>
         <p:nvSpPr>
-          <p:cNvPr id="58" name="Marcador de número de diapositiva 57">
-            <a:extLst>
-              <a:ext uri="{FF2B5EF4-FFF2-40B4-BE49-F238E27FC236}">
-                <a16:creationId xmlns:a16="http://schemas.microsoft.com/office/drawing/2014/main" id="{E1900601-8B04-4FF3-B06F-6BEFAC6556D3}"/>
+          <p:cNvPr id="8" name="Marcador de número de diapositiva 7">
+            <a:extLst>
+              <a:ext uri="{FF2B5EF4-FFF2-40B4-BE49-F238E27FC236}">
+                <a16:creationId xmlns:a16="http://schemas.microsoft.com/office/drawing/2014/main" id="{92908AF9-2A07-4B50-BC13-471792106EC8}"/>
               </a:ext>
             </a:extLst>
           </p:cNvPr>
@@ -16820,54 +17056,39 @@
           </a:p>
         </p:txBody>
       </p:sp>
-      <p:sp>
-        <p:nvSpPr>
-          <p:cNvPr id="326" name="Marcador de texto 2">
-            <a:extLst>
-              <a:ext uri="{FF2B5EF4-FFF2-40B4-BE49-F238E27FC236}">
-                <a16:creationId xmlns:a16="http://schemas.microsoft.com/office/drawing/2014/main" id="{7B160DB7-BDF4-9939-C740-26EBBB3E0189}"/>
-              </a:ext>
-            </a:extLst>
-          </p:cNvPr>
-          <p:cNvSpPr>
-            <a:spLocks noGrp="1"/>
-          </p:cNvSpPr>
-          <p:nvPr>
-            <p:ph type="body" idx="1"/>
-          </p:nvPr>
-        </p:nvSpPr>
-        <p:spPr>
-          <a:xfrm>
-            <a:off x="1362074" y="2452812"/>
-            <a:ext cx="9605756" cy="2912564"/>
-          </a:xfrm>
-        </p:spPr>
-        <p:txBody>
-          <a:bodyPr rtlCol="0">
-            <a:normAutofit/>
-          </a:bodyPr>
-          <a:lstStyle>
-            <a:defPPr>
-              <a:defRPr lang="es-ES"/>
-            </a:defPPr>
-          </a:lstStyle>
-          <a:p>
-            <a:pPr rtl="0"/>
-            <a:r>
-              <a:rPr lang="es-ES" sz="1400" dirty="0"/>
-              <a:t>ADD CONCLUSIONS HERE</a:t>
-            </a:r>
-          </a:p>
-          <a:p>
-            <a:pPr rtl="0"/>
-            <a:endParaRPr lang="es-ES" sz="1400" dirty="0"/>
-          </a:p>
-        </p:txBody>
-      </p:sp>
+      <p:pic>
+        <p:nvPicPr>
+          <p:cNvPr id="12" name="Picture 11">
+            <a:extLst>
+              <a:ext uri="{FF2B5EF4-FFF2-40B4-BE49-F238E27FC236}">
+                <a16:creationId xmlns:a16="http://schemas.microsoft.com/office/drawing/2014/main" id="{A612C06D-D748-DBF6-C6F2-9FD984C2E43C}"/>
+              </a:ext>
+            </a:extLst>
+          </p:cNvPr>
+          <p:cNvPicPr>
+            <a:picLocks noChangeAspect="1"/>
+          </p:cNvPicPr>
+          <p:nvPr/>
+        </p:nvPicPr>
+        <p:blipFill rotWithShape="1">
+          <a:blip r:embed="rId3"/>
+          <a:srcRect l="1029" t="899" r="4413" b="4063"/>
+          <a:stretch/>
+        </p:blipFill>
+        <p:spPr>
+          <a:xfrm>
+            <a:off x="331694" y="1564341"/>
+            <a:ext cx="11528612" cy="4173071"/>
+          </a:xfrm>
+          <a:prstGeom prst="rect">
+            <a:avLst/>
+          </a:prstGeom>
+        </p:spPr>
+      </p:pic>
     </p:spTree>
     <p:extLst>
       <p:ext uri="{BB962C8B-B14F-4D97-AF65-F5344CB8AC3E}">
-        <p14:creationId xmlns:p14="http://schemas.microsoft.com/office/powerpoint/2010/main" val="1007431861"/>
+        <p14:creationId xmlns:p14="http://schemas.microsoft.com/office/powerpoint/2010/main" val="2896385493"/>
       </p:ext>
     </p:extLst>
   </p:cSld>
@@ -16988,28 +17209,30 @@
       </p:sp>
       <p:sp>
         <p:nvSpPr>
-          <p:cNvPr id="5" name="Marcador de texto 4">
-            <a:extLst>
-              <a:ext uri="{FF2B5EF4-FFF2-40B4-BE49-F238E27FC236}">
-                <a16:creationId xmlns:a16="http://schemas.microsoft.com/office/drawing/2014/main" id="{91CDEC5F-B8EE-4BC1-843F-13135E6E7AB2}"/>
-              </a:ext>
-            </a:extLst>
-          </p:cNvPr>
-          <p:cNvSpPr>
-            <a:spLocks noGrp="1"/>
-          </p:cNvSpPr>
-          <p:nvPr>
-            <p:ph type="body" sz="quarter" idx="3"/>
-          </p:nvPr>
-        </p:nvSpPr>
-        <p:spPr>
-          <a:xfrm>
-            <a:off x="7410173" y="2776936"/>
-            <a:ext cx="3943627" cy="823912"/>
-          </a:xfrm>
-        </p:spPr>
-        <p:txBody>
-          <a:bodyPr rtlCol="0"/>
+          <p:cNvPr id="6" name="Marcador de contenido 5">
+            <a:extLst>
+              <a:ext uri="{FF2B5EF4-FFF2-40B4-BE49-F238E27FC236}">
+                <a16:creationId xmlns:a16="http://schemas.microsoft.com/office/drawing/2014/main" id="{50B65871-FA95-449A-B8BC-90486DE532EF}"/>
+              </a:ext>
+            </a:extLst>
+          </p:cNvPr>
+          <p:cNvSpPr>
+            <a:spLocks noGrp="1"/>
+          </p:cNvSpPr>
+          <p:nvPr>
+            <p:ph sz="quarter" idx="4"/>
+          </p:nvPr>
+        </p:nvSpPr>
+        <p:spPr>
+          <a:xfrm>
+            <a:off x="7410173" y="3834606"/>
+            <a:ext cx="3943627" cy="1997867"/>
+          </a:xfrm>
+        </p:spPr>
+        <p:txBody>
+          <a:bodyPr rtlCol="0">
+            <a:normAutofit/>
+          </a:bodyPr>
           <a:lstStyle>
             <a:defPPr>
               <a:defRPr lang="es-ES"/>
@@ -17019,37 +17242,42 @@
             <a:pPr rtl="0"/>
             <a:r>
               <a:rPr lang="es-ES" dirty="0"/>
-              <a:t>OPORTUNIDADES BASADAS EN LA NUBE</a:t>
-            </a:r>
-          </a:p>
-        </p:txBody>
-      </p:sp>
-      <p:sp>
-        <p:nvSpPr>
-          <p:cNvPr id="6" name="Marcador de contenido 5">
-            <a:extLst>
-              <a:ext uri="{FF2B5EF4-FFF2-40B4-BE49-F238E27FC236}">
-                <a16:creationId xmlns:a16="http://schemas.microsoft.com/office/drawing/2014/main" id="{50B65871-FA95-449A-B8BC-90486DE532EF}"/>
-              </a:ext>
-            </a:extLst>
-          </p:cNvPr>
-          <p:cNvSpPr>
-            <a:spLocks noGrp="1"/>
-          </p:cNvSpPr>
-          <p:nvPr>
-            <p:ph sz="quarter" idx="4"/>
-          </p:nvPr>
-        </p:nvSpPr>
-        <p:spPr>
-          <a:xfrm>
-            <a:off x="10214890" y="3494485"/>
-            <a:ext cx="3724947" cy="1910727"/>
-          </a:xfrm>
-        </p:spPr>
-        <p:txBody>
-          <a:bodyPr rtlCol="0">
-            <a:normAutofit/>
-          </a:bodyPr>
+              <a:t>Enfoques iterativos para una estrategia corporativa</a:t>
+            </a:r>
+          </a:p>
+          <a:p>
+            <a:pPr rtl="0"/>
+            <a:r>
+              <a:rPr lang="es-ES" dirty="0"/>
+              <a:t>​Establecer un marco de administración desde dentro</a:t>
+            </a:r>
+          </a:p>
+        </p:txBody>
+      </p:sp>
+      <p:sp>
+        <p:nvSpPr>
+          <p:cNvPr id="8" name="Marcador de pie de página 7">
+            <a:extLst>
+              <a:ext uri="{FF2B5EF4-FFF2-40B4-BE49-F238E27FC236}">
+                <a16:creationId xmlns:a16="http://schemas.microsoft.com/office/drawing/2014/main" id="{905F172A-5D5D-43CD-A187-DA0D303F4144}"/>
+              </a:ext>
+            </a:extLst>
+          </p:cNvPr>
+          <p:cNvSpPr>
+            <a:spLocks noGrp="1"/>
+          </p:cNvSpPr>
+          <p:nvPr>
+            <p:ph type="ftr" sz="quarter" idx="11"/>
+          </p:nvPr>
+        </p:nvSpPr>
+        <p:spPr>
+          <a:xfrm>
+            <a:off x="7324586" y="6250730"/>
+            <a:ext cx="4114800" cy="365125"/>
+          </a:xfrm>
+        </p:spPr>
+        <p:txBody>
+          <a:bodyPr rtlCol="0"/>
           <a:lstStyle>
             <a:defPPr>
               <a:defRPr lang="es-ES"/>
@@ -17059,14 +17287,7 @@
             <a:pPr rtl="0"/>
             <a:r>
               <a:rPr lang="es-ES" dirty="0"/>
-              <a:t>Enfoques iterativos para una estrategia corporativa</a:t>
-            </a:r>
-          </a:p>
-          <a:p>
-            <a:pPr rtl="0"/>
-            <a:r>
-              <a:rPr lang="es-ES" dirty="0"/>
-              <a:t>​Establecer un marco de administración desde dentro</a:t>
+              <a:t>FORBES HIGHEST PAYING ATHLETES ANALYSIS</a:t>
             </a:r>
           </a:p>
         </p:txBody>
@@ -17111,142 +17332,40 @@
           </a:p>
         </p:txBody>
       </p:sp>
-      <p:sp>
-        <p:nvSpPr>
-          <p:cNvPr id="15" name="Marcador de pie de página 4">
-            <a:extLst>
-              <a:ext uri="{FF2B5EF4-FFF2-40B4-BE49-F238E27FC236}">
-                <a16:creationId xmlns:a16="http://schemas.microsoft.com/office/drawing/2014/main" id="{D03417DB-B8B1-A6C2-EC39-D9E06005B059}"/>
-              </a:ext>
-            </a:extLst>
-          </p:cNvPr>
-          <p:cNvSpPr>
-            <a:spLocks noGrp="1"/>
-          </p:cNvSpPr>
-          <p:nvPr>
-            <p:ph type="ftr" sz="quarter" idx="11"/>
-          </p:nvPr>
-        </p:nvSpPr>
-        <p:spPr>
-          <a:xfrm>
-            <a:off x="2463800" y="6356350"/>
-            <a:ext cx="3479800" cy="365125"/>
-          </a:xfrm>
-        </p:spPr>
-        <p:txBody>
-          <a:bodyPr rtlCol="0"/>
-          <a:lstStyle>
-            <a:defPPr>
-              <a:defRPr lang="es-ES"/>
-            </a:defPPr>
-          </a:lstStyle>
-          <a:p>
-            <a:pPr rtl="0"/>
-            <a:r>
-              <a:rPr lang="es-ES" dirty="0"/>
-              <a:t>FORBES HIGHEST PAYING ATHLETES ANALYSIS</a:t>
-            </a:r>
-          </a:p>
-        </p:txBody>
-      </p:sp>
       <p:pic>
         <p:nvPicPr>
-          <p:cNvPr id="3074" name="Picture 2">
-            <a:extLst>
-              <a:ext uri="{FF2B5EF4-FFF2-40B4-BE49-F238E27FC236}">
-                <a16:creationId xmlns:a16="http://schemas.microsoft.com/office/drawing/2014/main" id="{A006EAF0-CE30-5E85-45FF-109E2EAD59B7}"/>
+          <p:cNvPr id="12" name="Picture 11">
+            <a:extLst>
+              <a:ext uri="{FF2B5EF4-FFF2-40B4-BE49-F238E27FC236}">
+                <a16:creationId xmlns:a16="http://schemas.microsoft.com/office/drawing/2014/main" id="{6A1B3BD1-61A8-5FB1-E2CA-6B055E9BE4D3}"/>
               </a:ext>
             </a:extLst>
           </p:cNvPr>
           <p:cNvPicPr>
-            <a:picLocks noChangeAspect="1" noChangeArrowheads="1"/>
+            <a:picLocks noChangeAspect="1"/>
           </p:cNvPicPr>
           <p:nvPr/>
         </p:nvPicPr>
         <p:blipFill>
-          <a:blip r:embed="rId3">
-            <a:extLst>
-              <a:ext uri="{28A0092B-C50C-407E-A947-70E740481C1C}">
-                <a14:useLocalDpi xmlns:a14="http://schemas.microsoft.com/office/drawing/2010/main" val="0"/>
-              </a:ext>
-            </a:extLst>
-          </a:blip>
-          <a:srcRect/>
+          <a:blip r:embed="rId3"/>
           <a:stretch>
             <a:fillRect/>
           </a:stretch>
         </p:blipFill>
-        <p:spPr bwMode="auto">
-          <a:xfrm>
-            <a:off x="965243" y="502842"/>
-            <a:ext cx="4920177" cy="4946488"/>
+        <p:spPr>
+          <a:xfrm>
+            <a:off x="1327199" y="33558"/>
+            <a:ext cx="6909257" cy="6687917"/>
           </a:xfrm>
           <a:prstGeom prst="rect">
             <a:avLst/>
           </a:prstGeom>
-          <a:noFill/>
-          <a:extLst>
-            <a:ext uri="{909E8E84-426E-40DD-AFC4-6F175D3DCCD1}">
-              <a14:hiddenFill xmlns:a14="http://schemas.microsoft.com/office/drawing/2010/main">
-                <a:solidFill>
-                  <a:srgbClr val="FFFFFF"/>
-                </a:solidFill>
-              </a14:hiddenFill>
-            </a:ext>
-          </a:extLst>
-        </p:spPr>
-      </p:pic>
-      <p:pic>
-        <p:nvPicPr>
-          <p:cNvPr id="3078" name="Picture 6">
-            <a:extLst>
-              <a:ext uri="{FF2B5EF4-FFF2-40B4-BE49-F238E27FC236}">
-                <a16:creationId xmlns:a16="http://schemas.microsoft.com/office/drawing/2014/main" id="{DF37C092-D923-2FA0-C69F-47732B0C3DF6}"/>
-              </a:ext>
-            </a:extLst>
-          </p:cNvPr>
-          <p:cNvPicPr>
-            <a:picLocks noChangeAspect="1" noChangeArrowheads="1"/>
-          </p:cNvPicPr>
-          <p:nvPr/>
-        </p:nvPicPr>
-        <p:blipFill>
-          <a:blip r:embed="rId4">
-            <a:extLst>
-              <a:ext uri="{28A0092B-C50C-407E-A947-70E740481C1C}">
-                <a14:useLocalDpi xmlns:a14="http://schemas.microsoft.com/office/drawing/2010/main" val="0"/>
-              </a:ext>
-            </a:extLst>
-          </a:blip>
-          <a:srcRect/>
-          <a:stretch>
-            <a:fillRect/>
-          </a:stretch>
-        </p:blipFill>
-        <p:spPr bwMode="auto">
-          <a:xfrm>
-            <a:off x="6306582" y="502843"/>
-            <a:ext cx="5071932" cy="4946487"/>
-          </a:xfrm>
-          <a:prstGeom prst="rect">
-            <a:avLst/>
-          </a:prstGeom>
-          <a:noFill/>
-          <a:extLst>
-            <a:ext uri="{909E8E84-426E-40DD-AFC4-6F175D3DCCD1}">
-              <a14:hiddenFill xmlns:a14="http://schemas.microsoft.com/office/drawing/2010/main">
-                <a:solidFill>
-                  <a:srgbClr val="FFFFFF"/>
-                </a:solidFill>
-              </a14:hiddenFill>
-            </a:ext>
-          </a:extLst>
         </p:spPr>
       </p:pic>
     </p:spTree>
     <p:extLst>
       <p:ext uri="{BB962C8B-B14F-4D97-AF65-F5344CB8AC3E}">
-        <p14:creationId xmlns:p14="http://schemas.microsoft.com/office/powerpoint/2010/main" val="2262251188"/>
+        <p14:creationId xmlns:p14="http://schemas.microsoft.com/office/powerpoint/2010/main" val="367634751"/>
       </p:ext>
     </p:extLst>
   </p:cSld>
@@ -17278,21 +17397,21 @@
           <p:cNvPr id="2" name="Título 1">
             <a:extLst>
               <a:ext uri="{FF2B5EF4-FFF2-40B4-BE49-F238E27FC236}">
-                <a16:creationId xmlns:a16="http://schemas.microsoft.com/office/drawing/2014/main" id="{B1FE5F11-B7B9-4B80-8C6A-A8A7A7190B77}"/>
-              </a:ext>
-            </a:extLst>
-          </p:cNvPr>
-          <p:cNvSpPr>
-            <a:spLocks noGrp="1"/>
-          </p:cNvSpPr>
-          <p:nvPr>
-            <p:ph type="ctrTitle"/>
-          </p:nvPr>
-        </p:nvSpPr>
-        <p:spPr>
-          <a:xfrm>
-            <a:off x="6458964" y="2945452"/>
-            <a:ext cx="5074920" cy="967095"/>
+                <a16:creationId xmlns:a16="http://schemas.microsoft.com/office/drawing/2014/main" id="{42DD0E59-4C68-4F87-9821-23C69713D980}"/>
+              </a:ext>
+            </a:extLst>
+          </p:cNvPr>
+          <p:cNvSpPr>
+            <a:spLocks noGrp="1"/>
+          </p:cNvSpPr>
+          <p:nvPr>
+            <p:ph type="title"/>
+          </p:nvPr>
+        </p:nvSpPr>
+        <p:spPr>
+          <a:xfrm>
+            <a:off x="1885156" y="892177"/>
+            <a:ext cx="8421688" cy="1325563"/>
           </a:xfrm>
         </p:spPr>
         <p:txBody>
@@ -17305,16 +17424,176 @@
           <a:p>
             <a:pPr rtl="0"/>
             <a:r>
-              <a:rPr lang="en-US" sz="2800" dirty="0"/>
-              <a:t>Limitations and next steps</a:t>
-            </a:r>
+              <a:rPr lang="es-ES" dirty="0"/>
+              <a:t>Conclusions</a:t>
+            </a:r>
+          </a:p>
+        </p:txBody>
+      </p:sp>
+      <p:sp>
+        <p:nvSpPr>
+          <p:cNvPr id="56" name="Marcador de fecha 55">
+            <a:extLst>
+              <a:ext uri="{FF2B5EF4-FFF2-40B4-BE49-F238E27FC236}">
+                <a16:creationId xmlns:a16="http://schemas.microsoft.com/office/drawing/2014/main" id="{B289356A-BDA0-4234-84F2-9F2F25D0D7BD}"/>
+              </a:ext>
+            </a:extLst>
+          </p:cNvPr>
+          <p:cNvSpPr>
+            <a:spLocks noGrp="1"/>
+          </p:cNvSpPr>
+          <p:nvPr>
+            <p:ph type="dt" sz="half" idx="10"/>
+          </p:nvPr>
+        </p:nvSpPr>
+        <p:spPr>
+          <a:xfrm>
+            <a:off x="838200" y="6356350"/>
+            <a:ext cx="2743200" cy="365125"/>
+          </a:xfrm>
+        </p:spPr>
+        <p:txBody>
+          <a:bodyPr rtlCol="0"/>
+          <a:lstStyle>
+            <a:defPPr>
+              <a:defRPr lang="es-ES"/>
+            </a:defPPr>
+          </a:lstStyle>
+          <a:p>
+            <a:pPr rtl="0"/>
+            <a:r>
+              <a:rPr lang="es-ES" dirty="0"/>
+              <a:t>20XX</a:t>
+            </a:r>
+          </a:p>
+        </p:txBody>
+      </p:sp>
+      <p:sp>
+        <p:nvSpPr>
+          <p:cNvPr id="57" name="Marcador de pie de página 56">
+            <a:extLst>
+              <a:ext uri="{FF2B5EF4-FFF2-40B4-BE49-F238E27FC236}">
+                <a16:creationId xmlns:a16="http://schemas.microsoft.com/office/drawing/2014/main" id="{3A38BE84-957B-46B9-A315-4B5064DFF1A1}"/>
+              </a:ext>
+            </a:extLst>
+          </p:cNvPr>
+          <p:cNvSpPr>
+            <a:spLocks noGrp="1"/>
+          </p:cNvSpPr>
+          <p:nvPr>
+            <p:ph type="ftr" sz="quarter" idx="11"/>
+          </p:nvPr>
+        </p:nvSpPr>
+        <p:spPr>
+          <a:xfrm>
+            <a:off x="4038600" y="6356350"/>
+            <a:ext cx="4114800" cy="365125"/>
+          </a:xfrm>
+        </p:spPr>
+        <p:txBody>
+          <a:bodyPr rtlCol="0"/>
+          <a:lstStyle>
+            <a:defPPr>
+              <a:defRPr lang="es-ES"/>
+            </a:defPPr>
+          </a:lstStyle>
+          <a:p>
+            <a:pPr rtl="0"/>
+            <a:r>
+              <a:rPr lang="es-ES" dirty="0"/>
+              <a:t>TÍTULO DE LA PRESENTACIÓN</a:t>
+            </a:r>
+          </a:p>
+        </p:txBody>
+      </p:sp>
+      <p:sp>
+        <p:nvSpPr>
+          <p:cNvPr id="58" name="Marcador de número de diapositiva 57">
+            <a:extLst>
+              <a:ext uri="{FF2B5EF4-FFF2-40B4-BE49-F238E27FC236}">
+                <a16:creationId xmlns:a16="http://schemas.microsoft.com/office/drawing/2014/main" id="{E1900601-8B04-4FF3-B06F-6BEFAC6556D3}"/>
+              </a:ext>
+            </a:extLst>
+          </p:cNvPr>
+          <p:cNvSpPr>
+            <a:spLocks noGrp="1"/>
+          </p:cNvSpPr>
+          <p:nvPr>
+            <p:ph type="sldNum" sz="quarter" idx="12"/>
+          </p:nvPr>
+        </p:nvSpPr>
+        <p:spPr>
+          <a:xfrm>
+            <a:off x="8610600" y="6356350"/>
+            <a:ext cx="2743200" cy="365125"/>
+          </a:xfrm>
+        </p:spPr>
+        <p:txBody>
+          <a:bodyPr rtlCol="0"/>
+          <a:lstStyle>
+            <a:defPPr>
+              <a:defRPr lang="es-ES"/>
+            </a:defPPr>
+          </a:lstStyle>
+          <a:p>
+            <a:pPr rtl="0"/>
+            <a:fld id="{A49DFD55-3C28-40EF-9E31-A92D2E4017FF}" type="slidenum">
+              <a:rPr lang="es-ES" smtClean="0"/>
+              <a:pPr rtl="0"/>
+              <a:t>23</a:t>
+            </a:fld>
+            <a:endParaRPr lang="es-ES" dirty="0"/>
+          </a:p>
+        </p:txBody>
+      </p:sp>
+      <p:sp>
+        <p:nvSpPr>
+          <p:cNvPr id="326" name="Marcador de texto 2">
+            <a:extLst>
+              <a:ext uri="{FF2B5EF4-FFF2-40B4-BE49-F238E27FC236}">
+                <a16:creationId xmlns:a16="http://schemas.microsoft.com/office/drawing/2014/main" id="{7B160DB7-BDF4-9939-C740-26EBBB3E0189}"/>
+              </a:ext>
+            </a:extLst>
+          </p:cNvPr>
+          <p:cNvSpPr>
+            <a:spLocks noGrp="1"/>
+          </p:cNvSpPr>
+          <p:nvPr>
+            <p:ph type="body" idx="1"/>
+          </p:nvPr>
+        </p:nvSpPr>
+        <p:spPr>
+          <a:xfrm>
+            <a:off x="1362074" y="2452812"/>
+            <a:ext cx="9605756" cy="2912564"/>
+          </a:xfrm>
+        </p:spPr>
+        <p:txBody>
+          <a:bodyPr rtlCol="0">
+            <a:normAutofit/>
+          </a:bodyPr>
+          <a:lstStyle>
+            <a:defPPr>
+              <a:defRPr lang="es-ES"/>
+            </a:defPPr>
+          </a:lstStyle>
+          <a:p>
+            <a:pPr rtl="0"/>
+            <a:r>
+              <a:rPr lang="es-ES" sz="1400" dirty="0"/>
+              <a:t>ADD CONCLUSIONS HERE</a:t>
+            </a:r>
+          </a:p>
+          <a:p>
+            <a:pPr rtl="0"/>
+            <a:endParaRPr lang="es-ES" sz="1400" dirty="0"/>
           </a:p>
         </p:txBody>
       </p:sp>
     </p:spTree>
     <p:extLst>
       <p:ext uri="{BB962C8B-B14F-4D97-AF65-F5344CB8AC3E}">
-        <p14:creationId xmlns:p14="http://schemas.microsoft.com/office/powerpoint/2010/main" val="3671601111"/>
+        <p14:creationId xmlns:p14="http://schemas.microsoft.com/office/powerpoint/2010/main" val="1007431861"/>
       </p:ext>
     </p:extLst>
   </p:cSld>
@@ -17346,7 +17625,7 @@
           <p:cNvPr id="2" name="Título 1">
             <a:extLst>
               <a:ext uri="{FF2B5EF4-FFF2-40B4-BE49-F238E27FC236}">
-                <a16:creationId xmlns:a16="http://schemas.microsoft.com/office/drawing/2014/main" id="{4518FC28-E0BD-4387-B8BE-9965D1A57FF1}"/>
+                <a16:creationId xmlns:a16="http://schemas.microsoft.com/office/drawing/2014/main" id="{09140014-73D5-419B-8867-972BB18D52D4}"/>
               </a:ext>
             </a:extLst>
           </p:cNvPr>
@@ -17359,8 +17638,8 @@
         </p:nvSpPr>
         <p:spPr>
           <a:xfrm>
-            <a:off x="5428430" y="502056"/>
-            <a:ext cx="5111750" cy="1204912"/>
+            <a:off x="2933700" y="892177"/>
+            <a:ext cx="8421688" cy="1325563"/>
           </a:xfrm>
         </p:spPr>
         <p:txBody>
@@ -17374,36 +17653,36 @@
             <a:pPr rtl="0"/>
             <a:r>
               <a:rPr lang="es-ES" dirty="0"/>
-              <a:t>limitations</a:t>
-            </a:r>
-          </a:p>
-        </p:txBody>
-      </p:sp>
-      <p:sp>
-        <p:nvSpPr>
-          <p:cNvPr id="3" name="Marcador de texto 2">
-            <a:extLst>
-              <a:ext uri="{FF2B5EF4-FFF2-40B4-BE49-F238E27FC236}">
-                <a16:creationId xmlns:a16="http://schemas.microsoft.com/office/drawing/2014/main" id="{FED19BCA-B61F-4EA6-A1FB-CCA3BD8506FB}"/>
-              </a:ext>
-            </a:extLst>
-          </p:cNvPr>
-          <p:cNvSpPr>
-            <a:spLocks noGrp="1"/>
-          </p:cNvSpPr>
-          <p:nvPr>
-            <p:ph type="body" idx="1"/>
-          </p:nvPr>
-        </p:nvSpPr>
-        <p:spPr>
-          <a:xfrm>
-            <a:off x="5428430" y="2094275"/>
-            <a:ext cx="5550426" cy="2592781"/>
+              <a:t>ÁREAS DE ENFOQUE</a:t>
+            </a:r>
+          </a:p>
+        </p:txBody>
+      </p:sp>
+      <p:sp>
+        <p:nvSpPr>
+          <p:cNvPr id="4" name="Marcador de contenido 3">
+            <a:extLst>
+              <a:ext uri="{FF2B5EF4-FFF2-40B4-BE49-F238E27FC236}">
+                <a16:creationId xmlns:a16="http://schemas.microsoft.com/office/drawing/2014/main" id="{33D8731E-4977-402E-8BFD-895B4D0544CC}"/>
+              </a:ext>
+            </a:extLst>
+          </p:cNvPr>
+          <p:cNvSpPr>
+            <a:spLocks noGrp="1"/>
+          </p:cNvSpPr>
+          <p:nvPr>
+            <p:ph sz="half" idx="2"/>
+          </p:nvPr>
+        </p:nvSpPr>
+        <p:spPr>
+          <a:xfrm>
+            <a:off x="2933700" y="3834606"/>
+            <a:ext cx="3924300" cy="1997867"/>
           </a:xfrm>
         </p:spPr>
         <p:txBody>
           <a:bodyPr rtlCol="0">
-            <a:normAutofit lnSpcReduction="10000"/>
+            <a:normAutofit/>
           </a:bodyPr>
           <a:lstStyle>
             <a:defPPr>
@@ -17411,57 +17690,48 @@
             </a:defPPr>
           </a:lstStyle>
           <a:p>
-            <a:pPr marL="342900" indent="-342900" rtl="0">
-              <a:buFont typeface="Courier New" panose="02070309020205020404" pitchFamily="49" charset="0"/>
-              <a:buChar char="o"/>
-            </a:pPr>
+            <a:pPr rtl="0"/>
             <a:r>
               <a:rPr lang="es-ES" dirty="0"/>
-              <a:t>Database only included top earners for every year 10. It would be interesting to understand if regional data behaves similarly when analyzing a larger sample of athlete earnings.</a:t>
-            </a:r>
-          </a:p>
-          <a:p>
-            <a:pPr marL="342900" indent="-342900" rtl="0">
-              <a:buFont typeface="Courier New" panose="02070309020205020404" pitchFamily="49" charset="0"/>
-              <a:buChar char="o"/>
-            </a:pPr>
+              <a:t>Desarrollar estrategias ganadoras para seguir a la vanguardia de la competencia</a:t>
+            </a:r>
+          </a:p>
+          <a:p>
+            <a:pPr rtl="0"/>
             <a:r>
               <a:rPr lang="es-ES" dirty="0"/>
-              <a:t>We lacked industry data (ex. TV rights, number of spectators, team valuations) to carry out a correlation analysis to understand key drivers for earnings.</a:t>
-            </a:r>
-          </a:p>
-          <a:p>
-            <a:pPr marL="342900" indent="-342900" rtl="0">
-              <a:buFont typeface="Courier New" panose="02070309020205020404" pitchFamily="49" charset="0"/>
-              <a:buChar char="o"/>
-            </a:pPr>
+              <a:t>​Aprovechar los frutos obtenidos para identificar un valor en el terreno de juego</a:t>
+            </a:r>
+          </a:p>
+          <a:p>
+            <a:pPr rtl="0"/>
             <a:r>
               <a:rPr lang="es-ES" dirty="0"/>
-              <a:t>When it comes to calculating average earnings by country when it comes to athletes there is a limitation in the form of us not having a large enough sample size to illustrate this effectively</a:t>
-            </a:r>
-          </a:p>
-        </p:txBody>
-      </p:sp>
-      <p:sp>
-        <p:nvSpPr>
-          <p:cNvPr id="4" name="Marcador de fecha 3">
-            <a:extLst>
-              <a:ext uri="{FF2B5EF4-FFF2-40B4-BE49-F238E27FC236}">
-                <a16:creationId xmlns:a16="http://schemas.microsoft.com/office/drawing/2014/main" id="{00560550-EE65-43CE-B899-F421E74287A1}"/>
-              </a:ext>
-            </a:extLst>
-          </p:cNvPr>
-          <p:cNvSpPr>
-            <a:spLocks noGrp="1"/>
-          </p:cNvSpPr>
-          <p:nvPr>
-            <p:ph type="dt" sz="half" idx="10"/>
-          </p:nvPr>
-        </p:nvSpPr>
-        <p:spPr>
-          <a:xfrm>
-            <a:off x="838200" y="6356350"/>
-            <a:ext cx="2743200" cy="365125"/>
+              <a:t>​Visualizar la convergencia dirigida al cliente</a:t>
+            </a:r>
+          </a:p>
+        </p:txBody>
+      </p:sp>
+      <p:sp>
+        <p:nvSpPr>
+          <p:cNvPr id="5" name="Marcador de texto 4">
+            <a:extLst>
+              <a:ext uri="{FF2B5EF4-FFF2-40B4-BE49-F238E27FC236}">
+                <a16:creationId xmlns:a16="http://schemas.microsoft.com/office/drawing/2014/main" id="{91CDEC5F-B8EE-4BC1-843F-13135E6E7AB2}"/>
+              </a:ext>
+            </a:extLst>
+          </p:cNvPr>
+          <p:cNvSpPr>
+            <a:spLocks noGrp="1"/>
+          </p:cNvSpPr>
+          <p:nvPr>
+            <p:ph type="body" sz="quarter" idx="3"/>
+          </p:nvPr>
+        </p:nvSpPr>
+        <p:spPr>
+          <a:xfrm>
+            <a:off x="7410173" y="2776936"/>
+            <a:ext cx="3943627" cy="823912"/>
           </a:xfrm>
         </p:spPr>
         <p:txBody>
@@ -17475,35 +17745,37 @@
             <a:pPr rtl="0"/>
             <a:r>
               <a:rPr lang="es-ES" dirty="0"/>
-              <a:t>20XX</a:t>
-            </a:r>
-          </a:p>
-        </p:txBody>
-      </p:sp>
-      <p:sp>
-        <p:nvSpPr>
-          <p:cNvPr id="5" name="Marcador de pie de página 4">
-            <a:extLst>
-              <a:ext uri="{FF2B5EF4-FFF2-40B4-BE49-F238E27FC236}">
-                <a16:creationId xmlns:a16="http://schemas.microsoft.com/office/drawing/2014/main" id="{4135E32A-1A8C-43D2-9C6E-12887B4DEDFB}"/>
-              </a:ext>
-            </a:extLst>
-          </p:cNvPr>
-          <p:cNvSpPr>
-            <a:spLocks noGrp="1"/>
-          </p:cNvSpPr>
-          <p:nvPr>
-            <p:ph type="ftr" sz="quarter" idx="11"/>
-          </p:nvPr>
-        </p:nvSpPr>
-        <p:spPr>
-          <a:xfrm>
-            <a:off x="4038600" y="6356350"/>
-            <a:ext cx="4114800" cy="365125"/>
-          </a:xfrm>
-        </p:spPr>
-        <p:txBody>
-          <a:bodyPr rtlCol="0"/>
+              <a:t>OPORTUNIDADES BASADAS EN LA NUBE</a:t>
+            </a:r>
+          </a:p>
+        </p:txBody>
+      </p:sp>
+      <p:sp>
+        <p:nvSpPr>
+          <p:cNvPr id="6" name="Marcador de contenido 5">
+            <a:extLst>
+              <a:ext uri="{FF2B5EF4-FFF2-40B4-BE49-F238E27FC236}">
+                <a16:creationId xmlns:a16="http://schemas.microsoft.com/office/drawing/2014/main" id="{50B65871-FA95-449A-B8BC-90486DE532EF}"/>
+              </a:ext>
+            </a:extLst>
+          </p:cNvPr>
+          <p:cNvSpPr>
+            <a:spLocks noGrp="1"/>
+          </p:cNvSpPr>
+          <p:nvPr>
+            <p:ph sz="quarter" idx="4"/>
+          </p:nvPr>
+        </p:nvSpPr>
+        <p:spPr>
+          <a:xfrm>
+            <a:off x="10214890" y="3494485"/>
+            <a:ext cx="3724947" cy="1910727"/>
+          </a:xfrm>
+        </p:spPr>
+        <p:txBody>
+          <a:bodyPr rtlCol="0">
+            <a:normAutofit/>
+          </a:bodyPr>
           <a:lstStyle>
             <a:defPPr>
               <a:defRPr lang="es-ES"/>
@@ -17513,17 +17785,24 @@
             <a:pPr rtl="0"/>
             <a:r>
               <a:rPr lang="es-ES" dirty="0"/>
-              <a:t>TÍTULO DE LA PRESENTACIÓN</a:t>
-            </a:r>
-          </a:p>
-        </p:txBody>
-      </p:sp>
-      <p:sp>
-        <p:nvSpPr>
-          <p:cNvPr id="6" name="Marcador de número de diapositiva 5">
-            <a:extLst>
-              <a:ext uri="{FF2B5EF4-FFF2-40B4-BE49-F238E27FC236}">
-                <a16:creationId xmlns:a16="http://schemas.microsoft.com/office/drawing/2014/main" id="{7C4B8313-9270-4128-8674-3A3E42B806BC}"/>
+              <a:t>Enfoques iterativos para una estrategia corporativa</a:t>
+            </a:r>
+          </a:p>
+          <a:p>
+            <a:pPr rtl="0"/>
+            <a:r>
+              <a:rPr lang="es-ES" dirty="0"/>
+              <a:t>​Establecer un marco de administración desde dentro</a:t>
+            </a:r>
+          </a:p>
+        </p:txBody>
+      </p:sp>
+      <p:sp>
+        <p:nvSpPr>
+          <p:cNvPr id="9" name="Marcador de número de diapositiva 8">
+            <a:extLst>
+              <a:ext uri="{FF2B5EF4-FFF2-40B4-BE49-F238E27FC236}">
+                <a16:creationId xmlns:a16="http://schemas.microsoft.com/office/drawing/2014/main" id="{C396FFDC-ADE8-4009-A466-A81787258E88}"/>
               </a:ext>
             </a:extLst>
           </p:cNvPr>
@@ -17558,10 +17837,48 @@
           </a:p>
         </p:txBody>
       </p:sp>
+      <p:sp>
+        <p:nvSpPr>
+          <p:cNvPr id="15" name="Marcador de pie de página 4">
+            <a:extLst>
+              <a:ext uri="{FF2B5EF4-FFF2-40B4-BE49-F238E27FC236}">
+                <a16:creationId xmlns:a16="http://schemas.microsoft.com/office/drawing/2014/main" id="{D03417DB-B8B1-A6C2-EC39-D9E06005B059}"/>
+              </a:ext>
+            </a:extLst>
+          </p:cNvPr>
+          <p:cNvSpPr>
+            <a:spLocks noGrp="1"/>
+          </p:cNvSpPr>
+          <p:nvPr>
+            <p:ph type="ftr" sz="quarter" idx="11"/>
+          </p:nvPr>
+        </p:nvSpPr>
+        <p:spPr>
+          <a:xfrm>
+            <a:off x="2463800" y="6356350"/>
+            <a:ext cx="3479800" cy="365125"/>
+          </a:xfrm>
+        </p:spPr>
+        <p:txBody>
+          <a:bodyPr rtlCol="0"/>
+          <a:lstStyle>
+            <a:defPPr>
+              <a:defRPr lang="es-ES"/>
+            </a:defPPr>
+          </a:lstStyle>
+          <a:p>
+            <a:pPr rtl="0"/>
+            <a:r>
+              <a:rPr lang="es-ES" dirty="0"/>
+              <a:t>FORBES HIGHEST PAYING ATHLETES ANALYSIS</a:t>
+            </a:r>
+          </a:p>
+        </p:txBody>
+      </p:sp>
     </p:spTree>
     <p:extLst>
       <p:ext uri="{BB962C8B-B14F-4D97-AF65-F5344CB8AC3E}">
-        <p14:creationId xmlns:p14="http://schemas.microsoft.com/office/powerpoint/2010/main" val="1742861620"/>
+        <p14:creationId xmlns:p14="http://schemas.microsoft.com/office/powerpoint/2010/main" val="2262251188"/>
       </p:ext>
     </p:extLst>
   </p:cSld>
@@ -17593,21 +17910,21 @@
           <p:cNvPr id="2" name="Título 1">
             <a:extLst>
               <a:ext uri="{FF2B5EF4-FFF2-40B4-BE49-F238E27FC236}">
-                <a16:creationId xmlns:a16="http://schemas.microsoft.com/office/drawing/2014/main" id="{09140014-73D5-419B-8867-972BB18D52D4}"/>
-              </a:ext>
-            </a:extLst>
-          </p:cNvPr>
-          <p:cNvSpPr>
-            <a:spLocks noGrp="1"/>
-          </p:cNvSpPr>
-          <p:nvPr>
-            <p:ph type="title"/>
-          </p:nvPr>
-        </p:nvSpPr>
-        <p:spPr>
-          <a:xfrm>
-            <a:off x="2933700" y="892177"/>
-            <a:ext cx="8421688" cy="1325563"/>
+                <a16:creationId xmlns:a16="http://schemas.microsoft.com/office/drawing/2014/main" id="{B1FE5F11-B7B9-4B80-8C6A-A8A7A7190B77}"/>
+              </a:ext>
+            </a:extLst>
+          </p:cNvPr>
+          <p:cNvSpPr>
+            <a:spLocks noGrp="1"/>
+          </p:cNvSpPr>
+          <p:nvPr>
+            <p:ph type="ctrTitle"/>
+          </p:nvPr>
+        </p:nvSpPr>
+        <p:spPr>
+          <a:xfrm>
+            <a:off x="6458964" y="2945452"/>
+            <a:ext cx="5074920" cy="967095"/>
           </a:xfrm>
         </p:spPr>
         <p:txBody>
@@ -17620,263 +17937,16 @@
           <a:p>
             <a:pPr rtl="0"/>
             <a:r>
-              <a:rPr lang="es-ES" dirty="0"/>
-              <a:t>ÁREAS DE ENFOQUE</a:t>
-            </a:r>
-          </a:p>
-        </p:txBody>
-      </p:sp>
-      <p:sp>
-        <p:nvSpPr>
-          <p:cNvPr id="4" name="Marcador de contenido 3">
-            <a:extLst>
-              <a:ext uri="{FF2B5EF4-FFF2-40B4-BE49-F238E27FC236}">
-                <a16:creationId xmlns:a16="http://schemas.microsoft.com/office/drawing/2014/main" id="{33D8731E-4977-402E-8BFD-895B4D0544CC}"/>
-              </a:ext>
-            </a:extLst>
-          </p:cNvPr>
-          <p:cNvSpPr>
-            <a:spLocks noGrp="1"/>
-          </p:cNvSpPr>
-          <p:nvPr>
-            <p:ph sz="half" idx="2"/>
-          </p:nvPr>
-        </p:nvSpPr>
-        <p:spPr>
-          <a:xfrm>
-            <a:off x="2933700" y="3834606"/>
-            <a:ext cx="3924300" cy="1997867"/>
-          </a:xfrm>
-        </p:spPr>
-        <p:txBody>
-          <a:bodyPr rtlCol="0">
-            <a:normAutofit/>
-          </a:bodyPr>
-          <a:lstStyle>
-            <a:defPPr>
-              <a:defRPr lang="es-ES"/>
-            </a:defPPr>
-          </a:lstStyle>
-          <a:p>
-            <a:pPr rtl="0"/>
-            <a:r>
-              <a:rPr lang="es-ES" dirty="0"/>
-              <a:t>Desarrollar estrategias ganadoras para seguir a la vanguardia de la competencia</a:t>
-            </a:r>
-          </a:p>
-          <a:p>
-            <a:pPr rtl="0"/>
-            <a:r>
-              <a:rPr lang="es-ES" dirty="0"/>
-              <a:t>​Aprovechar los frutos obtenidos para identificar un valor en el terreno de juego</a:t>
-            </a:r>
-          </a:p>
-          <a:p>
-            <a:pPr rtl="0"/>
-            <a:r>
-              <a:rPr lang="es-ES" dirty="0"/>
-              <a:t>​Visualizar la convergencia dirigida al cliente</a:t>
-            </a:r>
-          </a:p>
-        </p:txBody>
-      </p:sp>
-      <p:sp>
-        <p:nvSpPr>
-          <p:cNvPr id="5" name="Marcador de texto 4">
-            <a:extLst>
-              <a:ext uri="{FF2B5EF4-FFF2-40B4-BE49-F238E27FC236}">
-                <a16:creationId xmlns:a16="http://schemas.microsoft.com/office/drawing/2014/main" id="{91CDEC5F-B8EE-4BC1-843F-13135E6E7AB2}"/>
-              </a:ext>
-            </a:extLst>
-          </p:cNvPr>
-          <p:cNvSpPr>
-            <a:spLocks noGrp="1"/>
-          </p:cNvSpPr>
-          <p:nvPr>
-            <p:ph type="body" sz="quarter" idx="3"/>
-          </p:nvPr>
-        </p:nvSpPr>
-        <p:spPr>
-          <a:xfrm>
-            <a:off x="7410173" y="2776936"/>
-            <a:ext cx="3943627" cy="823912"/>
-          </a:xfrm>
-        </p:spPr>
-        <p:txBody>
-          <a:bodyPr rtlCol="0"/>
-          <a:lstStyle>
-            <a:defPPr>
-              <a:defRPr lang="es-ES"/>
-            </a:defPPr>
-          </a:lstStyle>
-          <a:p>
-            <a:pPr rtl="0"/>
-            <a:r>
-              <a:rPr lang="es-ES" dirty="0"/>
-              <a:t>OPORTUNIDADES BASADAS EN LA NUBE</a:t>
-            </a:r>
-          </a:p>
-        </p:txBody>
-      </p:sp>
-      <p:sp>
-        <p:nvSpPr>
-          <p:cNvPr id="6" name="Marcador de contenido 5">
-            <a:extLst>
-              <a:ext uri="{FF2B5EF4-FFF2-40B4-BE49-F238E27FC236}">
-                <a16:creationId xmlns:a16="http://schemas.microsoft.com/office/drawing/2014/main" id="{50B65871-FA95-449A-B8BC-90486DE532EF}"/>
-              </a:ext>
-            </a:extLst>
-          </p:cNvPr>
-          <p:cNvSpPr>
-            <a:spLocks noGrp="1"/>
-          </p:cNvSpPr>
-          <p:nvPr>
-            <p:ph sz="quarter" idx="4"/>
-          </p:nvPr>
-        </p:nvSpPr>
-        <p:spPr>
-          <a:xfrm>
-            <a:off x="7410173" y="3834606"/>
-            <a:ext cx="3943627" cy="1997867"/>
-          </a:xfrm>
-        </p:spPr>
-        <p:txBody>
-          <a:bodyPr rtlCol="0">
-            <a:normAutofit/>
-          </a:bodyPr>
-          <a:lstStyle>
-            <a:defPPr>
-              <a:defRPr lang="es-ES"/>
-            </a:defPPr>
-          </a:lstStyle>
-          <a:p>
-            <a:pPr rtl="0"/>
-            <a:r>
-              <a:rPr lang="es-ES" dirty="0"/>
-              <a:t>Enfoques iterativos para una estrategia corporativa</a:t>
-            </a:r>
-          </a:p>
-          <a:p>
-            <a:pPr rtl="0"/>
-            <a:r>
-              <a:rPr lang="es-ES" dirty="0"/>
-              <a:t>​Establecer un marco de administración desde dentro</a:t>
-            </a:r>
-          </a:p>
-        </p:txBody>
-      </p:sp>
-      <p:sp>
-        <p:nvSpPr>
-          <p:cNvPr id="9" name="Marcador de número de diapositiva 8">
-            <a:extLst>
-              <a:ext uri="{FF2B5EF4-FFF2-40B4-BE49-F238E27FC236}">
-                <a16:creationId xmlns:a16="http://schemas.microsoft.com/office/drawing/2014/main" id="{C396FFDC-ADE8-4009-A466-A81787258E88}"/>
-              </a:ext>
-            </a:extLst>
-          </p:cNvPr>
-          <p:cNvSpPr>
-            <a:spLocks noGrp="1"/>
-          </p:cNvSpPr>
-          <p:nvPr>
-            <p:ph type="sldNum" sz="quarter" idx="12"/>
-          </p:nvPr>
-        </p:nvSpPr>
-        <p:spPr>
-          <a:xfrm>
-            <a:off x="8610600" y="6356350"/>
-            <a:ext cx="2743200" cy="365125"/>
-          </a:xfrm>
-        </p:spPr>
-        <p:txBody>
-          <a:bodyPr rtlCol="0"/>
-          <a:lstStyle>
-            <a:defPPr>
-              <a:defRPr lang="es-ES"/>
-            </a:defPPr>
-          </a:lstStyle>
-          <a:p>
-            <a:pPr rtl="0"/>
-            <a:fld id="{A49DFD55-3C28-40EF-9E31-A92D2E4017FF}" type="slidenum">
-              <a:rPr lang="es-ES" smtClean="0"/>
-              <a:pPr rtl="0"/>
-              <a:t>25</a:t>
-            </a:fld>
-            <a:endParaRPr lang="es-ES" dirty="0"/>
-          </a:p>
-        </p:txBody>
-      </p:sp>
-      <p:sp>
-        <p:nvSpPr>
-          <p:cNvPr id="15" name="Marcador de pie de página 4">
-            <a:extLst>
-              <a:ext uri="{FF2B5EF4-FFF2-40B4-BE49-F238E27FC236}">
-                <a16:creationId xmlns:a16="http://schemas.microsoft.com/office/drawing/2014/main" id="{D03417DB-B8B1-A6C2-EC39-D9E06005B059}"/>
-              </a:ext>
-            </a:extLst>
-          </p:cNvPr>
-          <p:cNvSpPr>
-            <a:spLocks noGrp="1"/>
-          </p:cNvSpPr>
-          <p:nvPr>
-            <p:ph type="ftr" sz="quarter" idx="11"/>
-          </p:nvPr>
-        </p:nvSpPr>
-        <p:spPr>
-          <a:xfrm>
-            <a:off x="2463800" y="6356350"/>
-            <a:ext cx="3479800" cy="365125"/>
-          </a:xfrm>
-        </p:spPr>
-        <p:txBody>
-          <a:bodyPr rtlCol="0"/>
-          <a:lstStyle>
-            <a:defPPr>
-              <a:defRPr lang="es-ES"/>
-            </a:defPPr>
-          </a:lstStyle>
-          <a:p>
-            <a:pPr rtl="0"/>
-            <a:r>
-              <a:rPr lang="es-ES" dirty="0"/>
-              <a:t>FORBES HIGHEST PAYING ATHLETES ANALYSIS</a:t>
-            </a:r>
-          </a:p>
-        </p:txBody>
-      </p:sp>
-      <p:pic>
-        <p:nvPicPr>
-          <p:cNvPr id="19" name="Picture 18">
-            <a:extLst>
-              <a:ext uri="{FF2B5EF4-FFF2-40B4-BE49-F238E27FC236}">
-                <a16:creationId xmlns:a16="http://schemas.microsoft.com/office/drawing/2014/main" id="{107FBD5C-404A-8952-57AD-16E7D834AE5E}"/>
-              </a:ext>
-            </a:extLst>
-          </p:cNvPr>
-          <p:cNvPicPr>
-            <a:picLocks noChangeAspect="1"/>
-          </p:cNvPicPr>
-          <p:nvPr/>
-        </p:nvPicPr>
-        <p:blipFill>
-          <a:blip r:embed="rId3"/>
-          <a:stretch>
-            <a:fillRect/>
-          </a:stretch>
-        </p:blipFill>
-        <p:spPr>
-          <a:xfrm>
-            <a:off x="0" y="177799"/>
-            <a:ext cx="12192000" cy="6502401"/>
-          </a:xfrm>
-          <a:prstGeom prst="rect">
-            <a:avLst/>
-          </a:prstGeom>
-        </p:spPr>
-      </p:pic>
+              <a:rPr lang="en-US" sz="2800" dirty="0"/>
+              <a:t>Limitations and next steps</a:t>
+            </a:r>
+          </a:p>
+        </p:txBody>
+      </p:sp>
     </p:spTree>
     <p:extLst>
       <p:ext uri="{BB962C8B-B14F-4D97-AF65-F5344CB8AC3E}">
-        <p14:creationId xmlns:p14="http://schemas.microsoft.com/office/powerpoint/2010/main" val="921118608"/>
+        <p14:creationId xmlns:p14="http://schemas.microsoft.com/office/powerpoint/2010/main" val="3671601111"/>
       </p:ext>
     </p:extLst>
   </p:cSld>
@@ -17908,97 +17978,122 @@
           <p:cNvPr id="2" name="Título 1">
             <a:extLst>
               <a:ext uri="{FF2B5EF4-FFF2-40B4-BE49-F238E27FC236}">
-                <a16:creationId xmlns:a16="http://schemas.microsoft.com/office/drawing/2014/main" id="{8BDF1EDE-5423-435C-B149-87AB1BC22B83}"/>
-              </a:ext>
-            </a:extLst>
-          </p:cNvPr>
-          <p:cNvSpPr>
-            <a:spLocks noGrp="1"/>
-          </p:cNvSpPr>
-          <p:nvPr>
-            <p:ph type="ctrTitle"/>
-          </p:nvPr>
-        </p:nvSpPr>
-        <p:spPr>
-          <a:xfrm>
-            <a:off x="5221715" y="2666632"/>
-            <a:ext cx="4523715" cy="1524735"/>
-          </a:xfrm>
-        </p:spPr>
-        <p:txBody>
-          <a:bodyPr rtlCol="0" anchor="ctr"/>
+                <a16:creationId xmlns:a16="http://schemas.microsoft.com/office/drawing/2014/main" id="{4518FC28-E0BD-4387-B8BE-9965D1A57FF1}"/>
+              </a:ext>
+            </a:extLst>
+          </p:cNvPr>
+          <p:cNvSpPr>
+            <a:spLocks noGrp="1"/>
+          </p:cNvSpPr>
+          <p:nvPr>
+            <p:ph type="title"/>
+          </p:nvPr>
+        </p:nvSpPr>
+        <p:spPr>
+          <a:xfrm>
+            <a:off x="5428430" y="502056"/>
+            <a:ext cx="5111750" cy="1204912"/>
+          </a:xfrm>
+        </p:spPr>
+        <p:txBody>
+          <a:bodyPr rtlCol="0"/>
           <a:lstStyle>
             <a:defPPr>
               <a:defRPr lang="es-ES"/>
             </a:defPPr>
           </a:lstStyle>
           <a:p>
-            <a:pPr algn="ctr" rtl="0"/>
+            <a:pPr rtl="0"/>
             <a:r>
               <a:rPr lang="es-ES" dirty="0"/>
-              <a:t>Thanks!</a:t>
-            </a:r>
-          </a:p>
-        </p:txBody>
-      </p:sp>
-      <p:sp>
-        <p:nvSpPr>
-          <p:cNvPr id="4" name="Marcador de fecha 3">
-            <a:extLst>
-              <a:ext uri="{FF2B5EF4-FFF2-40B4-BE49-F238E27FC236}">
-                <a16:creationId xmlns:a16="http://schemas.microsoft.com/office/drawing/2014/main" id="{A47C7382-18E7-4821-8C61-461D6BBE08FC}"/>
-              </a:ext>
-            </a:extLst>
-          </p:cNvPr>
-          <p:cNvSpPr>
-            <a:spLocks noGrp="1"/>
-          </p:cNvSpPr>
-          <p:nvPr>
-            <p:ph type="dt" sz="half" idx="10"/>
-          </p:nvPr>
-        </p:nvSpPr>
-        <p:spPr>
-          <a:xfrm>
-            <a:off x="4267200" y="6356350"/>
-            <a:ext cx="1774371" cy="365125"/>
-          </a:xfrm>
-        </p:spPr>
-        <p:txBody>
-          <a:bodyPr rtlCol="0"/>
+              <a:t>limitations</a:t>
+            </a:r>
+          </a:p>
+        </p:txBody>
+      </p:sp>
+      <p:sp>
+        <p:nvSpPr>
+          <p:cNvPr id="3" name="Marcador de texto 2">
+            <a:extLst>
+              <a:ext uri="{FF2B5EF4-FFF2-40B4-BE49-F238E27FC236}">
+                <a16:creationId xmlns:a16="http://schemas.microsoft.com/office/drawing/2014/main" id="{FED19BCA-B61F-4EA6-A1FB-CCA3BD8506FB}"/>
+              </a:ext>
+            </a:extLst>
+          </p:cNvPr>
+          <p:cNvSpPr>
+            <a:spLocks noGrp="1"/>
+          </p:cNvSpPr>
+          <p:nvPr>
+            <p:ph type="body" idx="1"/>
+          </p:nvPr>
+        </p:nvSpPr>
+        <p:spPr>
+          <a:xfrm>
+            <a:off x="5428430" y="2094275"/>
+            <a:ext cx="5550426" cy="2592781"/>
+          </a:xfrm>
+        </p:spPr>
+        <p:txBody>
+          <a:bodyPr rtlCol="0">
+            <a:normAutofit lnSpcReduction="10000"/>
+          </a:bodyPr>
           <a:lstStyle>
             <a:defPPr>
               <a:defRPr lang="es-ES"/>
             </a:defPPr>
           </a:lstStyle>
           <a:p>
-            <a:pPr rtl="0"/>
+            <a:pPr marL="342900" indent="-342900" rtl="0">
+              <a:buFont typeface="Courier New" panose="02070309020205020404" pitchFamily="49" charset="0"/>
+              <a:buChar char="o"/>
+            </a:pPr>
             <a:r>
               <a:rPr lang="es-ES" dirty="0"/>
-              <a:t>20XX</a:t>
-            </a:r>
-          </a:p>
-        </p:txBody>
-      </p:sp>
-      <p:sp>
-        <p:nvSpPr>
-          <p:cNvPr id="5" name="Marcador de pie de página 4">
-            <a:extLst>
-              <a:ext uri="{FF2B5EF4-FFF2-40B4-BE49-F238E27FC236}">
-                <a16:creationId xmlns:a16="http://schemas.microsoft.com/office/drawing/2014/main" id="{3990FA1B-5022-47AB-A0AE-8F5C5797997C}"/>
-              </a:ext>
-            </a:extLst>
-          </p:cNvPr>
-          <p:cNvSpPr>
-            <a:spLocks noGrp="1"/>
-          </p:cNvSpPr>
-          <p:nvPr>
-            <p:ph type="ftr" sz="quarter" idx="11"/>
-          </p:nvPr>
-        </p:nvSpPr>
-        <p:spPr>
-          <a:xfrm>
-            <a:off x="6479721" y="6356350"/>
-            <a:ext cx="2661557" cy="365125"/>
+              <a:t>Database only included top earners for every year 10. It would be interesting to understand if regional data behaves similarly when analyzing a larger sample of athlete earnings.</a:t>
+            </a:r>
+          </a:p>
+          <a:p>
+            <a:pPr marL="342900" indent="-342900" rtl="0">
+              <a:buFont typeface="Courier New" panose="02070309020205020404" pitchFamily="49" charset="0"/>
+              <a:buChar char="o"/>
+            </a:pPr>
+            <a:r>
+              <a:rPr lang="es-ES" dirty="0"/>
+              <a:t>We lacked industry data (ex. TV rights, number of spectators, team valuations) to carry out a correlation analysis to understand key drivers for earnings.</a:t>
+            </a:r>
+          </a:p>
+          <a:p>
+            <a:pPr marL="342900" indent="-342900" rtl="0">
+              <a:buFont typeface="Courier New" panose="02070309020205020404" pitchFamily="49" charset="0"/>
+              <a:buChar char="o"/>
+            </a:pPr>
+            <a:r>
+              <a:rPr lang="es-ES" dirty="0"/>
+              <a:t>When it comes to calculating average earnings by country when it comes to athletes there is a limitation in the form of us not having a large enough sample size to illustrate this effectively</a:t>
+            </a:r>
+          </a:p>
+        </p:txBody>
+      </p:sp>
+      <p:sp>
+        <p:nvSpPr>
+          <p:cNvPr id="4" name="Marcador de fecha 3">
+            <a:extLst>
+              <a:ext uri="{FF2B5EF4-FFF2-40B4-BE49-F238E27FC236}">
+                <a16:creationId xmlns:a16="http://schemas.microsoft.com/office/drawing/2014/main" id="{00560550-EE65-43CE-B899-F421E74287A1}"/>
+              </a:ext>
+            </a:extLst>
+          </p:cNvPr>
+          <p:cNvSpPr>
+            <a:spLocks noGrp="1"/>
+          </p:cNvSpPr>
+          <p:nvPr>
+            <p:ph type="dt" sz="half" idx="10"/>
+          </p:nvPr>
+        </p:nvSpPr>
+        <p:spPr>
+          <a:xfrm>
+            <a:off x="838200" y="6356350"/>
+            <a:ext cx="2743200" cy="365125"/>
           </a:xfrm>
         </p:spPr>
         <p:txBody>
@@ -18012,6 +18107,44 @@
             <a:pPr rtl="0"/>
             <a:r>
               <a:rPr lang="es-ES" dirty="0"/>
+              <a:t>20XX</a:t>
+            </a:r>
+          </a:p>
+        </p:txBody>
+      </p:sp>
+      <p:sp>
+        <p:nvSpPr>
+          <p:cNvPr id="5" name="Marcador de pie de página 4">
+            <a:extLst>
+              <a:ext uri="{FF2B5EF4-FFF2-40B4-BE49-F238E27FC236}">
+                <a16:creationId xmlns:a16="http://schemas.microsoft.com/office/drawing/2014/main" id="{4135E32A-1A8C-43D2-9C6E-12887B4DEDFB}"/>
+              </a:ext>
+            </a:extLst>
+          </p:cNvPr>
+          <p:cNvSpPr>
+            <a:spLocks noGrp="1"/>
+          </p:cNvSpPr>
+          <p:nvPr>
+            <p:ph type="ftr" sz="quarter" idx="11"/>
+          </p:nvPr>
+        </p:nvSpPr>
+        <p:spPr>
+          <a:xfrm>
+            <a:off x="4038600" y="6356350"/>
+            <a:ext cx="4114800" cy="365125"/>
+          </a:xfrm>
+        </p:spPr>
+        <p:txBody>
+          <a:bodyPr rtlCol="0"/>
+          <a:lstStyle>
+            <a:defPPr>
+              <a:defRPr lang="es-ES"/>
+            </a:defPPr>
+          </a:lstStyle>
+          <a:p>
+            <a:pPr rtl="0"/>
+            <a:r>
+              <a:rPr lang="es-ES" dirty="0"/>
               <a:t>TÍTULO DE LA PRESENTACIÓN</a:t>
             </a:r>
           </a:p>
@@ -18022,7 +18155,7 @@
           <p:cNvPr id="6" name="Marcador de número de diapositiva 5">
             <a:extLst>
               <a:ext uri="{FF2B5EF4-FFF2-40B4-BE49-F238E27FC236}">
-                <a16:creationId xmlns:a16="http://schemas.microsoft.com/office/drawing/2014/main" id="{4C127D99-645F-4FCF-9573-FDFE2A344FA9}"/>
+                <a16:creationId xmlns:a16="http://schemas.microsoft.com/office/drawing/2014/main" id="{7C4B8313-9270-4128-8674-3A3E42B806BC}"/>
               </a:ext>
             </a:extLst>
           </p:cNvPr>
@@ -18035,8 +18168,8 @@
         </p:nvSpPr>
         <p:spPr>
           <a:xfrm>
-            <a:off x="9579428" y="6356350"/>
-            <a:ext cx="1774371" cy="365125"/>
+            <a:off x="8610600" y="6356350"/>
+            <a:ext cx="2743200" cy="365125"/>
           </a:xfrm>
         </p:spPr>
         <p:txBody>
@@ -18052,6 +18185,505 @@
               <a:rPr lang="es-ES" smtClean="0"/>
               <a:pPr rtl="0"/>
               <a:t>26</a:t>
+            </a:fld>
+            <a:endParaRPr lang="es-ES" dirty="0"/>
+          </a:p>
+        </p:txBody>
+      </p:sp>
+    </p:spTree>
+    <p:extLst>
+      <p:ext uri="{BB962C8B-B14F-4D97-AF65-F5344CB8AC3E}">
+        <p14:creationId xmlns:p14="http://schemas.microsoft.com/office/powerpoint/2010/main" val="1742861620"/>
+      </p:ext>
+    </p:extLst>
+  </p:cSld>
+  <p:clrMapOvr>
+    <a:masterClrMapping/>
+  </p:clrMapOvr>
+</p:sld>
+</file>
+
+<file path=ppt/slides/slide27.xml><?xml version="1.0" encoding="utf-8"?>
+<p:sld xmlns:a="http://schemas.openxmlformats.org/drawingml/2006/main" xmlns:r="http://schemas.openxmlformats.org/officeDocument/2006/relationships" xmlns:p="http://schemas.openxmlformats.org/presentationml/2006/main">
+  <p:cSld>
+    <p:spTree>
+      <p:nvGrpSpPr>
+        <p:cNvPr id="1" name=""/>
+        <p:cNvGrpSpPr/>
+        <p:nvPr/>
+      </p:nvGrpSpPr>
+      <p:grpSpPr>
+        <a:xfrm>
+          <a:off x="0" y="0"/>
+          <a:ext cx="0" cy="0"/>
+          <a:chOff x="0" y="0"/>
+          <a:chExt cx="0" cy="0"/>
+        </a:xfrm>
+      </p:grpSpPr>
+      <p:sp>
+        <p:nvSpPr>
+          <p:cNvPr id="2" name="Título 1">
+            <a:extLst>
+              <a:ext uri="{FF2B5EF4-FFF2-40B4-BE49-F238E27FC236}">
+                <a16:creationId xmlns:a16="http://schemas.microsoft.com/office/drawing/2014/main" id="{09140014-73D5-419B-8867-972BB18D52D4}"/>
+              </a:ext>
+            </a:extLst>
+          </p:cNvPr>
+          <p:cNvSpPr>
+            <a:spLocks noGrp="1"/>
+          </p:cNvSpPr>
+          <p:nvPr>
+            <p:ph type="title"/>
+          </p:nvPr>
+        </p:nvSpPr>
+        <p:spPr>
+          <a:xfrm>
+            <a:off x="2933700" y="892177"/>
+            <a:ext cx="8421688" cy="1325563"/>
+          </a:xfrm>
+        </p:spPr>
+        <p:txBody>
+          <a:bodyPr rtlCol="0"/>
+          <a:lstStyle>
+            <a:defPPr>
+              <a:defRPr lang="es-ES"/>
+            </a:defPPr>
+          </a:lstStyle>
+          <a:p>
+            <a:pPr rtl="0"/>
+            <a:r>
+              <a:rPr lang="es-ES" dirty="0"/>
+              <a:t>ÁREAS DE ENFOQUE</a:t>
+            </a:r>
+          </a:p>
+        </p:txBody>
+      </p:sp>
+      <p:sp>
+        <p:nvSpPr>
+          <p:cNvPr id="4" name="Marcador de contenido 3">
+            <a:extLst>
+              <a:ext uri="{FF2B5EF4-FFF2-40B4-BE49-F238E27FC236}">
+                <a16:creationId xmlns:a16="http://schemas.microsoft.com/office/drawing/2014/main" id="{33D8731E-4977-402E-8BFD-895B4D0544CC}"/>
+              </a:ext>
+            </a:extLst>
+          </p:cNvPr>
+          <p:cNvSpPr>
+            <a:spLocks noGrp="1"/>
+          </p:cNvSpPr>
+          <p:nvPr>
+            <p:ph sz="half" idx="2"/>
+          </p:nvPr>
+        </p:nvSpPr>
+        <p:spPr>
+          <a:xfrm>
+            <a:off x="2933700" y="3834606"/>
+            <a:ext cx="3924300" cy="1997867"/>
+          </a:xfrm>
+        </p:spPr>
+        <p:txBody>
+          <a:bodyPr rtlCol="0">
+            <a:normAutofit/>
+          </a:bodyPr>
+          <a:lstStyle>
+            <a:defPPr>
+              <a:defRPr lang="es-ES"/>
+            </a:defPPr>
+          </a:lstStyle>
+          <a:p>
+            <a:pPr rtl="0"/>
+            <a:r>
+              <a:rPr lang="es-ES" dirty="0"/>
+              <a:t>Desarrollar estrategias ganadoras para seguir a la vanguardia de la competencia</a:t>
+            </a:r>
+          </a:p>
+          <a:p>
+            <a:pPr rtl="0"/>
+            <a:r>
+              <a:rPr lang="es-ES" dirty="0"/>
+              <a:t>​Aprovechar los frutos obtenidos para identificar un valor en el terreno de juego</a:t>
+            </a:r>
+          </a:p>
+          <a:p>
+            <a:pPr rtl="0"/>
+            <a:r>
+              <a:rPr lang="es-ES" dirty="0"/>
+              <a:t>​Visualizar la convergencia dirigida al cliente</a:t>
+            </a:r>
+          </a:p>
+        </p:txBody>
+      </p:sp>
+      <p:sp>
+        <p:nvSpPr>
+          <p:cNvPr id="5" name="Marcador de texto 4">
+            <a:extLst>
+              <a:ext uri="{FF2B5EF4-FFF2-40B4-BE49-F238E27FC236}">
+                <a16:creationId xmlns:a16="http://schemas.microsoft.com/office/drawing/2014/main" id="{91CDEC5F-B8EE-4BC1-843F-13135E6E7AB2}"/>
+              </a:ext>
+            </a:extLst>
+          </p:cNvPr>
+          <p:cNvSpPr>
+            <a:spLocks noGrp="1"/>
+          </p:cNvSpPr>
+          <p:nvPr>
+            <p:ph type="body" sz="quarter" idx="3"/>
+          </p:nvPr>
+        </p:nvSpPr>
+        <p:spPr>
+          <a:xfrm>
+            <a:off x="7410173" y="2776936"/>
+            <a:ext cx="3943627" cy="823912"/>
+          </a:xfrm>
+        </p:spPr>
+        <p:txBody>
+          <a:bodyPr rtlCol="0"/>
+          <a:lstStyle>
+            <a:defPPr>
+              <a:defRPr lang="es-ES"/>
+            </a:defPPr>
+          </a:lstStyle>
+          <a:p>
+            <a:pPr rtl="0"/>
+            <a:r>
+              <a:rPr lang="es-ES" dirty="0"/>
+              <a:t>OPORTUNIDADES BASADAS EN LA NUBE</a:t>
+            </a:r>
+          </a:p>
+        </p:txBody>
+      </p:sp>
+      <p:sp>
+        <p:nvSpPr>
+          <p:cNvPr id="6" name="Marcador de contenido 5">
+            <a:extLst>
+              <a:ext uri="{FF2B5EF4-FFF2-40B4-BE49-F238E27FC236}">
+                <a16:creationId xmlns:a16="http://schemas.microsoft.com/office/drawing/2014/main" id="{50B65871-FA95-449A-B8BC-90486DE532EF}"/>
+              </a:ext>
+            </a:extLst>
+          </p:cNvPr>
+          <p:cNvSpPr>
+            <a:spLocks noGrp="1"/>
+          </p:cNvSpPr>
+          <p:nvPr>
+            <p:ph sz="quarter" idx="4"/>
+          </p:nvPr>
+        </p:nvSpPr>
+        <p:spPr>
+          <a:xfrm>
+            <a:off x="7410173" y="3834606"/>
+            <a:ext cx="3943627" cy="1997867"/>
+          </a:xfrm>
+        </p:spPr>
+        <p:txBody>
+          <a:bodyPr rtlCol="0">
+            <a:normAutofit/>
+          </a:bodyPr>
+          <a:lstStyle>
+            <a:defPPr>
+              <a:defRPr lang="es-ES"/>
+            </a:defPPr>
+          </a:lstStyle>
+          <a:p>
+            <a:pPr rtl="0"/>
+            <a:r>
+              <a:rPr lang="es-ES" dirty="0"/>
+              <a:t>Enfoques iterativos para una estrategia corporativa</a:t>
+            </a:r>
+          </a:p>
+          <a:p>
+            <a:pPr rtl="0"/>
+            <a:r>
+              <a:rPr lang="es-ES" dirty="0"/>
+              <a:t>​Establecer un marco de administración desde dentro</a:t>
+            </a:r>
+          </a:p>
+        </p:txBody>
+      </p:sp>
+      <p:sp>
+        <p:nvSpPr>
+          <p:cNvPr id="9" name="Marcador de número de diapositiva 8">
+            <a:extLst>
+              <a:ext uri="{FF2B5EF4-FFF2-40B4-BE49-F238E27FC236}">
+                <a16:creationId xmlns:a16="http://schemas.microsoft.com/office/drawing/2014/main" id="{C396FFDC-ADE8-4009-A466-A81787258E88}"/>
+              </a:ext>
+            </a:extLst>
+          </p:cNvPr>
+          <p:cNvSpPr>
+            <a:spLocks noGrp="1"/>
+          </p:cNvSpPr>
+          <p:nvPr>
+            <p:ph type="sldNum" sz="quarter" idx="12"/>
+          </p:nvPr>
+        </p:nvSpPr>
+        <p:spPr>
+          <a:xfrm>
+            <a:off x="8610600" y="6356350"/>
+            <a:ext cx="2743200" cy="365125"/>
+          </a:xfrm>
+        </p:spPr>
+        <p:txBody>
+          <a:bodyPr rtlCol="0"/>
+          <a:lstStyle>
+            <a:defPPr>
+              <a:defRPr lang="es-ES"/>
+            </a:defPPr>
+          </a:lstStyle>
+          <a:p>
+            <a:pPr rtl="0"/>
+            <a:fld id="{A49DFD55-3C28-40EF-9E31-A92D2E4017FF}" type="slidenum">
+              <a:rPr lang="es-ES" smtClean="0"/>
+              <a:pPr rtl="0"/>
+              <a:t>27</a:t>
+            </a:fld>
+            <a:endParaRPr lang="es-ES" dirty="0"/>
+          </a:p>
+        </p:txBody>
+      </p:sp>
+      <p:sp>
+        <p:nvSpPr>
+          <p:cNvPr id="15" name="Marcador de pie de página 4">
+            <a:extLst>
+              <a:ext uri="{FF2B5EF4-FFF2-40B4-BE49-F238E27FC236}">
+                <a16:creationId xmlns:a16="http://schemas.microsoft.com/office/drawing/2014/main" id="{D03417DB-B8B1-A6C2-EC39-D9E06005B059}"/>
+              </a:ext>
+            </a:extLst>
+          </p:cNvPr>
+          <p:cNvSpPr>
+            <a:spLocks noGrp="1"/>
+          </p:cNvSpPr>
+          <p:nvPr>
+            <p:ph type="ftr" sz="quarter" idx="11"/>
+          </p:nvPr>
+        </p:nvSpPr>
+        <p:spPr>
+          <a:xfrm>
+            <a:off x="2463800" y="6356350"/>
+            <a:ext cx="3479800" cy="365125"/>
+          </a:xfrm>
+        </p:spPr>
+        <p:txBody>
+          <a:bodyPr rtlCol="0"/>
+          <a:lstStyle>
+            <a:defPPr>
+              <a:defRPr lang="es-ES"/>
+            </a:defPPr>
+          </a:lstStyle>
+          <a:p>
+            <a:pPr rtl="0"/>
+            <a:r>
+              <a:rPr lang="es-ES" dirty="0"/>
+              <a:t>FORBES HIGHEST PAYING ATHLETES ANALYSIS</a:t>
+            </a:r>
+          </a:p>
+        </p:txBody>
+      </p:sp>
+      <p:pic>
+        <p:nvPicPr>
+          <p:cNvPr id="19" name="Picture 18">
+            <a:extLst>
+              <a:ext uri="{FF2B5EF4-FFF2-40B4-BE49-F238E27FC236}">
+                <a16:creationId xmlns:a16="http://schemas.microsoft.com/office/drawing/2014/main" id="{107FBD5C-404A-8952-57AD-16E7D834AE5E}"/>
+              </a:ext>
+            </a:extLst>
+          </p:cNvPr>
+          <p:cNvPicPr>
+            <a:picLocks noChangeAspect="1"/>
+          </p:cNvPicPr>
+          <p:nvPr/>
+        </p:nvPicPr>
+        <p:blipFill>
+          <a:blip r:embed="rId3"/>
+          <a:stretch>
+            <a:fillRect/>
+          </a:stretch>
+        </p:blipFill>
+        <p:spPr>
+          <a:xfrm>
+            <a:off x="0" y="177799"/>
+            <a:ext cx="12192000" cy="6502401"/>
+          </a:xfrm>
+          <a:prstGeom prst="rect">
+            <a:avLst/>
+          </a:prstGeom>
+        </p:spPr>
+      </p:pic>
+    </p:spTree>
+    <p:extLst>
+      <p:ext uri="{BB962C8B-B14F-4D97-AF65-F5344CB8AC3E}">
+        <p14:creationId xmlns:p14="http://schemas.microsoft.com/office/powerpoint/2010/main" val="921118608"/>
+      </p:ext>
+    </p:extLst>
+  </p:cSld>
+  <p:clrMapOvr>
+    <a:masterClrMapping/>
+  </p:clrMapOvr>
+</p:sld>
+</file>
+
+<file path=ppt/slides/slide28.xml><?xml version="1.0" encoding="utf-8"?>
+<p:sld xmlns:a="http://schemas.openxmlformats.org/drawingml/2006/main" xmlns:r="http://schemas.openxmlformats.org/officeDocument/2006/relationships" xmlns:p="http://schemas.openxmlformats.org/presentationml/2006/main">
+  <p:cSld>
+    <p:spTree>
+      <p:nvGrpSpPr>
+        <p:cNvPr id="1" name=""/>
+        <p:cNvGrpSpPr/>
+        <p:nvPr/>
+      </p:nvGrpSpPr>
+      <p:grpSpPr>
+        <a:xfrm>
+          <a:off x="0" y="0"/>
+          <a:ext cx="0" cy="0"/>
+          <a:chOff x="0" y="0"/>
+          <a:chExt cx="0" cy="0"/>
+        </a:xfrm>
+      </p:grpSpPr>
+      <p:sp>
+        <p:nvSpPr>
+          <p:cNvPr id="2" name="Título 1">
+            <a:extLst>
+              <a:ext uri="{FF2B5EF4-FFF2-40B4-BE49-F238E27FC236}">
+                <a16:creationId xmlns:a16="http://schemas.microsoft.com/office/drawing/2014/main" id="{8BDF1EDE-5423-435C-B149-87AB1BC22B83}"/>
+              </a:ext>
+            </a:extLst>
+          </p:cNvPr>
+          <p:cNvSpPr>
+            <a:spLocks noGrp="1"/>
+          </p:cNvSpPr>
+          <p:nvPr>
+            <p:ph type="ctrTitle"/>
+          </p:nvPr>
+        </p:nvSpPr>
+        <p:spPr>
+          <a:xfrm>
+            <a:off x="5221715" y="2666632"/>
+            <a:ext cx="4523715" cy="1524735"/>
+          </a:xfrm>
+        </p:spPr>
+        <p:txBody>
+          <a:bodyPr rtlCol="0" anchor="ctr"/>
+          <a:lstStyle>
+            <a:defPPr>
+              <a:defRPr lang="es-ES"/>
+            </a:defPPr>
+          </a:lstStyle>
+          <a:p>
+            <a:pPr algn="ctr" rtl="0"/>
+            <a:r>
+              <a:rPr lang="es-ES" dirty="0"/>
+              <a:t>Thanks!</a:t>
+            </a:r>
+          </a:p>
+        </p:txBody>
+      </p:sp>
+      <p:sp>
+        <p:nvSpPr>
+          <p:cNvPr id="4" name="Marcador de fecha 3">
+            <a:extLst>
+              <a:ext uri="{FF2B5EF4-FFF2-40B4-BE49-F238E27FC236}">
+                <a16:creationId xmlns:a16="http://schemas.microsoft.com/office/drawing/2014/main" id="{A47C7382-18E7-4821-8C61-461D6BBE08FC}"/>
+              </a:ext>
+            </a:extLst>
+          </p:cNvPr>
+          <p:cNvSpPr>
+            <a:spLocks noGrp="1"/>
+          </p:cNvSpPr>
+          <p:nvPr>
+            <p:ph type="dt" sz="half" idx="10"/>
+          </p:nvPr>
+        </p:nvSpPr>
+        <p:spPr>
+          <a:xfrm>
+            <a:off x="4267200" y="6356350"/>
+            <a:ext cx="1774371" cy="365125"/>
+          </a:xfrm>
+        </p:spPr>
+        <p:txBody>
+          <a:bodyPr rtlCol="0"/>
+          <a:lstStyle>
+            <a:defPPr>
+              <a:defRPr lang="es-ES"/>
+            </a:defPPr>
+          </a:lstStyle>
+          <a:p>
+            <a:pPr rtl="0"/>
+            <a:r>
+              <a:rPr lang="es-ES" dirty="0"/>
+              <a:t>20XX</a:t>
+            </a:r>
+          </a:p>
+        </p:txBody>
+      </p:sp>
+      <p:sp>
+        <p:nvSpPr>
+          <p:cNvPr id="5" name="Marcador de pie de página 4">
+            <a:extLst>
+              <a:ext uri="{FF2B5EF4-FFF2-40B4-BE49-F238E27FC236}">
+                <a16:creationId xmlns:a16="http://schemas.microsoft.com/office/drawing/2014/main" id="{3990FA1B-5022-47AB-A0AE-8F5C5797997C}"/>
+              </a:ext>
+            </a:extLst>
+          </p:cNvPr>
+          <p:cNvSpPr>
+            <a:spLocks noGrp="1"/>
+          </p:cNvSpPr>
+          <p:nvPr>
+            <p:ph type="ftr" sz="quarter" idx="11"/>
+          </p:nvPr>
+        </p:nvSpPr>
+        <p:spPr>
+          <a:xfrm>
+            <a:off x="6479721" y="6356350"/>
+            <a:ext cx="2661557" cy="365125"/>
+          </a:xfrm>
+        </p:spPr>
+        <p:txBody>
+          <a:bodyPr rtlCol="0"/>
+          <a:lstStyle>
+            <a:defPPr>
+              <a:defRPr lang="es-ES"/>
+            </a:defPPr>
+          </a:lstStyle>
+          <a:p>
+            <a:pPr rtl="0"/>
+            <a:r>
+              <a:rPr lang="es-ES" dirty="0"/>
+              <a:t>TÍTULO DE LA PRESENTACIÓN</a:t>
+            </a:r>
+          </a:p>
+        </p:txBody>
+      </p:sp>
+      <p:sp>
+        <p:nvSpPr>
+          <p:cNvPr id="6" name="Marcador de número de diapositiva 5">
+            <a:extLst>
+              <a:ext uri="{FF2B5EF4-FFF2-40B4-BE49-F238E27FC236}">
+                <a16:creationId xmlns:a16="http://schemas.microsoft.com/office/drawing/2014/main" id="{4C127D99-645F-4FCF-9573-FDFE2A344FA9}"/>
+              </a:ext>
+            </a:extLst>
+          </p:cNvPr>
+          <p:cNvSpPr>
+            <a:spLocks noGrp="1"/>
+          </p:cNvSpPr>
+          <p:nvPr>
+            <p:ph type="sldNum" sz="quarter" idx="12"/>
+          </p:nvPr>
+        </p:nvSpPr>
+        <p:spPr>
+          <a:xfrm>
+            <a:off x="9579428" y="6356350"/>
+            <a:ext cx="1774371" cy="365125"/>
+          </a:xfrm>
+        </p:spPr>
+        <p:txBody>
+          <a:bodyPr rtlCol="0"/>
+          <a:lstStyle>
+            <a:defPPr>
+              <a:defRPr lang="es-ES"/>
+            </a:defPPr>
+          </a:lstStyle>
+          <a:p>
+            <a:pPr rtl="0"/>
+            <a:fld id="{A49DFD55-3C28-40EF-9E31-A92D2E4017FF}" type="slidenum">
+              <a:rPr lang="es-ES" smtClean="0"/>
+              <a:pPr rtl="0"/>
+              <a:t>28</a:t>
             </a:fld>
             <a:endParaRPr lang="es-ES" dirty="0"/>
           </a:p>
@@ -20203,6 +20835,15 @@
 </file>
 
 <file path=customXml/item1.xml><?xml version="1.0" encoding="utf-8"?>
+<?mso-contentType ?>
+<FormTemplates xmlns="http://schemas.microsoft.com/sharepoint/v3/contenttype/forms">
+  <Display>DocumentLibraryForm</Display>
+  <Edit>DocumentLibraryForm</Edit>
+  <New>DocumentLibraryForm</New>
+</FormTemplates>
+</file>
+
+<file path=customXml/item2.xml><?xml version="1.0" encoding="utf-8"?>
 <ct:contentTypeSchema xmlns:ct="http://schemas.microsoft.com/office/2006/metadata/contentType" xmlns:ma="http://schemas.microsoft.com/office/2006/metadata/properties/metaAttributes" ct:_="" ma:_="" ma:contentTypeName="Document" ma:contentTypeID="0x01010079F111ED35F8CC479449609E8A0923A6" ma:contentTypeVersion="20" ma:contentTypeDescription="Create a new document." ma:contentTypeScope="" ma:versionID="1267097ee5f5874adfcc408041ae252e">
   <xsd:schema xmlns:xsd="http://www.w3.org/2001/XMLSchema" xmlns:xs="http://www.w3.org/2001/XMLSchema" xmlns:p="http://schemas.microsoft.com/office/2006/metadata/properties" xmlns:ns1="http://schemas.microsoft.com/sharepoint/v3" xmlns:ns2="71af3243-3dd4-4a8d-8c0d-dd76da1f02a5" xmlns:ns3="16c05727-aa75-4e4a-9b5f-8a80a1165891" xmlns:ns4="230e9df3-be65-4c73-a93b-d1236ebd677e" targetNamespace="http://schemas.microsoft.com/office/2006/metadata/properties" ma:root="true" ma:fieldsID="395891a93df65b14727750f2c06c306c" ns1:_="" ns2:_="" ns3:_="" ns4:_="">
     <xsd:import namespace="http://schemas.microsoft.com/sharepoint/v3"/>
@@ -20478,15 +21119,6 @@
 </ct:contentTypeSchema>
 </file>
 
-<file path=customXml/item2.xml><?xml version="1.0" encoding="utf-8"?>
-<?mso-contentType ?>
-<FormTemplates xmlns="http://schemas.microsoft.com/sharepoint/v3/contenttype/forms">
-  <Display>DocumentLibraryForm</Display>
-  <Edit>DocumentLibraryForm</Edit>
-  <New>DocumentLibraryForm</New>
-</FormTemplates>
-</file>
-
 <file path=customXml/item3.xml><?xml version="1.0" encoding="utf-8"?>
 <p:properties xmlns:p="http://schemas.microsoft.com/office/2006/metadata/properties" xmlns:xsi="http://www.w3.org/2001/XMLSchema-instance" xmlns:pc="http://schemas.microsoft.com/office/infopath/2007/PartnerControls">
   <documentManagement>
@@ -20507,6 +21139,14 @@
 </file>
 
 <file path=customXml/itemProps1.xml><?xml version="1.0" encoding="utf-8"?>
+<ds:datastoreItem xmlns:ds="http://schemas.openxmlformats.org/officeDocument/2006/customXml" ds:itemID="{0FD6FE22-81A0-4500-AFD0-342D21BB9A2C}">
+  <ds:schemaRefs>
+    <ds:schemaRef ds:uri="http://schemas.microsoft.com/sharepoint/v3/contenttype/forms"/>
+  </ds:schemaRefs>
+</ds:datastoreItem>
+</file>
+
+<file path=customXml/itemProps2.xml><?xml version="1.0" encoding="utf-8"?>
 <ds:datastoreItem xmlns:ds="http://schemas.openxmlformats.org/officeDocument/2006/customXml" ds:itemID="{CC96B61E-1B64-430F-934F-7D1B90028029}">
   <ds:schemaRefs>
     <ds:schemaRef ds:uri="http://schemas.microsoft.com/office/2006/metadata/contentType"/>
@@ -20523,14 +21163,6 @@
     <ds:schemaRef ds:uri="http://purl.org/dc/elements/1.1/"/>
     <ds:schemaRef ds:uri="http://purl.org/dc/terms/"/>
     <ds:schemaRef ds:uri="http://schemas.microsoft.com/internal/obd"/>
-  </ds:schemaRefs>
-</ds:datastoreItem>
-</file>
-
-<file path=customXml/itemProps2.xml><?xml version="1.0" encoding="utf-8"?>
-<ds:datastoreItem xmlns:ds="http://schemas.openxmlformats.org/officeDocument/2006/customXml" ds:itemID="{0FD6FE22-81A0-4500-AFD0-342D21BB9A2C}">
-  <ds:schemaRefs>
-    <ds:schemaRef ds:uri="http://schemas.microsoft.com/sharepoint/v3/contenttype/forms"/>
   </ds:schemaRefs>
 </ds:datastoreItem>
 </file>

</xml_diff>